<commit_message>
Realizada ultimaas correções | apresentação quase pronta | pdf Final gerado
</commit_message>
<xml_diff>
--- a/APRESENTAÇÃO JOAO VITOR.pptx
+++ b/APRESENTAÇÃO JOAO VITOR.pptx
@@ -29,13 +29,35 @@
     <p:sldId id="265" r:id="rId22"/>
     <p:sldId id="266" r:id="rId23"/>
     <p:sldId id="271" r:id="rId24"/>
-    <p:sldId id="267" r:id="rId25"/>
-    <p:sldId id="268" r:id="rId26"/>
-    <p:sldId id="269" r:id="rId27"/>
-    <p:sldId id="270" r:id="rId28"/>
-    <p:sldId id="272" r:id="rId29"/>
-    <p:sldId id="273" r:id="rId30"/>
-    <p:sldId id="274" r:id="rId31"/>
+    <p:sldId id="303" r:id="rId25"/>
+    <p:sldId id="304" r:id="rId26"/>
+    <p:sldId id="307" r:id="rId27"/>
+    <p:sldId id="308" r:id="rId28"/>
+    <p:sldId id="309" r:id="rId29"/>
+    <p:sldId id="310" r:id="rId30"/>
+    <p:sldId id="311" r:id="rId31"/>
+    <p:sldId id="267" r:id="rId32"/>
+    <p:sldId id="268" r:id="rId33"/>
+    <p:sldId id="312" r:id="rId34"/>
+    <p:sldId id="313" r:id="rId35"/>
+    <p:sldId id="314" r:id="rId36"/>
+    <p:sldId id="315" r:id="rId37"/>
+    <p:sldId id="316" r:id="rId38"/>
+    <p:sldId id="317" r:id="rId39"/>
+    <p:sldId id="318" r:id="rId40"/>
+    <p:sldId id="320" r:id="rId41"/>
+    <p:sldId id="319" r:id="rId42"/>
+    <p:sldId id="321" r:id="rId43"/>
+    <p:sldId id="322" r:id="rId44"/>
+    <p:sldId id="269" r:id="rId45"/>
+    <p:sldId id="270" r:id="rId46"/>
+    <p:sldId id="323" r:id="rId47"/>
+    <p:sldId id="324" r:id="rId48"/>
+    <p:sldId id="325" r:id="rId49"/>
+    <p:sldId id="272" r:id="rId50"/>
+    <p:sldId id="273" r:id="rId51"/>
+    <p:sldId id="327" r:id="rId52"/>
+    <p:sldId id="274" r:id="rId53"/>
   </p:sldIdLst>
   <p:sldSz cx="9144000" cy="6858000" type="screen4x3"/>
   <p:notesSz cx="6858000" cy="9144000"/>
@@ -5052,8 +5074,8 @@
         </p:blipFill>
         <p:spPr>
           <a:xfrm>
-            <a:off x="1923415" y="2025015"/>
-            <a:ext cx="5297805" cy="3325495"/>
+            <a:off x="1397000" y="2038350"/>
+            <a:ext cx="6350000" cy="3325495"/>
           </a:xfrm>
           <a:prstGeom prst="rect">
             <a:avLst/>
@@ -5751,13 +5773,7 @@
               <a:rPr lang="pt-BR" altLang="en-US" sz="2800">
                 <a:sym typeface="+mn-ea"/>
               </a:rPr>
-              <a:t>Front</a:t>
-            </a:r>
-            <a:r>
-              <a:rPr lang="pt-BR" altLang="en-US" sz="2800">
-                <a:sym typeface="+mn-ea"/>
-              </a:rPr>
-              <a:t>-End</a:t>
+              <a:t>Front-End</a:t>
             </a:r>
             <a:endParaRPr lang="pt-BR" altLang="en-US" sz="2800">
               <a:sym typeface="+mn-ea"/>
@@ -5787,6 +5803,11 @@
           <a:prstGeom prst="rect">
             <a:avLst/>
           </a:prstGeom>
+          <a:ln>
+            <a:solidFill>
+              <a:schemeClr val="accent1"/>
+            </a:solidFill>
+          </a:ln>
         </p:spPr>
       </p:pic>
       <p:pic>
@@ -5814,6 +5835,11 @@
           <a:prstGeom prst="rect">
             <a:avLst/>
           </a:prstGeom>
+          <a:ln>
+            <a:solidFill>
+              <a:schemeClr val="accent1"/>
+            </a:solidFill>
+          </a:ln>
         </p:spPr>
       </p:pic>
       <p:pic>
@@ -5838,6 +5864,11 @@
           <a:prstGeom prst="rect">
             <a:avLst/>
           </a:prstGeom>
+          <a:ln>
+            <a:solidFill>
+              <a:schemeClr val="accent1"/>
+            </a:solidFill>
+          </a:ln>
         </p:spPr>
       </p:pic>
       <p:pic>
@@ -5862,6 +5893,11 @@
           <a:prstGeom prst="rect">
             <a:avLst/>
           </a:prstGeom>
+          <a:ln>
+            <a:solidFill>
+              <a:schemeClr val="accent1"/>
+            </a:solidFill>
+          </a:ln>
         </p:spPr>
       </p:pic>
       <p:pic>
@@ -5886,6 +5922,11 @@
           <a:prstGeom prst="rect">
             <a:avLst/>
           </a:prstGeom>
+          <a:ln>
+            <a:solidFill>
+              <a:schemeClr val="accent1"/>
+            </a:solidFill>
+          </a:ln>
         </p:spPr>
       </p:pic>
       <p:pic>
@@ -5910,6 +5951,11 @@
           <a:prstGeom prst="rect">
             <a:avLst/>
           </a:prstGeom>
+          <a:ln>
+            <a:solidFill>
+              <a:schemeClr val="accent1"/>
+            </a:solidFill>
+          </a:ln>
         </p:spPr>
       </p:pic>
       <p:sp>
@@ -5967,6 +6013,11 @@
           <a:prstGeom prst="rect">
             <a:avLst/>
           </a:prstGeom>
+          <a:ln>
+            <a:solidFill>
+              <a:schemeClr val="accent1"/>
+            </a:solidFill>
+          </a:ln>
         </p:spPr>
       </p:pic>
       <p:pic>
@@ -5991,6 +6042,11 @@
           <a:prstGeom prst="rect">
             <a:avLst/>
           </a:prstGeom>
+          <a:ln>
+            <a:solidFill>
+              <a:schemeClr val="accent1"/>
+            </a:solidFill>
+          </a:ln>
         </p:spPr>
       </p:pic>
       <p:pic>
@@ -6015,6 +6071,11 @@
           <a:prstGeom prst="rect">
             <a:avLst/>
           </a:prstGeom>
+          <a:ln>
+            <a:solidFill>
+              <a:schemeClr val="accent1"/>
+            </a:solidFill>
+          </a:ln>
         </p:spPr>
       </p:pic>
       <p:pic>
@@ -6039,6 +6100,11 @@
           <a:prstGeom prst="rect">
             <a:avLst/>
           </a:prstGeom>
+          <a:ln>
+            <a:solidFill>
+              <a:schemeClr val="accent1"/>
+            </a:solidFill>
+          </a:ln>
         </p:spPr>
       </p:pic>
       <p:pic>
@@ -6092,6 +6158,11 @@
           <a:prstGeom prst="rect">
             <a:avLst/>
           </a:prstGeom>
+          <a:ln>
+            <a:solidFill>
+              <a:schemeClr val="accent1"/>
+            </a:solidFill>
+          </a:ln>
         </p:spPr>
       </p:pic>
       <p:pic>
@@ -6116,6 +6187,11 @@
           <a:prstGeom prst="rect">
             <a:avLst/>
           </a:prstGeom>
+          <a:ln>
+            <a:solidFill>
+              <a:schemeClr val="accent1"/>
+            </a:solidFill>
+          </a:ln>
         </p:spPr>
       </p:pic>
       <p:sp>
@@ -6173,6 +6249,11 @@
           <a:prstGeom prst="rect">
             <a:avLst/>
           </a:prstGeom>
+          <a:ln>
+            <a:solidFill>
+              <a:schemeClr val="accent1"/>
+            </a:solidFill>
+          </a:ln>
         </p:spPr>
       </p:pic>
       <p:pic>
@@ -6191,12 +6272,17 @@
         </p:blipFill>
         <p:spPr>
           <a:xfrm>
-            <a:off x="1861820" y="5043170"/>
+            <a:off x="2630170" y="5043170"/>
             <a:ext cx="692150" cy="886460"/>
           </a:xfrm>
           <a:prstGeom prst="rect">
             <a:avLst/>
           </a:prstGeom>
+          <a:ln>
+            <a:solidFill>
+              <a:schemeClr val="accent1"/>
+            </a:solidFill>
+          </a:ln>
         </p:spPr>
       </p:pic>
       <p:pic>
@@ -6215,12 +6301,17 @@
         </p:blipFill>
         <p:spPr>
           <a:xfrm>
-            <a:off x="2903855" y="5043170"/>
+            <a:off x="3571240" y="5043170"/>
             <a:ext cx="842645" cy="842645"/>
           </a:xfrm>
           <a:prstGeom prst="rect">
             <a:avLst/>
           </a:prstGeom>
+          <a:ln>
+            <a:solidFill>
+              <a:schemeClr val="accent1"/>
+            </a:solidFill>
+          </a:ln>
         </p:spPr>
       </p:pic>
       <p:pic>
@@ -6239,12 +6330,17 @@
         </p:blipFill>
         <p:spPr>
           <a:xfrm>
-            <a:off x="3946525" y="5043170"/>
+            <a:off x="4637405" y="5043170"/>
             <a:ext cx="1976755" cy="842010"/>
           </a:xfrm>
           <a:prstGeom prst="rect">
             <a:avLst/>
           </a:prstGeom>
+          <a:ln>
+            <a:solidFill>
+              <a:schemeClr val="accent1"/>
+            </a:solidFill>
+          </a:ln>
         </p:spPr>
       </p:pic>
       <p:pic>
@@ -6263,12 +6359,17 @@
         </p:blipFill>
         <p:spPr>
           <a:xfrm>
-            <a:off x="6349365" y="5043170"/>
+            <a:off x="6760845" y="5043170"/>
             <a:ext cx="867410" cy="887095"/>
           </a:xfrm>
           <a:prstGeom prst="rect">
             <a:avLst/>
           </a:prstGeom>
+          <a:ln>
+            <a:solidFill>
+              <a:schemeClr val="accent1"/>
+            </a:solidFill>
+          </a:ln>
         </p:spPr>
       </p:pic>
       <p:pic>
@@ -6287,12 +6388,46 @@
         </p:blipFill>
         <p:spPr>
           <a:xfrm>
-            <a:off x="7636510" y="5043170"/>
+            <a:off x="7800975" y="5043170"/>
             <a:ext cx="759460" cy="842010"/>
           </a:xfrm>
           <a:prstGeom prst="rect">
             <a:avLst/>
           </a:prstGeom>
+          <a:ln>
+            <a:solidFill>
+              <a:schemeClr val="accent1"/>
+            </a:solidFill>
+          </a:ln>
+        </p:spPr>
+      </p:pic>
+      <p:pic>
+        <p:nvPicPr>
+          <p:cNvPr id="3" name="Imagem 2"/>
+          <p:cNvPicPr>
+            <a:picLocks noChangeAspect="1"/>
+          </p:cNvPicPr>
+          <p:nvPr/>
+        </p:nvPicPr>
+        <p:blipFill>
+          <a:blip r:embed="rId19"/>
+          <a:stretch>
+            <a:fillRect/>
+          </a:stretch>
+        </p:blipFill>
+        <p:spPr>
+          <a:xfrm>
+            <a:off x="1649095" y="5042535"/>
+            <a:ext cx="836930" cy="887730"/>
+          </a:xfrm>
+          <a:prstGeom prst="rect">
+            <a:avLst/>
+          </a:prstGeom>
+          <a:ln>
+            <a:solidFill>
+              <a:schemeClr val="accent1"/>
+            </a:solidFill>
+          </a:ln>
         </p:spPr>
       </p:pic>
     </p:spTree>
@@ -6775,86 +6910,9 @@
           <a:p>
             <a:r>
               <a:rPr lang="pt-BR" altLang="en-US" dirty="0" err="1" smtClean="0"/>
-              <a:t>Desenvolvimento</a:t>
-            </a:r>
-            <a:endParaRPr lang="pt-BR" altLang="en-US" dirty="0"/>
-          </a:p>
-        </p:txBody>
-      </p:sp>
-      <p:sp>
-        <p:nvSpPr>
-          <p:cNvPr id="3" name="Content Placeholder 2"/>
-          <p:cNvSpPr>
-            <a:spLocks noGrp="1"/>
-          </p:cNvSpPr>
-          <p:nvPr>
-            <p:ph idx="1"/>
-          </p:nvPr>
-        </p:nvSpPr>
-        <p:spPr/>
-        <p:txBody>
-          <a:bodyPr/>
-          <a:lstStyle/>
-          <a:p>
-            <a:r>
-              <a:rPr lang="pt-BR" dirty="0"/>
-              <a:t>Textos com, no m</a:t>
-            </a:r>
-            <a:r>
-              <a:rPr lang="en-US" dirty="0" err="1"/>
-              <a:t>áximo</a:t>
-            </a:r>
-            <a:r>
-              <a:rPr lang="en-US" dirty="0"/>
-              <a:t>, 3 </a:t>
-            </a:r>
-            <a:r>
-              <a:rPr lang="en-US" dirty="0" err="1"/>
-              <a:t>linhas</a:t>
-            </a:r>
-            <a:endParaRPr lang="en-US" dirty="0"/>
-          </a:p>
-          <a:p>
-            <a:endParaRPr lang="en-US" dirty="0"/>
-          </a:p>
-          <a:p>
-            <a:r>
-              <a:rPr lang="en-US" dirty="0"/>
-              <a:t>No </a:t>
-            </a:r>
-            <a:r>
-              <a:rPr lang="en-US" dirty="0" err="1"/>
-              <a:t>máximo</a:t>
-            </a:r>
-            <a:r>
-              <a:rPr lang="en-US" dirty="0"/>
-              <a:t> </a:t>
-            </a:r>
-            <a:r>
-              <a:rPr lang="en-US" dirty="0" err="1"/>
-              <a:t>dois</a:t>
-            </a:r>
-            <a:r>
-              <a:rPr lang="en-US" dirty="0"/>
-              <a:t> </a:t>
-            </a:r>
-            <a:r>
-              <a:rPr lang="en-US" dirty="0" err="1"/>
-              <a:t>tópicos</a:t>
-            </a:r>
-            <a:r>
-              <a:rPr lang="en-US" dirty="0"/>
-              <a:t> </a:t>
-            </a:r>
-            <a:r>
-              <a:rPr lang="en-US" dirty="0" err="1"/>
-              <a:t>por</a:t>
-            </a:r>
-            <a:r>
-              <a:rPr lang="en-US" dirty="0"/>
-              <a:t> slide</a:t>
-            </a:r>
-            <a:endParaRPr lang="en-US" dirty="0"/>
+              <a:t>Arquitetura da Solução</a:t>
+            </a:r>
+            <a:endParaRPr lang="pt-BR" altLang="en-US" dirty="0" err="1" smtClean="0"/>
           </a:p>
         </p:txBody>
       </p:sp>
@@ -6877,6 +6935,67 @@
               <a:rPr lang="pt-BR" smtClean="0"/>
             </a:fld>
             <a:endParaRPr lang="pt-BR"/>
+          </a:p>
+        </p:txBody>
+      </p:sp>
+      <p:pic>
+        <p:nvPicPr>
+          <p:cNvPr id="5" name="Picture 1" descr="ArquiteturaDaSolução"/>
+          <p:cNvPicPr>
+            <a:picLocks noChangeAspect="1"/>
+          </p:cNvPicPr>
+          <p:nvPr>
+            <p:ph idx="1"/>
+          </p:nvPr>
+        </p:nvPicPr>
+        <p:blipFill>
+          <a:blip r:embed="rId1"/>
+          <a:stretch>
+            <a:fillRect/>
+          </a:stretch>
+        </p:blipFill>
+        <p:spPr>
+          <a:xfrm>
+            <a:off x="1132205" y="1586230"/>
+            <a:ext cx="6878955" cy="4664710"/>
+          </a:xfrm>
+          <a:prstGeom prst="rect">
+            <a:avLst/>
+          </a:prstGeom>
+          <a:ln>
+            <a:solidFill>
+              <a:schemeClr val="tx1"/>
+            </a:solidFill>
+          </a:ln>
+        </p:spPr>
+      </p:pic>
+      <p:sp>
+        <p:nvSpPr>
+          <p:cNvPr id="13" name="Caixa de Texto 12"/>
+          <p:cNvSpPr txBox="1"/>
+          <p:nvPr/>
+        </p:nvSpPr>
+        <p:spPr>
+          <a:xfrm>
+            <a:off x="1132205" y="6356350"/>
+            <a:ext cx="1599565" cy="306705"/>
+          </a:xfrm>
+          <a:prstGeom prst="rect">
+            <a:avLst/>
+          </a:prstGeom>
+          <a:noFill/>
+        </p:spPr>
+        <p:txBody>
+          <a:bodyPr wrap="none" rtlCol="0">
+            <a:spAutoFit/>
+          </a:bodyPr>
+          <a:p>
+            <a:pPr algn="l"/>
+            <a:r>
+              <a:rPr lang="pt-BR" altLang="en-US" sz="1400"/>
+              <a:t>Fonte: Autor (2018)</a:t>
+            </a:r>
+            <a:endParaRPr lang="pt-BR" altLang="en-US" sz="1400"/>
           </a:p>
         </p:txBody>
       </p:sp>
@@ -6922,131 +7041,27 @@
             <p:ph type="title"/>
           </p:nvPr>
         </p:nvSpPr>
-        <p:spPr/>
-        <p:txBody>
-          <a:bodyPr/>
+        <p:spPr>
+          <a:xfrm>
+            <a:off x="628650" y="365125"/>
+            <a:ext cx="7886700" cy="984250"/>
+          </a:xfrm>
+        </p:spPr>
+        <p:txBody>
+          <a:bodyPr>
+            <a:normAutofit fontScale="90000"/>
+          </a:bodyPr>
           <a:lstStyle/>
           <a:p>
             <a:r>
               <a:rPr lang="pt-BR" altLang="en-US" dirty="0" err="1" smtClean="0">
                 <a:sym typeface="+mn-ea"/>
               </a:rPr>
-              <a:t>Desenvolvimento</a:t>
-            </a:r>
-            <a:endParaRPr lang="pt-BR" dirty="0"/>
-          </a:p>
-        </p:txBody>
-      </p:sp>
-      <p:sp>
-        <p:nvSpPr>
-          <p:cNvPr id="3" name="Content Placeholder 2"/>
-          <p:cNvSpPr>
-            <a:spLocks noGrp="1"/>
-          </p:cNvSpPr>
-          <p:nvPr>
-            <p:ph idx="1"/>
-          </p:nvPr>
-        </p:nvSpPr>
-        <p:spPr/>
-        <p:txBody>
-          <a:bodyPr/>
-          <a:lstStyle/>
-          <a:p>
-            <a:r>
-              <a:rPr lang="en-US" dirty="0" err="1" smtClean="0"/>
-              <a:t>Esse</a:t>
-            </a:r>
-            <a:r>
-              <a:rPr lang="en-US" dirty="0" smtClean="0"/>
-              <a:t> </a:t>
-            </a:r>
-            <a:r>
-              <a:rPr lang="en-US" dirty="0" err="1" smtClean="0"/>
-              <a:t>é</a:t>
-            </a:r>
-            <a:r>
-              <a:rPr lang="en-US" dirty="0" smtClean="0"/>
-              <a:t> o </a:t>
-            </a:r>
-            <a:r>
-              <a:rPr lang="en-US" dirty="0" err="1" smtClean="0"/>
-              <a:t>capítulo</a:t>
-            </a:r>
-            <a:r>
-              <a:rPr lang="en-US" dirty="0" smtClean="0"/>
-              <a:t> de </a:t>
-            </a:r>
-            <a:r>
-              <a:rPr lang="en-US" dirty="0" err="1" smtClean="0"/>
-              <a:t>desenvolvimento</a:t>
-            </a:r>
-            <a:r>
-              <a:rPr lang="en-US" dirty="0" smtClean="0"/>
-              <a:t> do </a:t>
-            </a:r>
-            <a:r>
-              <a:rPr lang="en-US" dirty="0" err="1" smtClean="0"/>
-              <a:t>trabalho</a:t>
-            </a:r>
-            <a:endParaRPr lang="en-US" dirty="0" smtClean="0"/>
-          </a:p>
-          <a:p>
-            <a:endParaRPr lang="en-US" dirty="0"/>
-          </a:p>
-          <a:p>
-            <a:r>
-              <a:rPr lang="en-US" dirty="0" err="1" smtClean="0"/>
-              <a:t>É</a:t>
-            </a:r>
-            <a:r>
-              <a:rPr lang="en-US" dirty="0" smtClean="0"/>
-              <a:t> </a:t>
-            </a:r>
-            <a:r>
-              <a:rPr lang="en-US" dirty="0" err="1" smtClean="0"/>
-              <a:t>aqui</a:t>
-            </a:r>
-            <a:r>
-              <a:rPr lang="en-US" dirty="0" smtClean="0"/>
-              <a:t> </a:t>
-            </a:r>
-            <a:r>
-              <a:rPr lang="en-US" dirty="0" err="1" smtClean="0"/>
-              <a:t>que</a:t>
-            </a:r>
-            <a:r>
-              <a:rPr lang="en-US" dirty="0" smtClean="0"/>
-              <a:t> se </a:t>
-            </a:r>
-            <a:r>
-              <a:rPr lang="en-US" dirty="0" err="1" smtClean="0"/>
-              <a:t>deve</a:t>
-            </a:r>
-            <a:r>
-              <a:rPr lang="en-US" dirty="0" smtClean="0"/>
-              <a:t> </a:t>
-            </a:r>
-            <a:r>
-              <a:rPr lang="en-US" dirty="0" err="1" smtClean="0"/>
-              <a:t>dedicar</a:t>
-            </a:r>
-            <a:r>
-              <a:rPr lang="en-US" dirty="0" smtClean="0"/>
-              <a:t> o </a:t>
-            </a:r>
-            <a:r>
-              <a:rPr lang="en-US" dirty="0" err="1" smtClean="0"/>
-              <a:t>maior</a:t>
-            </a:r>
-            <a:r>
-              <a:rPr lang="en-US" dirty="0" smtClean="0"/>
-              <a:t> tempo da </a:t>
-            </a:r>
-            <a:r>
-              <a:rPr lang="en-US" dirty="0" err="1" smtClean="0"/>
-              <a:t>apresentação</a:t>
-            </a:r>
-            <a:endParaRPr lang="en-US" dirty="0"/>
+              <a:t>Arquitetura da Solução - Front-end</a:t>
+            </a:r>
+            <a:endParaRPr lang="pt-BR" altLang="en-US" dirty="0" err="1" smtClean="0">
+              <a:sym typeface="+mn-ea"/>
+            </a:endParaRPr>
           </a:p>
         </p:txBody>
       </p:sp>
@@ -7069,6 +7084,68 @@
               <a:rPr lang="pt-BR" smtClean="0"/>
             </a:fld>
             <a:endParaRPr lang="pt-BR"/>
+          </a:p>
+        </p:txBody>
+      </p:sp>
+      <p:pic>
+        <p:nvPicPr>
+          <p:cNvPr id="5" name="Picture 2" descr="C:\PROJETOS\documentacaoTG\ArquiteturaSoluçãoFrontEnd.pngArquiteturaSoluçãoFrontEnd"/>
+          <p:cNvPicPr>
+            <a:picLocks noChangeAspect="1"/>
+          </p:cNvPicPr>
+          <p:nvPr>
+            <p:ph idx="1"/>
+          </p:nvPr>
+        </p:nvPicPr>
+        <p:blipFill>
+          <a:blip r:embed="rId1"/>
+          <a:srcRect/>
+          <a:stretch>
+            <a:fillRect/>
+          </a:stretch>
+        </p:blipFill>
+        <p:spPr>
+          <a:xfrm>
+            <a:off x="549910" y="2050415"/>
+            <a:ext cx="7886700" cy="3087370"/>
+          </a:xfrm>
+          <a:prstGeom prst="rect">
+            <a:avLst/>
+          </a:prstGeom>
+          <a:ln>
+            <a:solidFill>
+              <a:schemeClr val="tx1"/>
+            </a:solidFill>
+          </a:ln>
+        </p:spPr>
+      </p:pic>
+      <p:sp>
+        <p:nvSpPr>
+          <p:cNvPr id="13" name="Caixa de Texto 12"/>
+          <p:cNvSpPr txBox="1"/>
+          <p:nvPr/>
+        </p:nvSpPr>
+        <p:spPr>
+          <a:xfrm>
+            <a:off x="549910" y="5368925"/>
+            <a:ext cx="1599565" cy="306705"/>
+          </a:xfrm>
+          <a:prstGeom prst="rect">
+            <a:avLst/>
+          </a:prstGeom>
+          <a:noFill/>
+        </p:spPr>
+        <p:txBody>
+          <a:bodyPr wrap="none" rtlCol="0">
+            <a:spAutoFit/>
+          </a:bodyPr>
+          <a:p>
+            <a:pPr algn="l"/>
+            <a:r>
+              <a:rPr lang="pt-BR" altLang="en-US" sz="1400"/>
+              <a:t>Fonte: Autor (2018)</a:t>
+            </a:r>
+            <a:endParaRPr lang="pt-BR" altLang="en-US" sz="1400"/>
           </a:p>
         </p:txBody>
       </p:sp>
@@ -7088,6 +7165,767 @@
 </file>
 
 <file path=ppt/slides/slide22.xml><?xml version="1.0" encoding="utf-8"?>
+<p:sld xmlns:a="http://schemas.openxmlformats.org/drawingml/2006/main" xmlns:r="http://schemas.openxmlformats.org/officeDocument/2006/relationships" xmlns:p="http://schemas.openxmlformats.org/presentationml/2006/main">
+  <p:cSld>
+    <p:spTree>
+      <p:nvGrpSpPr>
+        <p:cNvPr id="1" name=""/>
+        <p:cNvGrpSpPr/>
+        <p:nvPr/>
+      </p:nvGrpSpPr>
+      <p:grpSpPr/>
+      <p:sp>
+        <p:nvSpPr>
+          <p:cNvPr id="2" name="Título 1"/>
+          <p:cNvSpPr>
+            <a:spLocks noGrp="1"/>
+          </p:cNvSpPr>
+          <p:nvPr>
+            <p:ph type="title"/>
+          </p:nvPr>
+        </p:nvSpPr>
+        <p:spPr>
+          <a:xfrm>
+            <a:off x="628650" y="365125"/>
+            <a:ext cx="7886700" cy="984250"/>
+          </a:xfrm>
+        </p:spPr>
+        <p:txBody>
+          <a:bodyPr/>
+          <a:p>
+            <a:r>
+              <a:rPr lang="en-US"/>
+              <a:t>Arquitetura da Solução - Back-end</a:t>
+            </a:r>
+            <a:endParaRPr lang="en-US"/>
+          </a:p>
+        </p:txBody>
+      </p:sp>
+      <p:sp>
+        <p:nvSpPr>
+          <p:cNvPr id="4" name="Espaço Reservado para Número de Slide 3"/>
+          <p:cNvSpPr>
+            <a:spLocks noGrp="1"/>
+          </p:cNvSpPr>
+          <p:nvPr>
+            <p:ph type="sldNum" sz="quarter" idx="12"/>
+          </p:nvPr>
+        </p:nvSpPr>
+        <p:spPr/>
+        <p:txBody>
+          <a:bodyPr/>
+          <a:p>
+            <a:fld id="{CFCDC573-C9BE-334B-B909-19E2F28512E7}" type="slidenum">
+              <a:rPr lang="pt-BR" smtClean="0"/>
+            </a:fld>
+            <a:endParaRPr lang="pt-BR"/>
+          </a:p>
+        </p:txBody>
+      </p:sp>
+      <p:pic>
+        <p:nvPicPr>
+          <p:cNvPr id="11" name="Picture 11" descr="CONTROLERMODEL"/>
+          <p:cNvPicPr>
+            <a:picLocks noChangeAspect="1"/>
+          </p:cNvPicPr>
+          <p:nvPr>
+            <p:ph idx="1"/>
+          </p:nvPr>
+        </p:nvPicPr>
+        <p:blipFill>
+          <a:blip r:embed="rId1"/>
+          <a:stretch>
+            <a:fillRect/>
+          </a:stretch>
+        </p:blipFill>
+        <p:spPr>
+          <a:xfrm>
+            <a:off x="958850" y="1509395"/>
+            <a:ext cx="7226300" cy="4351655"/>
+          </a:xfrm>
+          <a:prstGeom prst="rect">
+            <a:avLst/>
+          </a:prstGeom>
+          <a:ln>
+            <a:solidFill>
+              <a:schemeClr val="tx1"/>
+            </a:solidFill>
+          </a:ln>
+        </p:spPr>
+      </p:pic>
+      <p:sp>
+        <p:nvSpPr>
+          <p:cNvPr id="13" name="Caixa de Texto 12"/>
+          <p:cNvSpPr txBox="1"/>
+          <p:nvPr/>
+        </p:nvSpPr>
+        <p:spPr>
+          <a:xfrm>
+            <a:off x="958850" y="6049645"/>
+            <a:ext cx="1599565" cy="306705"/>
+          </a:xfrm>
+          <a:prstGeom prst="rect">
+            <a:avLst/>
+          </a:prstGeom>
+          <a:noFill/>
+        </p:spPr>
+        <p:txBody>
+          <a:bodyPr wrap="none" rtlCol="0">
+            <a:spAutoFit/>
+          </a:bodyPr>
+          <a:p>
+            <a:pPr algn="l"/>
+            <a:r>
+              <a:rPr lang="pt-BR" altLang="en-US" sz="1400"/>
+              <a:t>Fonte: Autor (2018)</a:t>
+            </a:r>
+            <a:endParaRPr lang="pt-BR" altLang="en-US" sz="1400"/>
+          </a:p>
+        </p:txBody>
+      </p:sp>
+    </p:spTree>
+  </p:cSld>
+  <p:clrMapOvr>
+    <a:masterClrMapping/>
+  </p:clrMapOvr>
+</p:sld>
+</file>
+
+<file path=ppt/slides/slide23.xml><?xml version="1.0" encoding="utf-8"?>
+<p:sld xmlns:a="http://schemas.openxmlformats.org/drawingml/2006/main" xmlns:r="http://schemas.openxmlformats.org/officeDocument/2006/relationships" xmlns:p="http://schemas.openxmlformats.org/presentationml/2006/main">
+  <p:cSld>
+    <p:spTree>
+      <p:nvGrpSpPr>
+        <p:cNvPr id="1" name=""/>
+        <p:cNvGrpSpPr/>
+        <p:nvPr/>
+      </p:nvGrpSpPr>
+      <p:grpSpPr/>
+      <p:sp>
+        <p:nvSpPr>
+          <p:cNvPr id="2" name="Título 1"/>
+          <p:cNvSpPr>
+            <a:spLocks noGrp="1"/>
+          </p:cNvSpPr>
+          <p:nvPr>
+            <p:ph type="title"/>
+          </p:nvPr>
+        </p:nvSpPr>
+        <p:spPr>
+          <a:xfrm>
+            <a:off x="628650" y="365125"/>
+            <a:ext cx="7886700" cy="1009650"/>
+          </a:xfrm>
+        </p:spPr>
+        <p:txBody>
+          <a:bodyPr>
+            <a:normAutofit fontScale="90000"/>
+          </a:bodyPr>
+          <a:p>
+            <a:r>
+              <a:rPr lang="en-US"/>
+              <a:t>Arquitetura da Solução - Implantação</a:t>
+            </a:r>
+            <a:endParaRPr lang="en-US"/>
+          </a:p>
+        </p:txBody>
+      </p:sp>
+      <p:sp>
+        <p:nvSpPr>
+          <p:cNvPr id="4" name="Espaço Reservado para Número de Slide 3"/>
+          <p:cNvSpPr>
+            <a:spLocks noGrp="1"/>
+          </p:cNvSpPr>
+          <p:nvPr>
+            <p:ph type="sldNum" sz="quarter" idx="12"/>
+          </p:nvPr>
+        </p:nvSpPr>
+        <p:spPr/>
+        <p:txBody>
+          <a:bodyPr/>
+          <a:p>
+            <a:fld id="{CFCDC573-C9BE-334B-B909-19E2F28512E7}" type="slidenum">
+              <a:rPr lang="pt-BR" smtClean="0"/>
+            </a:fld>
+            <a:endParaRPr lang="pt-BR"/>
+          </a:p>
+        </p:txBody>
+      </p:sp>
+      <p:pic>
+        <p:nvPicPr>
+          <p:cNvPr id="18" name="Picture 18" descr="ARQUITETURADEIMPLANTACAO"/>
+          <p:cNvPicPr>
+            <a:picLocks noChangeAspect="1"/>
+          </p:cNvPicPr>
+          <p:nvPr>
+            <p:ph idx="1"/>
+          </p:nvPr>
+        </p:nvPicPr>
+        <p:blipFill>
+          <a:blip r:embed="rId1"/>
+          <a:stretch>
+            <a:fillRect/>
+          </a:stretch>
+        </p:blipFill>
+        <p:spPr>
+          <a:xfrm>
+            <a:off x="1212850" y="1374775"/>
+            <a:ext cx="6717665" cy="4652645"/>
+          </a:xfrm>
+          <a:prstGeom prst="rect">
+            <a:avLst/>
+          </a:prstGeom>
+          <a:ln>
+            <a:solidFill>
+              <a:schemeClr val="tx1"/>
+            </a:solidFill>
+          </a:ln>
+        </p:spPr>
+      </p:pic>
+      <p:sp>
+        <p:nvSpPr>
+          <p:cNvPr id="13" name="Caixa de Texto 12"/>
+          <p:cNvSpPr txBox="1"/>
+          <p:nvPr/>
+        </p:nvSpPr>
+        <p:spPr>
+          <a:xfrm>
+            <a:off x="1212850" y="6049645"/>
+            <a:ext cx="1599565" cy="306705"/>
+          </a:xfrm>
+          <a:prstGeom prst="rect">
+            <a:avLst/>
+          </a:prstGeom>
+          <a:noFill/>
+        </p:spPr>
+        <p:txBody>
+          <a:bodyPr wrap="none" rtlCol="0">
+            <a:spAutoFit/>
+          </a:bodyPr>
+          <a:p>
+            <a:pPr algn="l"/>
+            <a:r>
+              <a:rPr lang="pt-BR" altLang="en-US" sz="1400"/>
+              <a:t>Fonte: Autor (2018)</a:t>
+            </a:r>
+            <a:endParaRPr lang="pt-BR" altLang="en-US" sz="1400"/>
+          </a:p>
+        </p:txBody>
+      </p:sp>
+    </p:spTree>
+  </p:cSld>
+  <p:clrMapOvr>
+    <a:masterClrMapping/>
+  </p:clrMapOvr>
+</p:sld>
+</file>
+
+<file path=ppt/slides/slide24.xml><?xml version="1.0" encoding="utf-8"?>
+<p:sld xmlns:a="http://schemas.openxmlformats.org/drawingml/2006/main" xmlns:r="http://schemas.openxmlformats.org/officeDocument/2006/relationships" xmlns:p="http://schemas.openxmlformats.org/presentationml/2006/main">
+  <p:cSld>
+    <p:spTree>
+      <p:nvGrpSpPr>
+        <p:cNvPr id="1" name=""/>
+        <p:cNvGrpSpPr/>
+        <p:nvPr/>
+      </p:nvGrpSpPr>
+      <p:grpSpPr/>
+      <p:sp>
+        <p:nvSpPr>
+          <p:cNvPr id="2" name="Título 1"/>
+          <p:cNvSpPr>
+            <a:spLocks noGrp="1"/>
+          </p:cNvSpPr>
+          <p:nvPr>
+            <p:ph type="title"/>
+          </p:nvPr>
+        </p:nvSpPr>
+        <p:spPr/>
+        <p:txBody>
+          <a:bodyPr>
+            <a:normAutofit/>
+          </a:bodyPr>
+          <a:p>
+            <a:r>
+              <a:rPr lang="pt-BR" altLang="en-US"/>
+              <a:t>Diagrama de Classe - Rota</a:t>
+            </a:r>
+            <a:endParaRPr lang="pt-BR" altLang="en-US"/>
+          </a:p>
+        </p:txBody>
+      </p:sp>
+      <p:sp>
+        <p:nvSpPr>
+          <p:cNvPr id="3" name="Espaço Reservado para Conteúdo 2"/>
+          <p:cNvSpPr>
+            <a:spLocks noGrp="1"/>
+          </p:cNvSpPr>
+          <p:nvPr>
+            <p:ph idx="1"/>
+          </p:nvPr>
+        </p:nvSpPr>
+        <p:spPr/>
+        <p:txBody>
+          <a:bodyPr/>
+          <a:p>
+            <a:endParaRPr lang="en-US"/>
+          </a:p>
+        </p:txBody>
+      </p:sp>
+      <p:sp>
+        <p:nvSpPr>
+          <p:cNvPr id="4" name="Espaço Reservado para Número de Slide 3"/>
+          <p:cNvSpPr>
+            <a:spLocks noGrp="1"/>
+          </p:cNvSpPr>
+          <p:nvPr>
+            <p:ph type="sldNum" sz="quarter" idx="12"/>
+          </p:nvPr>
+        </p:nvSpPr>
+        <p:spPr/>
+        <p:txBody>
+          <a:bodyPr/>
+          <a:p>
+            <a:fld id="{CFCDC573-C9BE-334B-B909-19E2F28512E7}" type="slidenum">
+              <a:rPr lang="pt-BR" smtClean="0"/>
+            </a:fld>
+            <a:endParaRPr lang="pt-BR"/>
+          </a:p>
+        </p:txBody>
+      </p:sp>
+    </p:spTree>
+  </p:cSld>
+  <p:clrMapOvr>
+    <a:masterClrMapping/>
+  </p:clrMapOvr>
+</p:sld>
+</file>
+
+<file path=ppt/slides/slide25.xml><?xml version="1.0" encoding="utf-8"?>
+<p:sld xmlns:a="http://schemas.openxmlformats.org/drawingml/2006/main" xmlns:r="http://schemas.openxmlformats.org/officeDocument/2006/relationships" xmlns:p="http://schemas.openxmlformats.org/presentationml/2006/main">
+  <p:cSld>
+    <p:spTree>
+      <p:nvGrpSpPr>
+        <p:cNvPr id="1" name=""/>
+        <p:cNvGrpSpPr/>
+        <p:nvPr/>
+      </p:nvGrpSpPr>
+      <p:grpSpPr/>
+      <p:sp>
+        <p:nvSpPr>
+          <p:cNvPr id="2" name="Título 1"/>
+          <p:cNvSpPr>
+            <a:spLocks noGrp="1"/>
+          </p:cNvSpPr>
+          <p:nvPr>
+            <p:ph type="title"/>
+          </p:nvPr>
+        </p:nvSpPr>
+        <p:spPr>
+          <a:xfrm>
+            <a:off x="628650" y="365125"/>
+            <a:ext cx="7886700" cy="641985"/>
+          </a:xfrm>
+        </p:spPr>
+        <p:txBody>
+          <a:bodyPr>
+            <a:normAutofit fontScale="90000"/>
+          </a:bodyPr>
+          <a:p>
+            <a:r>
+              <a:rPr lang="pt-BR" altLang="en-US"/>
+              <a:t>Modelo Entidade Relacionamento</a:t>
+            </a:r>
+            <a:endParaRPr lang="pt-BR" altLang="en-US"/>
+          </a:p>
+        </p:txBody>
+      </p:sp>
+      <p:sp>
+        <p:nvSpPr>
+          <p:cNvPr id="4" name="Espaço Reservado para Número de Slide 3"/>
+          <p:cNvSpPr>
+            <a:spLocks noGrp="1"/>
+          </p:cNvSpPr>
+          <p:nvPr>
+            <p:ph type="sldNum" sz="quarter" idx="12"/>
+          </p:nvPr>
+        </p:nvSpPr>
+        <p:spPr/>
+        <p:txBody>
+          <a:bodyPr/>
+          <a:p>
+            <a:fld id="{CFCDC573-C9BE-334B-B909-19E2F28512E7}" type="slidenum">
+              <a:rPr lang="pt-BR" smtClean="0"/>
+            </a:fld>
+            <a:endParaRPr lang="pt-BR"/>
+          </a:p>
+        </p:txBody>
+      </p:sp>
+      <p:pic>
+        <p:nvPicPr>
+          <p:cNvPr id="28" name="Picture 28" descr="C:\Users\jintahibari\Documents\FACULDADE\TRABALHO DE GRADUACAO\documentacaoTG\BD.pngBD"/>
+          <p:cNvPicPr>
+            <a:picLocks noChangeAspect="1"/>
+          </p:cNvPicPr>
+          <p:nvPr>
+            <p:ph idx="1"/>
+          </p:nvPr>
+        </p:nvPicPr>
+        <p:blipFill>
+          <a:blip r:embed="rId1"/>
+          <a:srcRect/>
+          <a:stretch>
+            <a:fillRect/>
+          </a:stretch>
+        </p:blipFill>
+        <p:spPr>
+          <a:xfrm>
+            <a:off x="1635125" y="1057275"/>
+            <a:ext cx="5584190" cy="5469255"/>
+          </a:xfrm>
+          <a:prstGeom prst="rect">
+            <a:avLst/>
+          </a:prstGeom>
+          <a:ln>
+            <a:solidFill>
+              <a:schemeClr val="tx1"/>
+            </a:solidFill>
+          </a:ln>
+        </p:spPr>
+      </p:pic>
+    </p:spTree>
+  </p:cSld>
+  <p:clrMapOvr>
+    <a:masterClrMapping/>
+  </p:clrMapOvr>
+</p:sld>
+</file>
+
+<file path=ppt/slides/slide26.xml><?xml version="1.0" encoding="utf-8"?>
+<p:sld xmlns:a="http://schemas.openxmlformats.org/drawingml/2006/main" xmlns:r="http://schemas.openxmlformats.org/officeDocument/2006/relationships" xmlns:p="http://schemas.openxmlformats.org/presentationml/2006/main">
+  <p:cSld>
+    <p:spTree>
+      <p:nvGrpSpPr>
+        <p:cNvPr id="1" name=""/>
+        <p:cNvGrpSpPr/>
+        <p:nvPr/>
+      </p:nvGrpSpPr>
+      <p:grpSpPr/>
+      <p:sp>
+        <p:nvSpPr>
+          <p:cNvPr id="2" name="Título 1"/>
+          <p:cNvSpPr>
+            <a:spLocks noGrp="1"/>
+          </p:cNvSpPr>
+          <p:nvPr>
+            <p:ph type="title"/>
+          </p:nvPr>
+        </p:nvSpPr>
+        <p:spPr/>
+        <p:txBody>
+          <a:bodyPr/>
+          <a:p>
+            <a:r>
+              <a:rPr lang="pt-BR" altLang="en-US"/>
+              <a:t>Dicionário de Dados - Tabela Rota</a:t>
+            </a:r>
+            <a:endParaRPr lang="pt-BR" altLang="en-US"/>
+          </a:p>
+        </p:txBody>
+      </p:sp>
+      <p:sp>
+        <p:nvSpPr>
+          <p:cNvPr id="4" name="Espaço Reservado para Número de Slide 3"/>
+          <p:cNvSpPr>
+            <a:spLocks noGrp="1"/>
+          </p:cNvSpPr>
+          <p:nvPr>
+            <p:ph type="sldNum" sz="quarter" idx="12"/>
+          </p:nvPr>
+        </p:nvSpPr>
+        <p:spPr/>
+        <p:txBody>
+          <a:bodyPr/>
+          <a:p>
+            <a:fld id="{CFCDC573-C9BE-334B-B909-19E2F28512E7}" type="slidenum">
+              <a:rPr lang="pt-BR" smtClean="0"/>
+            </a:fld>
+            <a:endParaRPr lang="pt-BR"/>
+          </a:p>
+        </p:txBody>
+      </p:sp>
+      <p:pic>
+        <p:nvPicPr>
+          <p:cNvPr id="6" name="Espaço Reservado para Conteúdo 5"/>
+          <p:cNvPicPr>
+            <a:picLocks noChangeAspect="1"/>
+          </p:cNvPicPr>
+          <p:nvPr>
+            <p:ph idx="1"/>
+          </p:nvPr>
+        </p:nvPicPr>
+        <p:blipFill>
+          <a:blip r:embed="rId1"/>
+          <a:srcRect l="2779" r="18597" b="6320"/>
+          <a:stretch>
+            <a:fillRect/>
+          </a:stretch>
+        </p:blipFill>
+        <p:spPr>
+          <a:xfrm>
+            <a:off x="922655" y="1860550"/>
+            <a:ext cx="7299325" cy="3136265"/>
+          </a:xfrm>
+          <a:prstGeom prst="rect">
+            <a:avLst/>
+          </a:prstGeom>
+        </p:spPr>
+      </p:pic>
+      <p:sp>
+        <p:nvSpPr>
+          <p:cNvPr id="13" name="Caixa de Texto 12"/>
+          <p:cNvSpPr txBox="1"/>
+          <p:nvPr/>
+        </p:nvSpPr>
+        <p:spPr>
+          <a:xfrm>
+            <a:off x="922655" y="5114925"/>
+            <a:ext cx="1599565" cy="306705"/>
+          </a:xfrm>
+          <a:prstGeom prst="rect">
+            <a:avLst/>
+          </a:prstGeom>
+          <a:noFill/>
+        </p:spPr>
+        <p:txBody>
+          <a:bodyPr wrap="none" rtlCol="0">
+            <a:spAutoFit/>
+          </a:bodyPr>
+          <a:p>
+            <a:pPr algn="l"/>
+            <a:r>
+              <a:rPr lang="pt-BR" altLang="en-US" sz="1400"/>
+              <a:t>Fonte: Autor (2018)</a:t>
+            </a:r>
+            <a:endParaRPr lang="pt-BR" altLang="en-US" sz="1400"/>
+          </a:p>
+        </p:txBody>
+      </p:sp>
+    </p:spTree>
+  </p:cSld>
+  <p:clrMapOvr>
+    <a:masterClrMapping/>
+  </p:clrMapOvr>
+</p:sld>
+</file>
+
+<file path=ppt/slides/slide27.xml><?xml version="1.0" encoding="utf-8"?>
+<p:sld xmlns:a="http://schemas.openxmlformats.org/drawingml/2006/main" xmlns:r="http://schemas.openxmlformats.org/officeDocument/2006/relationships" xmlns:p="http://schemas.openxmlformats.org/presentationml/2006/main">
+  <p:cSld>
+    <p:spTree>
+      <p:nvGrpSpPr>
+        <p:cNvPr id="1" name=""/>
+        <p:cNvGrpSpPr/>
+        <p:nvPr/>
+      </p:nvGrpSpPr>
+      <p:grpSpPr/>
+      <p:sp>
+        <p:nvSpPr>
+          <p:cNvPr id="2" name="Título 1"/>
+          <p:cNvSpPr>
+            <a:spLocks noGrp="1"/>
+          </p:cNvSpPr>
+          <p:nvPr>
+            <p:ph type="title"/>
+          </p:nvPr>
+        </p:nvSpPr>
+        <p:spPr>
+          <a:xfrm>
+            <a:off x="628650" y="365125"/>
+            <a:ext cx="7886700" cy="984250"/>
+          </a:xfrm>
+        </p:spPr>
+        <p:txBody>
+          <a:bodyPr/>
+          <a:p>
+            <a:r>
+              <a:rPr lang="en-US"/>
+              <a:t>Visão Geral - Segurança</a:t>
+            </a:r>
+            <a:endParaRPr lang="en-US"/>
+          </a:p>
+        </p:txBody>
+      </p:sp>
+      <p:sp>
+        <p:nvSpPr>
+          <p:cNvPr id="4" name="Espaço Reservado para Número de Slide 3"/>
+          <p:cNvSpPr>
+            <a:spLocks noGrp="1"/>
+          </p:cNvSpPr>
+          <p:nvPr>
+            <p:ph type="sldNum" sz="quarter" idx="12"/>
+          </p:nvPr>
+        </p:nvSpPr>
+        <p:spPr/>
+        <p:txBody>
+          <a:bodyPr/>
+          <a:p>
+            <a:fld id="{CFCDC573-C9BE-334B-B909-19E2F28512E7}" type="slidenum">
+              <a:rPr lang="pt-BR" smtClean="0"/>
+            </a:fld>
+            <a:endParaRPr lang="pt-BR"/>
+          </a:p>
+        </p:txBody>
+      </p:sp>
+      <p:pic>
+        <p:nvPicPr>
+          <p:cNvPr id="29" name="Picture 29" descr="Segurança"/>
+          <p:cNvPicPr>
+            <a:picLocks noChangeAspect="1"/>
+          </p:cNvPicPr>
+          <p:nvPr>
+            <p:ph idx="1"/>
+          </p:nvPr>
+        </p:nvPicPr>
+        <p:blipFill>
+          <a:blip r:embed="rId1"/>
+          <a:stretch>
+            <a:fillRect/>
+          </a:stretch>
+        </p:blipFill>
+        <p:spPr>
+          <a:xfrm>
+            <a:off x="456565" y="1456690"/>
+            <a:ext cx="8231505" cy="4378325"/>
+          </a:xfrm>
+          <a:prstGeom prst="rect">
+            <a:avLst/>
+          </a:prstGeom>
+          <a:ln>
+            <a:solidFill>
+              <a:schemeClr val="tx1"/>
+            </a:solidFill>
+          </a:ln>
+        </p:spPr>
+      </p:pic>
+      <p:sp>
+        <p:nvSpPr>
+          <p:cNvPr id="13" name="Caixa de Texto 12"/>
+          <p:cNvSpPr txBox="1"/>
+          <p:nvPr/>
+        </p:nvSpPr>
+        <p:spPr>
+          <a:xfrm>
+            <a:off x="456565" y="6049645"/>
+            <a:ext cx="1599565" cy="306705"/>
+          </a:xfrm>
+          <a:prstGeom prst="rect">
+            <a:avLst/>
+          </a:prstGeom>
+          <a:noFill/>
+        </p:spPr>
+        <p:txBody>
+          <a:bodyPr wrap="none" rtlCol="0">
+            <a:spAutoFit/>
+          </a:bodyPr>
+          <a:p>
+            <a:pPr algn="l"/>
+            <a:r>
+              <a:rPr lang="pt-BR" altLang="en-US" sz="1400"/>
+              <a:t>Fonte: Autor (2018)</a:t>
+            </a:r>
+            <a:endParaRPr lang="pt-BR" altLang="en-US" sz="1400"/>
+          </a:p>
+        </p:txBody>
+      </p:sp>
+    </p:spTree>
+  </p:cSld>
+  <p:clrMapOvr>
+    <a:masterClrMapping/>
+  </p:clrMapOvr>
+</p:sld>
+</file>
+
+<file path=ppt/slides/slide28.xml><?xml version="1.0" encoding="utf-8"?>
+<p:sld xmlns:a="http://schemas.openxmlformats.org/drawingml/2006/main" xmlns:r="http://schemas.openxmlformats.org/officeDocument/2006/relationships" xmlns:p="http://schemas.openxmlformats.org/presentationml/2006/main">
+  <p:cSld>
+    <p:spTree>
+      <p:nvGrpSpPr>
+        <p:cNvPr id="1" name=""/>
+        <p:cNvGrpSpPr/>
+        <p:nvPr/>
+      </p:nvGrpSpPr>
+      <p:grpSpPr/>
+      <p:sp>
+        <p:nvSpPr>
+          <p:cNvPr id="2" name="Título 1"/>
+          <p:cNvSpPr>
+            <a:spLocks noGrp="1"/>
+          </p:cNvSpPr>
+          <p:nvPr>
+            <p:ph type="title"/>
+          </p:nvPr>
+        </p:nvSpPr>
+        <p:spPr/>
+        <p:txBody>
+          <a:bodyPr/>
+          <a:p>
+            <a:r>
+              <a:rPr lang="pt-BR" altLang="en-US"/>
+              <a:t>Apresentação do Sistema</a:t>
+            </a:r>
+            <a:endParaRPr lang="pt-BR" altLang="en-US"/>
+          </a:p>
+        </p:txBody>
+      </p:sp>
+      <p:sp>
+        <p:nvSpPr>
+          <p:cNvPr id="3" name="Espaço Reservado para Conteúdo 2"/>
+          <p:cNvSpPr>
+            <a:spLocks noGrp="1"/>
+          </p:cNvSpPr>
+          <p:nvPr>
+            <p:ph idx="1"/>
+          </p:nvPr>
+        </p:nvSpPr>
+        <p:spPr/>
+        <p:txBody>
+          <a:bodyPr/>
+          <a:p>
+            <a:endParaRPr lang="en-US"/>
+          </a:p>
+        </p:txBody>
+      </p:sp>
+      <p:sp>
+        <p:nvSpPr>
+          <p:cNvPr id="4" name="Espaço Reservado para Número de Slide 3"/>
+          <p:cNvSpPr>
+            <a:spLocks noGrp="1"/>
+          </p:cNvSpPr>
+          <p:nvPr>
+            <p:ph type="sldNum" sz="quarter" idx="12"/>
+          </p:nvPr>
+        </p:nvSpPr>
+        <p:spPr/>
+        <p:txBody>
+          <a:bodyPr/>
+          <a:p>
+            <a:fld id="{CFCDC573-C9BE-334B-B909-19E2F28512E7}" type="slidenum">
+              <a:rPr lang="pt-BR" smtClean="0"/>
+            </a:fld>
+            <a:endParaRPr lang="pt-BR"/>
+          </a:p>
+        </p:txBody>
+      </p:sp>
+    </p:spTree>
+  </p:cSld>
+  <p:clrMapOvr>
+    <a:masterClrMapping/>
+  </p:clrMapOvr>
+</p:sld>
+</file>
+
+<file path=ppt/slides/slide29.xml><?xml version="1.0" encoding="utf-8"?>
 <p:sld xmlns:a="http://schemas.openxmlformats.org/drawingml/2006/main" xmlns:r="http://schemas.openxmlformats.org/officeDocument/2006/relationships" xmlns:p="http://schemas.openxmlformats.org/presentationml/2006/main">
   <p:cSld>
     <p:spTree>
@@ -7373,7 +8211,7 @@
 </p:sld>
 </file>
 
-<file path=ppt/slides/slide23.xml><?xml version="1.0" encoding="utf-8"?>
+<file path=ppt/slides/slide3.xml><?xml version="1.0" encoding="utf-8"?>
 <p:sld xmlns:a="http://schemas.openxmlformats.org/drawingml/2006/main" xmlns:r="http://schemas.openxmlformats.org/officeDocument/2006/relationships" xmlns:p="http://schemas.openxmlformats.org/presentationml/2006/main">
   <p:cSld>
     <p:spTree>
@@ -7392,26 +8230,49 @@
       </p:grpSpPr>
       <p:sp>
         <p:nvSpPr>
-          <p:cNvPr id="2" name="Title 1"/>
-          <p:cNvSpPr>
-            <a:spLocks noGrp="1"/>
-          </p:cNvSpPr>
-          <p:nvPr>
-            <p:ph type="title"/>
-          </p:nvPr>
-        </p:nvSpPr>
-        <p:spPr/>
-        <p:txBody>
-          <a:bodyPr>
-            <a:normAutofit fontScale="90000"/>
-          </a:bodyPr>
+          <p:cNvPr id="4" name="Rectangle 3"/>
+          <p:cNvSpPr/>
+          <p:nvPr/>
+        </p:nvSpPr>
+        <p:spPr>
+          <a:xfrm>
+            <a:off x="628650" y="1825628"/>
+            <a:ext cx="7886700" cy="417513"/>
+          </a:xfrm>
+          <a:prstGeom prst="rect">
+            <a:avLst/>
+          </a:prstGeom>
+          <a:solidFill>
+            <a:schemeClr val="accent2">
+              <a:alpha val="40000"/>
+            </a:schemeClr>
+          </a:solidFill>
+          <a:ln>
+            <a:noFill/>
+          </a:ln>
+        </p:spPr>
+        <p:style>
+          <a:lnRef idx="2">
+            <a:schemeClr val="accent1">
+              <a:shade val="50000"/>
+            </a:schemeClr>
+          </a:lnRef>
+          <a:fillRef idx="1">
+            <a:schemeClr val="accent1"/>
+          </a:fillRef>
+          <a:effectRef idx="0">
+            <a:schemeClr val="accent1"/>
+          </a:effectRef>
+          <a:fontRef idx="minor">
+            <a:schemeClr val="lt1"/>
+          </a:fontRef>
+        </p:style>
+        <p:txBody>
+          <a:bodyPr rtlCol="0" anchor="ctr"/>
           <a:lstStyle/>
           <a:p>
-            <a:r>
-              <a:rPr lang="en-US" smtClean="0"/>
-              <a:t>Validação e Análise dos Resultados Obtidos</a:t>
-            </a:r>
-            <a:endParaRPr lang="en-US" smtClean="0"/>
+            <a:pPr algn="ctr"/>
+            <a:endParaRPr lang="pt-BR"/>
           </a:p>
         </p:txBody>
       </p:sp>
@@ -7427,74 +8288,238 @@
         </p:nvSpPr>
         <p:spPr/>
         <p:txBody>
-          <a:bodyPr/>
+          <a:bodyPr anchor="ctr"/>
           <a:lstStyle/>
           <a:p>
             <a:r>
-              <a:rPr lang="pt-BR" dirty="0"/>
-              <a:t>Textos com, no m</a:t>
-            </a:r>
-            <a:r>
-              <a:rPr lang="en-US" dirty="0" err="1"/>
-              <a:t>áximo</a:t>
-            </a:r>
-            <a:r>
-              <a:rPr lang="en-US" dirty="0"/>
-              <a:t>, 3 </a:t>
-            </a:r>
-            <a:r>
-              <a:rPr lang="en-US" dirty="0" err="1"/>
-              <a:t>linhas</a:t>
-            </a:r>
-            <a:endParaRPr lang="en-US" dirty="0"/>
-          </a:p>
-          <a:p>
-            <a:endParaRPr lang="en-US" dirty="0"/>
-          </a:p>
-          <a:p>
-            <a:r>
-              <a:rPr lang="en-US" dirty="0"/>
-              <a:t>No </a:t>
-            </a:r>
-            <a:r>
-              <a:rPr lang="en-US" dirty="0" err="1"/>
-              <a:t>máximo</a:t>
-            </a:r>
-            <a:r>
-              <a:rPr lang="en-US" dirty="0"/>
+              <a:rPr lang="pt-BR" dirty="0" err="1" smtClean="0"/>
+              <a:t>Introduç</a:t>
+            </a:r>
+            <a:r>
+              <a:rPr lang="en-US" dirty="0" err="1" smtClean="0"/>
+              <a:t>ão</a:t>
+            </a:r>
+            <a:endParaRPr lang="en-US" dirty="0" smtClean="0"/>
+          </a:p>
+          <a:p>
+            <a:r>
+              <a:rPr lang="en-US" dirty="0" err="1" smtClean="0">
+                <a:solidFill>
+                  <a:schemeClr val="bg1">
+                    <a:lumMod val="50000"/>
+                  </a:schemeClr>
+                </a:solidFill>
+              </a:rPr>
+              <a:t>Objetivo</a:t>
+            </a:r>
+            <a:endParaRPr lang="en-US" dirty="0" smtClean="0">
+              <a:solidFill>
+                <a:schemeClr val="bg1">
+                  <a:lumMod val="50000"/>
+                </a:schemeClr>
+              </a:solidFill>
+            </a:endParaRPr>
+          </a:p>
+          <a:p>
+            <a:r>
+              <a:rPr lang="en-US" dirty="0" err="1" smtClean="0">
+                <a:solidFill>
+                  <a:schemeClr val="bg1">
+                    <a:lumMod val="50000"/>
+                  </a:schemeClr>
+                </a:solidFill>
+              </a:rPr>
+              <a:t>Fundamentação</a:t>
+            </a:r>
+            <a:r>
+              <a:rPr lang="en-US" dirty="0" smtClean="0">
+                <a:solidFill>
+                  <a:schemeClr val="bg1">
+                    <a:lumMod val="50000"/>
+                  </a:schemeClr>
+                </a:solidFill>
+              </a:rPr>
               <a:t> </a:t>
             </a:r>
             <a:r>
-              <a:rPr lang="en-US" dirty="0" err="1"/>
-              <a:t>dois</a:t>
-            </a:r>
-            <a:r>
-              <a:rPr lang="en-US" dirty="0"/>
+              <a:rPr lang="en-US" dirty="0" err="1" smtClean="0">
+                <a:solidFill>
+                  <a:schemeClr val="bg1">
+                    <a:lumMod val="50000"/>
+                  </a:schemeClr>
+                </a:solidFill>
+              </a:rPr>
+              <a:t>Teórica</a:t>
+            </a:r>
+            <a:endParaRPr lang="en-US" dirty="0" smtClean="0">
+              <a:solidFill>
+                <a:schemeClr val="bg1">
+                  <a:lumMod val="50000"/>
+                </a:schemeClr>
+              </a:solidFill>
+            </a:endParaRPr>
+          </a:p>
+          <a:p>
+            <a:r>
+              <a:rPr lang="en-US" dirty="0" err="1" smtClean="0">
+                <a:solidFill>
+                  <a:schemeClr val="bg1">
+                    <a:lumMod val="50000"/>
+                  </a:schemeClr>
+                </a:solidFill>
+              </a:rPr>
+              <a:t>Título</a:t>
+            </a:r>
+            <a:r>
+              <a:rPr lang="en-US" dirty="0" smtClean="0">
+                <a:solidFill>
+                  <a:schemeClr val="bg1">
+                    <a:lumMod val="50000"/>
+                  </a:schemeClr>
+                </a:solidFill>
+              </a:rPr>
               <a:t> </a:t>
             </a:r>
             <a:r>
-              <a:rPr lang="en-US" dirty="0" err="1"/>
-              <a:t>tópicos</a:t>
-            </a:r>
-            <a:r>
-              <a:rPr lang="en-US" dirty="0"/>
+              <a:rPr lang="en-US" dirty="0" err="1" smtClean="0">
+                <a:solidFill>
+                  <a:schemeClr val="bg1">
+                    <a:lumMod val="50000"/>
+                  </a:schemeClr>
+                </a:solidFill>
+              </a:rPr>
+              <a:t>Capítulo</a:t>
+            </a:r>
+            <a:r>
+              <a:rPr lang="en-US" dirty="0" smtClean="0">
+                <a:solidFill>
+                  <a:schemeClr val="bg1">
+                    <a:lumMod val="50000"/>
+                  </a:schemeClr>
+                </a:solidFill>
+              </a:rPr>
+              <a:t> 3</a:t>
+            </a:r>
+            <a:endParaRPr lang="en-US" dirty="0" smtClean="0">
+              <a:solidFill>
+                <a:schemeClr val="bg1">
+                  <a:lumMod val="50000"/>
+                </a:schemeClr>
+              </a:solidFill>
+            </a:endParaRPr>
+          </a:p>
+          <a:p>
+            <a:r>
+              <a:rPr lang="en-US" dirty="0" err="1" smtClean="0">
+                <a:solidFill>
+                  <a:schemeClr val="bg1">
+                    <a:lumMod val="50000"/>
+                  </a:schemeClr>
+                </a:solidFill>
+              </a:rPr>
+              <a:t>Título</a:t>
+            </a:r>
+            <a:r>
+              <a:rPr lang="en-US" dirty="0" smtClean="0">
+                <a:solidFill>
+                  <a:schemeClr val="bg1">
+                    <a:lumMod val="50000"/>
+                  </a:schemeClr>
+                </a:solidFill>
+              </a:rPr>
               <a:t> </a:t>
             </a:r>
             <a:r>
-              <a:rPr lang="en-US" dirty="0" err="1"/>
-              <a:t>por</a:t>
-            </a:r>
-            <a:r>
-              <a:rPr lang="en-US" dirty="0"/>
-              <a:t> slide</a:t>
-            </a:r>
-            <a:endParaRPr lang="en-US" dirty="0"/>
-          </a:p>
-        </p:txBody>
-      </p:sp>
-      <p:sp>
-        <p:nvSpPr>
-          <p:cNvPr id="4" name="Slide Number Placeholder 3"/>
+              <a:rPr lang="en-US" dirty="0" err="1" smtClean="0">
+                <a:solidFill>
+                  <a:schemeClr val="bg1">
+                    <a:lumMod val="50000"/>
+                  </a:schemeClr>
+                </a:solidFill>
+              </a:rPr>
+              <a:t>Capítulo</a:t>
+            </a:r>
+            <a:r>
+              <a:rPr lang="en-US" dirty="0" smtClean="0">
+                <a:solidFill>
+                  <a:schemeClr val="bg1">
+                    <a:lumMod val="50000"/>
+                  </a:schemeClr>
+                </a:solidFill>
+              </a:rPr>
+              <a:t> 4</a:t>
+            </a:r>
+            <a:endParaRPr lang="en-US" dirty="0" smtClean="0">
+              <a:solidFill>
+                <a:schemeClr val="bg1">
+                  <a:lumMod val="50000"/>
+                </a:schemeClr>
+              </a:solidFill>
+            </a:endParaRPr>
+          </a:p>
+          <a:p>
+            <a:r>
+              <a:rPr lang="en-US" dirty="0" err="1" smtClean="0">
+                <a:solidFill>
+                  <a:schemeClr val="bg1">
+                    <a:lumMod val="50000"/>
+                  </a:schemeClr>
+                </a:solidFill>
+              </a:rPr>
+              <a:t>Considerações</a:t>
+            </a:r>
+            <a:r>
+              <a:rPr lang="en-US" dirty="0" smtClean="0">
+                <a:solidFill>
+                  <a:schemeClr val="bg1">
+                    <a:lumMod val="50000"/>
+                  </a:schemeClr>
+                </a:solidFill>
+              </a:rPr>
+              <a:t> </a:t>
+            </a:r>
+            <a:r>
+              <a:rPr lang="en-US" dirty="0" err="1" smtClean="0">
+                <a:solidFill>
+                  <a:schemeClr val="bg1">
+                    <a:lumMod val="50000"/>
+                  </a:schemeClr>
+                </a:solidFill>
+              </a:rPr>
+              <a:t>Finais</a:t>
+            </a:r>
+            <a:endParaRPr lang="en-US" dirty="0" smtClean="0">
+              <a:solidFill>
+                <a:schemeClr val="bg1">
+                  <a:lumMod val="50000"/>
+                </a:schemeClr>
+              </a:solidFill>
+            </a:endParaRPr>
+          </a:p>
+          <a:p>
+            <a:r>
+              <a:rPr lang="en-US" dirty="0" err="1" smtClean="0">
+                <a:solidFill>
+                  <a:schemeClr val="bg1">
+                    <a:lumMod val="50000"/>
+                  </a:schemeClr>
+                </a:solidFill>
+              </a:rPr>
+              <a:t>Referências</a:t>
+            </a:r>
+            <a:endParaRPr lang="pt-BR" dirty="0">
+              <a:solidFill>
+                <a:schemeClr val="bg1">
+                  <a:lumMod val="50000"/>
+                </a:schemeClr>
+              </a:solidFill>
+            </a:endParaRPr>
+          </a:p>
+        </p:txBody>
+      </p:sp>
+      <p:sp>
+        <p:nvSpPr>
+          <p:cNvPr id="5" name="Slide Number Placeholder 4"/>
           <p:cNvSpPr>
             <a:spLocks noGrp="1"/>
           </p:cNvSpPr>
@@ -7511,6 +8536,159 @@
               <a:rPr lang="pt-BR" smtClean="0"/>
             </a:fld>
             <a:endParaRPr lang="pt-BR"/>
+          </a:p>
+        </p:txBody>
+      </p:sp>
+    </p:spTree>
+  </p:cSld>
+  <p:clrMapOvr>
+    <a:masterClrMapping/>
+  </p:clrMapOvr>
+  <mc:AlternateContent xmlns:mc="http://schemas.openxmlformats.org/markup-compatibility/2006">
+    <mc:Choice xmlns:p14="http://schemas.microsoft.com/office/powerpoint/2010/main" Requires="p14">
+      <p:transition p14:dur="250">
+        <p:fade/>
+      </p:transition>
+    </mc:Choice>
+    <mc:Fallback>
+      <p:transition>
+        <p:fade/>
+      </p:transition>
+    </mc:Fallback>
+  </mc:AlternateContent>
+  <p:timing>
+    <p:tnLst>
+      <p:par>
+        <p:cTn id="1" dur="indefinite" restart="never" nodeType="tmRoot"/>
+      </p:par>
+    </p:tnLst>
+  </p:timing>
+</p:sld>
+</file>
+
+<file path=ppt/slides/slide30.xml><?xml version="1.0" encoding="utf-8"?>
+<p:sld xmlns:a="http://schemas.openxmlformats.org/drawingml/2006/main" xmlns:r="http://schemas.openxmlformats.org/officeDocument/2006/relationships" xmlns:p="http://schemas.openxmlformats.org/presentationml/2006/main">
+  <p:cSld>
+    <p:spTree>
+      <p:nvGrpSpPr>
+        <p:cNvPr id="1" name=""/>
+        <p:cNvGrpSpPr/>
+        <p:nvPr/>
+      </p:nvGrpSpPr>
+      <p:grpSpPr>
+        <a:xfrm>
+          <a:off x="0" y="0"/>
+          <a:ext cx="0" cy="0"/>
+          <a:chOff x="0" y="0"/>
+          <a:chExt cx="0" cy="0"/>
+        </a:xfrm>
+      </p:grpSpPr>
+      <p:sp>
+        <p:nvSpPr>
+          <p:cNvPr id="2" name="Title 1"/>
+          <p:cNvSpPr>
+            <a:spLocks noGrp="1"/>
+          </p:cNvSpPr>
+          <p:nvPr>
+            <p:ph type="title"/>
+          </p:nvPr>
+        </p:nvSpPr>
+        <p:spPr/>
+        <p:txBody>
+          <a:bodyPr>
+            <a:normAutofit/>
+          </a:bodyPr>
+          <a:lstStyle/>
+          <a:p>
+            <a:r>
+              <a:rPr lang="en-US" smtClean="0"/>
+              <a:t>Resultados das Métricas Back-end</a:t>
+            </a:r>
+            <a:endParaRPr lang="en-US" smtClean="0"/>
+          </a:p>
+        </p:txBody>
+      </p:sp>
+      <p:sp>
+        <p:nvSpPr>
+          <p:cNvPr id="4" name="Slide Number Placeholder 3"/>
+          <p:cNvSpPr>
+            <a:spLocks noGrp="1"/>
+          </p:cNvSpPr>
+          <p:nvPr>
+            <p:ph type="sldNum" sz="quarter" idx="12"/>
+          </p:nvPr>
+        </p:nvSpPr>
+        <p:spPr/>
+        <p:txBody>
+          <a:bodyPr/>
+          <a:lstStyle/>
+          <a:p>
+            <a:fld id="{CFCDC573-C9BE-334B-B909-19E2F28512E7}" type="slidenum">
+              <a:rPr lang="pt-BR" smtClean="0"/>
+            </a:fld>
+            <a:endParaRPr lang="pt-BR"/>
+          </a:p>
+        </p:txBody>
+      </p:sp>
+      <p:pic>
+        <p:nvPicPr>
+          <p:cNvPr id="6" name="Imagem 68" descr="4.1.4"/>
+          <p:cNvPicPr>
+            <a:picLocks noChangeAspect="1"/>
+          </p:cNvPicPr>
+          <p:nvPr>
+            <p:ph idx="1"/>
+          </p:nvPr>
+        </p:nvPicPr>
+        <p:blipFill>
+          <a:blip r:embed="rId1"/>
+          <a:srcRect r="25808"/>
+          <a:stretch>
+            <a:fillRect/>
+          </a:stretch>
+        </p:blipFill>
+        <p:spPr>
+          <a:xfrm>
+            <a:off x="1678940" y="1562100"/>
+            <a:ext cx="5561330" cy="4535805"/>
+          </a:xfrm>
+          <a:prstGeom prst="rect">
+            <a:avLst/>
+          </a:prstGeom>
+          <a:ln>
+            <a:solidFill>
+              <a:schemeClr val="tx1"/>
+            </a:solidFill>
+          </a:ln>
+        </p:spPr>
+      </p:pic>
+      <p:sp>
+        <p:nvSpPr>
+          <p:cNvPr id="13" name="Caixa de Texto 12"/>
+          <p:cNvSpPr txBox="1"/>
+          <p:nvPr/>
+        </p:nvSpPr>
+        <p:spPr>
+          <a:xfrm>
+            <a:off x="1678940" y="6181090"/>
+            <a:ext cx="1599565" cy="306705"/>
+          </a:xfrm>
+          <a:prstGeom prst="rect">
+            <a:avLst/>
+          </a:prstGeom>
+          <a:noFill/>
+        </p:spPr>
+        <p:txBody>
+          <a:bodyPr wrap="none" rtlCol="0">
+            <a:spAutoFit/>
+          </a:bodyPr>
+          <a:p>
+            <a:pPr algn="l"/>
+            <a:r>
+              <a:rPr lang="pt-BR" altLang="en-US" sz="1400"/>
+              <a:t>Fonte: Autor (2018)</a:t>
+            </a:r>
+            <a:endParaRPr lang="pt-BR" altLang="en-US" sz="1400"/>
           </a:p>
         </p:txBody>
       </p:sp>
@@ -7529,7 +8707,1457 @@
 </p:sld>
 </file>
 
-<file path=ppt/slides/slide24.xml><?xml version="1.0" encoding="utf-8"?>
+<file path=ppt/slides/slide31.xml><?xml version="1.0" encoding="utf-8"?>
+<p:sld xmlns:a="http://schemas.openxmlformats.org/drawingml/2006/main" xmlns:r="http://schemas.openxmlformats.org/officeDocument/2006/relationships" xmlns:p="http://schemas.openxmlformats.org/presentationml/2006/main">
+  <p:cSld>
+    <p:spTree>
+      <p:nvGrpSpPr>
+        <p:cNvPr id="1" name=""/>
+        <p:cNvGrpSpPr/>
+        <p:nvPr/>
+      </p:nvGrpSpPr>
+      <p:grpSpPr/>
+      <p:sp>
+        <p:nvSpPr>
+          <p:cNvPr id="2" name="Título 1"/>
+          <p:cNvSpPr>
+            <a:spLocks noGrp="1"/>
+          </p:cNvSpPr>
+          <p:nvPr>
+            <p:ph type="title"/>
+          </p:nvPr>
+        </p:nvSpPr>
+        <p:spPr>
+          <a:xfrm>
+            <a:off x="628650" y="365125"/>
+            <a:ext cx="7886700" cy="878205"/>
+          </a:xfrm>
+        </p:spPr>
+        <p:txBody>
+          <a:bodyPr>
+            <a:normAutofit/>
+          </a:bodyPr>
+          <a:p>
+            <a:r>
+              <a:rPr lang="en-US" smtClean="0">
+                <a:sym typeface="+mn-ea"/>
+              </a:rPr>
+              <a:t>Resultados das Métricas Back-end</a:t>
+            </a:r>
+            <a:endParaRPr lang="en-US"/>
+          </a:p>
+        </p:txBody>
+      </p:sp>
+      <p:sp>
+        <p:nvSpPr>
+          <p:cNvPr id="4" name="Espaço Reservado para Número de Slide 3"/>
+          <p:cNvSpPr>
+            <a:spLocks noGrp="1"/>
+          </p:cNvSpPr>
+          <p:nvPr>
+            <p:ph type="sldNum" sz="quarter" idx="12"/>
+          </p:nvPr>
+        </p:nvSpPr>
+        <p:spPr/>
+        <p:txBody>
+          <a:bodyPr/>
+          <a:p>
+            <a:fld id="{CFCDC573-C9BE-334B-B909-19E2F28512E7}" type="slidenum">
+              <a:rPr lang="pt-BR" smtClean="0"/>
+            </a:fld>
+            <a:endParaRPr lang="pt-BR"/>
+          </a:p>
+        </p:txBody>
+      </p:sp>
+      <p:pic>
+        <p:nvPicPr>
+          <p:cNvPr id="69" name="Imagem 69" descr="4.1.5"/>
+          <p:cNvPicPr>
+            <a:picLocks noChangeAspect="1"/>
+          </p:cNvPicPr>
+          <p:nvPr>
+            <p:ph idx="1"/>
+          </p:nvPr>
+        </p:nvPicPr>
+        <p:blipFill>
+          <a:blip r:embed="rId1"/>
+          <a:stretch>
+            <a:fillRect/>
+          </a:stretch>
+        </p:blipFill>
+        <p:spPr>
+          <a:xfrm>
+            <a:off x="1652270" y="1858010"/>
+            <a:ext cx="5838825" cy="4286250"/>
+          </a:xfrm>
+          <a:prstGeom prst="rect">
+            <a:avLst/>
+          </a:prstGeom>
+          <a:ln>
+            <a:solidFill>
+              <a:schemeClr val="tx1"/>
+            </a:solidFill>
+          </a:ln>
+        </p:spPr>
+      </p:pic>
+      <p:sp>
+        <p:nvSpPr>
+          <p:cNvPr id="13" name="Caixa de Texto 12"/>
+          <p:cNvSpPr txBox="1"/>
+          <p:nvPr/>
+        </p:nvSpPr>
+        <p:spPr>
+          <a:xfrm>
+            <a:off x="1678940" y="6181090"/>
+            <a:ext cx="1599565" cy="306705"/>
+          </a:xfrm>
+          <a:prstGeom prst="rect">
+            <a:avLst/>
+          </a:prstGeom>
+          <a:noFill/>
+        </p:spPr>
+        <p:txBody>
+          <a:bodyPr wrap="none" rtlCol="0">
+            <a:spAutoFit/>
+          </a:bodyPr>
+          <a:p>
+            <a:pPr algn="l"/>
+            <a:r>
+              <a:rPr lang="pt-BR" altLang="en-US" sz="1400"/>
+              <a:t>Fonte: Autor (2018)</a:t>
+            </a:r>
+            <a:endParaRPr lang="pt-BR" altLang="en-US" sz="1400"/>
+          </a:p>
+        </p:txBody>
+      </p:sp>
+    </p:spTree>
+  </p:cSld>
+  <p:clrMapOvr>
+    <a:masterClrMapping/>
+  </p:clrMapOvr>
+</p:sld>
+</file>
+
+<file path=ppt/slides/slide32.xml><?xml version="1.0" encoding="utf-8"?>
+<p:sld xmlns:a="http://schemas.openxmlformats.org/drawingml/2006/main" xmlns:r="http://schemas.openxmlformats.org/officeDocument/2006/relationships" xmlns:p="http://schemas.openxmlformats.org/presentationml/2006/main">
+  <p:cSld>
+    <p:spTree>
+      <p:nvGrpSpPr>
+        <p:cNvPr id="1" name=""/>
+        <p:cNvGrpSpPr/>
+        <p:nvPr/>
+      </p:nvGrpSpPr>
+      <p:grpSpPr/>
+      <p:sp>
+        <p:nvSpPr>
+          <p:cNvPr id="2" name="Título 1"/>
+          <p:cNvSpPr>
+            <a:spLocks noGrp="1"/>
+          </p:cNvSpPr>
+          <p:nvPr>
+            <p:ph type="title"/>
+          </p:nvPr>
+        </p:nvSpPr>
+        <p:spPr>
+          <a:xfrm>
+            <a:off x="628650" y="365125"/>
+            <a:ext cx="7886700" cy="772160"/>
+          </a:xfrm>
+        </p:spPr>
+        <p:txBody>
+          <a:bodyPr>
+            <a:normAutofit fontScale="90000"/>
+          </a:bodyPr>
+          <a:p>
+            <a:r>
+              <a:rPr lang="en-US"/>
+              <a:t>Resultados das Métricas Front-end</a:t>
+            </a:r>
+            <a:endParaRPr lang="en-US"/>
+          </a:p>
+        </p:txBody>
+      </p:sp>
+      <p:sp>
+        <p:nvSpPr>
+          <p:cNvPr id="4" name="Espaço Reservado para Número de Slide 3"/>
+          <p:cNvSpPr>
+            <a:spLocks noGrp="1"/>
+          </p:cNvSpPr>
+          <p:nvPr>
+            <p:ph type="sldNum" sz="quarter" idx="12"/>
+          </p:nvPr>
+        </p:nvSpPr>
+        <p:spPr/>
+        <p:txBody>
+          <a:bodyPr/>
+          <a:p>
+            <a:fld id="{CFCDC573-C9BE-334B-B909-19E2F28512E7}" type="slidenum">
+              <a:rPr lang="pt-BR" smtClean="0"/>
+            </a:fld>
+            <a:endParaRPr lang="pt-BR"/>
+          </a:p>
+        </p:txBody>
+      </p:sp>
+      <p:pic>
+        <p:nvPicPr>
+          <p:cNvPr id="70" name="Imagem 70" descr="4.1.3"/>
+          <p:cNvPicPr>
+            <a:picLocks noChangeAspect="1"/>
+          </p:cNvPicPr>
+          <p:nvPr>
+            <p:ph idx="1"/>
+          </p:nvPr>
+        </p:nvPicPr>
+        <p:blipFill>
+          <a:blip r:embed="rId1"/>
+          <a:srcRect r="27714" b="1466"/>
+          <a:stretch>
+            <a:fillRect/>
+          </a:stretch>
+        </p:blipFill>
+        <p:spPr>
+          <a:xfrm>
+            <a:off x="1859915" y="1610995"/>
+            <a:ext cx="5424170" cy="4351655"/>
+          </a:xfrm>
+          <a:prstGeom prst="rect">
+            <a:avLst/>
+          </a:prstGeom>
+          <a:ln>
+            <a:solidFill>
+              <a:schemeClr val="tx1"/>
+            </a:solidFill>
+          </a:ln>
+        </p:spPr>
+      </p:pic>
+      <p:sp>
+        <p:nvSpPr>
+          <p:cNvPr id="13" name="Caixa de Texto 12"/>
+          <p:cNvSpPr txBox="1"/>
+          <p:nvPr/>
+        </p:nvSpPr>
+        <p:spPr>
+          <a:xfrm>
+            <a:off x="1859915" y="6049645"/>
+            <a:ext cx="1599565" cy="306705"/>
+          </a:xfrm>
+          <a:prstGeom prst="rect">
+            <a:avLst/>
+          </a:prstGeom>
+          <a:noFill/>
+        </p:spPr>
+        <p:txBody>
+          <a:bodyPr wrap="none" rtlCol="0">
+            <a:spAutoFit/>
+          </a:bodyPr>
+          <a:p>
+            <a:pPr algn="l"/>
+            <a:r>
+              <a:rPr lang="pt-BR" altLang="en-US" sz="1400"/>
+              <a:t>Fonte: Autor (2018)</a:t>
+            </a:r>
+            <a:endParaRPr lang="pt-BR" altLang="en-US" sz="1400"/>
+          </a:p>
+        </p:txBody>
+      </p:sp>
+    </p:spTree>
+  </p:cSld>
+  <p:clrMapOvr>
+    <a:masterClrMapping/>
+  </p:clrMapOvr>
+</p:sld>
+</file>
+
+<file path=ppt/slides/slide33.xml><?xml version="1.0" encoding="utf-8"?>
+<p:sld xmlns:a="http://schemas.openxmlformats.org/drawingml/2006/main" xmlns:r="http://schemas.openxmlformats.org/officeDocument/2006/relationships" xmlns:p="http://schemas.openxmlformats.org/presentationml/2006/main">
+  <p:cSld>
+    <p:spTree>
+      <p:nvGrpSpPr>
+        <p:cNvPr id="1" name=""/>
+        <p:cNvGrpSpPr/>
+        <p:nvPr/>
+      </p:nvGrpSpPr>
+      <p:grpSpPr/>
+      <p:sp>
+        <p:nvSpPr>
+          <p:cNvPr id="2" name="Título 1"/>
+          <p:cNvSpPr>
+            <a:spLocks noGrp="1"/>
+          </p:cNvSpPr>
+          <p:nvPr>
+            <p:ph type="title"/>
+          </p:nvPr>
+        </p:nvSpPr>
+        <p:spPr/>
+        <p:txBody>
+          <a:bodyPr>
+            <a:normAutofit fontScale="90000"/>
+          </a:bodyPr>
+          <a:p>
+            <a:r>
+              <a:rPr lang="en-US"/>
+              <a:t>Técnicas de Verificação e Validação aplicadas</a:t>
+            </a:r>
+            <a:endParaRPr lang="en-US"/>
+          </a:p>
+        </p:txBody>
+      </p:sp>
+      <p:sp>
+        <p:nvSpPr>
+          <p:cNvPr id="3" name="Espaço Reservado para Conteúdo 2"/>
+          <p:cNvSpPr>
+            <a:spLocks noGrp="1"/>
+          </p:cNvSpPr>
+          <p:nvPr>
+            <p:ph idx="1"/>
+          </p:nvPr>
+        </p:nvSpPr>
+        <p:spPr>
+          <a:xfrm>
+            <a:off x="628650" y="2360930"/>
+            <a:ext cx="7886700" cy="3838575"/>
+          </a:xfrm>
+        </p:spPr>
+        <p:txBody>
+          <a:bodyPr/>
+          <a:p>
+            <a:r>
+              <a:rPr lang="pt-BR" altLang="en-US"/>
+              <a:t>Testes de Unidade - Utilizado JUnit em métodos específicos das camadas Repository e Service</a:t>
+            </a:r>
+            <a:endParaRPr lang="pt-BR" altLang="en-US"/>
+          </a:p>
+          <a:p>
+            <a:endParaRPr lang="pt-BR" altLang="en-US"/>
+          </a:p>
+          <a:p>
+            <a:r>
+              <a:rPr lang="pt-BR" altLang="en-US"/>
+              <a:t>Testes de Recursos Externos - Utilizdo JUnit para execução de Métodos que fazem requisições para o Serviços do Via Cep e DistanceMatrix do Google. </a:t>
+            </a:r>
+            <a:endParaRPr lang="pt-BR" altLang="en-US"/>
+          </a:p>
+        </p:txBody>
+      </p:sp>
+      <p:sp>
+        <p:nvSpPr>
+          <p:cNvPr id="4" name="Espaço Reservado para Número de Slide 3"/>
+          <p:cNvSpPr>
+            <a:spLocks noGrp="1"/>
+          </p:cNvSpPr>
+          <p:nvPr>
+            <p:ph type="sldNum" sz="quarter" idx="12"/>
+          </p:nvPr>
+        </p:nvSpPr>
+        <p:spPr/>
+        <p:txBody>
+          <a:bodyPr/>
+          <a:p>
+            <a:fld id="{CFCDC573-C9BE-334B-B909-19E2F28512E7}" type="slidenum">
+              <a:rPr lang="pt-BR" smtClean="0"/>
+            </a:fld>
+            <a:endParaRPr lang="pt-BR"/>
+          </a:p>
+        </p:txBody>
+      </p:sp>
+    </p:spTree>
+  </p:cSld>
+  <p:clrMapOvr>
+    <a:masterClrMapping/>
+  </p:clrMapOvr>
+</p:sld>
+</file>
+
+<file path=ppt/slides/slide34.xml><?xml version="1.0" encoding="utf-8"?>
+<p:sld xmlns:a="http://schemas.openxmlformats.org/drawingml/2006/main" xmlns:r="http://schemas.openxmlformats.org/officeDocument/2006/relationships" xmlns:p="http://schemas.openxmlformats.org/presentationml/2006/main">
+  <p:cSld>
+    <p:spTree>
+      <p:nvGrpSpPr>
+        <p:cNvPr id="1" name=""/>
+        <p:cNvGrpSpPr/>
+        <p:nvPr/>
+      </p:nvGrpSpPr>
+      <p:grpSpPr/>
+      <p:sp>
+        <p:nvSpPr>
+          <p:cNvPr id="2" name="Título 1"/>
+          <p:cNvSpPr>
+            <a:spLocks noGrp="1"/>
+          </p:cNvSpPr>
+          <p:nvPr>
+            <p:ph type="title"/>
+          </p:nvPr>
+        </p:nvSpPr>
+        <p:spPr>
+          <a:xfrm>
+            <a:off x="628650" y="365125"/>
+            <a:ext cx="7886700" cy="996950"/>
+          </a:xfrm>
+        </p:spPr>
+        <p:txBody>
+          <a:bodyPr/>
+          <a:p>
+            <a:r>
+              <a:rPr lang="en-US"/>
+              <a:t>Teste Funcional de API</a:t>
+            </a:r>
+            <a:endParaRPr lang="en-US"/>
+          </a:p>
+        </p:txBody>
+      </p:sp>
+      <p:sp>
+        <p:nvSpPr>
+          <p:cNvPr id="4" name="Espaço Reservado para Número de Slide 3"/>
+          <p:cNvSpPr>
+            <a:spLocks noGrp="1"/>
+          </p:cNvSpPr>
+          <p:nvPr>
+            <p:ph type="sldNum" sz="quarter" idx="12"/>
+          </p:nvPr>
+        </p:nvSpPr>
+        <p:spPr/>
+        <p:txBody>
+          <a:bodyPr/>
+          <a:p>
+            <a:fld id="{CFCDC573-C9BE-334B-B909-19E2F28512E7}" type="slidenum">
+              <a:rPr lang="pt-BR" smtClean="0"/>
+            </a:fld>
+            <a:endParaRPr lang="pt-BR"/>
+          </a:p>
+        </p:txBody>
+      </p:sp>
+      <p:pic>
+        <p:nvPicPr>
+          <p:cNvPr id="74" name="Picture 2"/>
+          <p:cNvPicPr>
+            <a:picLocks noChangeAspect="1"/>
+          </p:cNvPicPr>
+          <p:nvPr>
+            <p:ph idx="1"/>
+          </p:nvPr>
+        </p:nvPicPr>
+        <p:blipFill>
+          <a:blip r:embed="rId1"/>
+          <a:stretch>
+            <a:fillRect/>
+          </a:stretch>
+        </p:blipFill>
+        <p:spPr>
+          <a:xfrm>
+            <a:off x="501650" y="1362075"/>
+            <a:ext cx="8140700" cy="4872355"/>
+          </a:xfrm>
+          <a:prstGeom prst="rect">
+            <a:avLst/>
+          </a:prstGeom>
+          <a:noFill/>
+          <a:ln w="9525">
+            <a:solidFill>
+              <a:schemeClr val="tx1"/>
+            </a:solidFill>
+          </a:ln>
+        </p:spPr>
+      </p:pic>
+      <p:sp>
+        <p:nvSpPr>
+          <p:cNvPr id="13" name="Caixa de Texto 12"/>
+          <p:cNvSpPr txBox="1"/>
+          <p:nvPr/>
+        </p:nvSpPr>
+        <p:spPr>
+          <a:xfrm>
+            <a:off x="501650" y="6234430"/>
+            <a:ext cx="1599565" cy="306705"/>
+          </a:xfrm>
+          <a:prstGeom prst="rect">
+            <a:avLst/>
+          </a:prstGeom>
+          <a:noFill/>
+        </p:spPr>
+        <p:txBody>
+          <a:bodyPr wrap="none" rtlCol="0">
+            <a:spAutoFit/>
+          </a:bodyPr>
+          <a:p>
+            <a:pPr algn="l"/>
+            <a:r>
+              <a:rPr lang="pt-BR" altLang="en-US" sz="1400"/>
+              <a:t>Fonte: Autor (2018)</a:t>
+            </a:r>
+            <a:endParaRPr lang="pt-BR" altLang="en-US" sz="1400"/>
+          </a:p>
+        </p:txBody>
+      </p:sp>
+    </p:spTree>
+  </p:cSld>
+  <p:clrMapOvr>
+    <a:masterClrMapping/>
+  </p:clrMapOvr>
+</p:sld>
+</file>
+
+<file path=ppt/slides/slide35.xml><?xml version="1.0" encoding="utf-8"?>
+<p:sld xmlns:a="http://schemas.openxmlformats.org/drawingml/2006/main" xmlns:r="http://schemas.openxmlformats.org/officeDocument/2006/relationships" xmlns:p="http://schemas.openxmlformats.org/presentationml/2006/main">
+  <p:cSld>
+    <p:spTree>
+      <p:nvGrpSpPr>
+        <p:cNvPr id="1" name=""/>
+        <p:cNvGrpSpPr/>
+        <p:nvPr/>
+      </p:nvGrpSpPr>
+      <p:grpSpPr/>
+      <p:sp>
+        <p:nvSpPr>
+          <p:cNvPr id="2" name="Título 1"/>
+          <p:cNvSpPr>
+            <a:spLocks noGrp="1"/>
+          </p:cNvSpPr>
+          <p:nvPr>
+            <p:ph type="title"/>
+          </p:nvPr>
+        </p:nvSpPr>
+        <p:spPr/>
+        <p:txBody>
+          <a:bodyPr>
+            <a:normAutofit fontScale="90000"/>
+          </a:bodyPr>
+          <a:p>
+            <a:r>
+              <a:rPr lang="en-US"/>
+              <a:t>Processo de Validação do Algoritmo de Roteirização</a:t>
+            </a:r>
+            <a:endParaRPr lang="en-US"/>
+          </a:p>
+        </p:txBody>
+      </p:sp>
+      <p:sp>
+        <p:nvSpPr>
+          <p:cNvPr id="3" name="Espaço Reservado para Conteúdo 2"/>
+          <p:cNvSpPr>
+            <a:spLocks noGrp="1"/>
+          </p:cNvSpPr>
+          <p:nvPr>
+            <p:ph idx="1"/>
+          </p:nvPr>
+        </p:nvSpPr>
+        <p:spPr>
+          <a:xfrm>
+            <a:off x="628650" y="2943860"/>
+            <a:ext cx="7886700" cy="3233420"/>
+          </a:xfrm>
+        </p:spPr>
+        <p:txBody>
+          <a:bodyPr/>
+          <a:p>
+            <a:r>
+              <a:rPr lang="pt-BR" altLang="en-US"/>
+              <a:t>Cadastro de empresas</a:t>
+            </a:r>
+            <a:endParaRPr lang="en-US"/>
+          </a:p>
+          <a:p>
+            <a:endParaRPr lang="en-US"/>
+          </a:p>
+          <a:p>
+            <a:r>
+              <a:rPr lang="pt-BR"/>
+              <a:t>Montagem com a Lista de Endereços de Atendimento</a:t>
+            </a:r>
+            <a:endParaRPr lang="pt-BR"/>
+          </a:p>
+        </p:txBody>
+      </p:sp>
+      <p:sp>
+        <p:nvSpPr>
+          <p:cNvPr id="4" name="Espaço Reservado para Número de Slide 3"/>
+          <p:cNvSpPr>
+            <a:spLocks noGrp="1"/>
+          </p:cNvSpPr>
+          <p:nvPr>
+            <p:ph type="sldNum" sz="quarter" idx="12"/>
+          </p:nvPr>
+        </p:nvSpPr>
+        <p:spPr/>
+        <p:txBody>
+          <a:bodyPr/>
+          <a:p>
+            <a:fld id="{CFCDC573-C9BE-334B-B909-19E2F28512E7}" type="slidenum">
+              <a:rPr lang="pt-BR" smtClean="0"/>
+            </a:fld>
+            <a:endParaRPr lang="pt-BR"/>
+          </a:p>
+        </p:txBody>
+      </p:sp>
+    </p:spTree>
+  </p:cSld>
+  <p:clrMapOvr>
+    <a:masterClrMapping/>
+  </p:clrMapOvr>
+</p:sld>
+</file>
+
+<file path=ppt/slides/slide36.xml><?xml version="1.0" encoding="utf-8"?>
+<p:sld xmlns:a="http://schemas.openxmlformats.org/drawingml/2006/main" xmlns:r="http://schemas.openxmlformats.org/officeDocument/2006/relationships" xmlns:p="http://schemas.openxmlformats.org/presentationml/2006/main">
+  <p:cSld>
+    <p:spTree>
+      <p:nvGrpSpPr>
+        <p:cNvPr id="1" name=""/>
+        <p:cNvGrpSpPr/>
+        <p:nvPr/>
+      </p:nvGrpSpPr>
+      <p:grpSpPr/>
+      <p:sp>
+        <p:nvSpPr>
+          <p:cNvPr id="2" name="Título 1"/>
+          <p:cNvSpPr>
+            <a:spLocks noGrp="1"/>
+          </p:cNvSpPr>
+          <p:nvPr>
+            <p:ph type="title"/>
+          </p:nvPr>
+        </p:nvSpPr>
+        <p:spPr/>
+        <p:txBody>
+          <a:bodyPr>
+            <a:normAutofit fontScale="90000"/>
+          </a:bodyPr>
+          <a:p>
+            <a:r>
+              <a:rPr lang="en-US">
+                <a:sym typeface="+mn-ea"/>
+              </a:rPr>
+              <a:t>Processo de Validação do Algoritmo de Roteirização</a:t>
+            </a:r>
+            <a:endParaRPr lang="en-US"/>
+          </a:p>
+        </p:txBody>
+      </p:sp>
+      <p:sp>
+        <p:nvSpPr>
+          <p:cNvPr id="3" name="Espaço Reservado para Conteúdo 2"/>
+          <p:cNvSpPr>
+            <a:spLocks noGrp="1"/>
+          </p:cNvSpPr>
+          <p:nvPr>
+            <p:ph idx="1"/>
+          </p:nvPr>
+        </p:nvSpPr>
+        <p:spPr>
+          <a:xfrm>
+            <a:off x="628650" y="2812415"/>
+            <a:ext cx="7886700" cy="3364865"/>
+          </a:xfrm>
+        </p:spPr>
+        <p:txBody>
+          <a:bodyPr/>
+          <a:p>
+            <a:r>
+              <a:rPr lang="pt-BR" altLang="en-US"/>
+              <a:t>Inserir a Lista de Endereços no google</a:t>
+            </a:r>
+            <a:endParaRPr lang="pt-BR" altLang="en-US"/>
+          </a:p>
+          <a:p>
+            <a:endParaRPr lang="pt-BR" altLang="en-US"/>
+          </a:p>
+          <a:p>
+            <a:r>
+              <a:rPr lang="pt-BR" altLang="en-US"/>
+              <a:t>Inserir a Lista de Endereços do SysRLog</a:t>
+            </a:r>
+            <a:endParaRPr lang="pt-BR" altLang="en-US"/>
+          </a:p>
+        </p:txBody>
+      </p:sp>
+      <p:sp>
+        <p:nvSpPr>
+          <p:cNvPr id="4" name="Espaço Reservado para Número de Slide 3"/>
+          <p:cNvSpPr>
+            <a:spLocks noGrp="1"/>
+          </p:cNvSpPr>
+          <p:nvPr>
+            <p:ph type="sldNum" sz="quarter" idx="12"/>
+          </p:nvPr>
+        </p:nvSpPr>
+        <p:spPr/>
+        <p:txBody>
+          <a:bodyPr/>
+          <a:p>
+            <a:fld id="{CFCDC573-C9BE-334B-B909-19E2F28512E7}" type="slidenum">
+              <a:rPr lang="pt-BR" smtClean="0"/>
+            </a:fld>
+            <a:endParaRPr lang="pt-BR"/>
+          </a:p>
+        </p:txBody>
+      </p:sp>
+    </p:spTree>
+  </p:cSld>
+  <p:clrMapOvr>
+    <a:masterClrMapping/>
+  </p:clrMapOvr>
+</p:sld>
+</file>
+
+<file path=ppt/slides/slide37.xml><?xml version="1.0" encoding="utf-8"?>
+<p:sld xmlns:a="http://schemas.openxmlformats.org/drawingml/2006/main" xmlns:r="http://schemas.openxmlformats.org/officeDocument/2006/relationships" xmlns:p="http://schemas.openxmlformats.org/presentationml/2006/main">
+  <p:cSld>
+    <p:spTree>
+      <p:nvGrpSpPr>
+        <p:cNvPr id="1" name=""/>
+        <p:cNvGrpSpPr/>
+        <p:nvPr/>
+      </p:nvGrpSpPr>
+      <p:grpSpPr/>
+      <p:sp>
+        <p:nvSpPr>
+          <p:cNvPr id="2" name="Título 1"/>
+          <p:cNvSpPr>
+            <a:spLocks noGrp="1"/>
+          </p:cNvSpPr>
+          <p:nvPr>
+            <p:ph type="title"/>
+          </p:nvPr>
+        </p:nvSpPr>
+        <p:spPr/>
+        <p:txBody>
+          <a:bodyPr>
+            <a:normAutofit fontScale="90000"/>
+          </a:bodyPr>
+          <a:p>
+            <a:r>
+              <a:rPr lang="en-US">
+                <a:sym typeface="+mn-ea"/>
+              </a:rPr>
+              <a:t>Processo de Validação do Algoritmo de Roteirização</a:t>
+            </a:r>
+            <a:endParaRPr lang="en-US"/>
+          </a:p>
+        </p:txBody>
+      </p:sp>
+      <p:sp>
+        <p:nvSpPr>
+          <p:cNvPr id="3" name="Espaço Reservado para Conteúdo 2"/>
+          <p:cNvSpPr>
+            <a:spLocks noGrp="1"/>
+          </p:cNvSpPr>
+          <p:nvPr>
+            <p:ph idx="1"/>
+          </p:nvPr>
+        </p:nvSpPr>
+        <p:spPr>
+          <a:xfrm>
+            <a:off x="628650" y="3181350"/>
+            <a:ext cx="7886700" cy="2995930"/>
+          </a:xfrm>
+        </p:spPr>
+        <p:txBody>
+          <a:bodyPr/>
+          <a:p>
+            <a:r>
+              <a:rPr lang="pt-BR" altLang="en-US"/>
+              <a:t>Avaliação e comparação dos resultados Obtidos de tempo e distância comparando o GoogleMaps e o SysRLog.</a:t>
+            </a:r>
+            <a:endParaRPr lang="pt-BR" altLang="en-US"/>
+          </a:p>
+        </p:txBody>
+      </p:sp>
+      <p:sp>
+        <p:nvSpPr>
+          <p:cNvPr id="4" name="Espaço Reservado para Número de Slide 3"/>
+          <p:cNvSpPr>
+            <a:spLocks noGrp="1"/>
+          </p:cNvSpPr>
+          <p:nvPr>
+            <p:ph type="sldNum" sz="quarter" idx="12"/>
+          </p:nvPr>
+        </p:nvSpPr>
+        <p:spPr/>
+        <p:txBody>
+          <a:bodyPr/>
+          <a:p>
+            <a:fld id="{CFCDC573-C9BE-334B-B909-19E2F28512E7}" type="slidenum">
+              <a:rPr lang="pt-BR" smtClean="0"/>
+            </a:fld>
+            <a:endParaRPr lang="pt-BR"/>
+          </a:p>
+        </p:txBody>
+      </p:sp>
+    </p:spTree>
+  </p:cSld>
+  <p:clrMapOvr>
+    <a:masterClrMapping/>
+  </p:clrMapOvr>
+</p:sld>
+</file>
+
+<file path=ppt/slides/slide38.xml><?xml version="1.0" encoding="utf-8"?>
+<p:sld xmlns:a="http://schemas.openxmlformats.org/drawingml/2006/main" xmlns:r="http://schemas.openxmlformats.org/officeDocument/2006/relationships" xmlns:p="http://schemas.openxmlformats.org/presentationml/2006/main">
+  <p:cSld>
+    <p:spTree>
+      <p:nvGrpSpPr>
+        <p:cNvPr id="1" name=""/>
+        <p:cNvGrpSpPr/>
+        <p:nvPr/>
+      </p:nvGrpSpPr>
+      <p:grpSpPr/>
+      <p:sp>
+        <p:nvSpPr>
+          <p:cNvPr id="2" name="Título 1"/>
+          <p:cNvSpPr>
+            <a:spLocks noGrp="1"/>
+          </p:cNvSpPr>
+          <p:nvPr>
+            <p:ph type="title"/>
+          </p:nvPr>
+        </p:nvSpPr>
+        <p:spPr/>
+        <p:txBody>
+          <a:bodyPr/>
+          <a:p>
+            <a:r>
+              <a:rPr lang="pt-BR" altLang="en-US"/>
+              <a:t>Plano de Testes - Caso de Teste 1</a:t>
+            </a:r>
+            <a:endParaRPr lang="pt-BR" altLang="en-US"/>
+          </a:p>
+        </p:txBody>
+      </p:sp>
+      <p:sp>
+        <p:nvSpPr>
+          <p:cNvPr id="4" name="Espaço Reservado para Número de Slide 3"/>
+          <p:cNvSpPr>
+            <a:spLocks noGrp="1"/>
+          </p:cNvSpPr>
+          <p:nvPr>
+            <p:ph type="sldNum" sz="quarter" idx="12"/>
+          </p:nvPr>
+        </p:nvSpPr>
+        <p:spPr/>
+        <p:txBody>
+          <a:bodyPr/>
+          <a:p>
+            <a:fld id="{CFCDC573-C9BE-334B-B909-19E2F28512E7}" type="slidenum">
+              <a:rPr lang="pt-BR" smtClean="0"/>
+            </a:fld>
+            <a:endParaRPr lang="pt-BR"/>
+          </a:p>
+        </p:txBody>
+      </p:sp>
+      <p:pic>
+        <p:nvPicPr>
+          <p:cNvPr id="84" name="Imagem 3"/>
+          <p:cNvPicPr>
+            <a:picLocks noChangeAspect="1"/>
+          </p:cNvPicPr>
+          <p:nvPr>
+            <p:ph idx="1"/>
+          </p:nvPr>
+        </p:nvPicPr>
+        <p:blipFill>
+          <a:blip r:embed="rId1"/>
+          <a:stretch>
+            <a:fillRect/>
+          </a:stretch>
+        </p:blipFill>
+        <p:spPr>
+          <a:xfrm>
+            <a:off x="992505" y="1536065"/>
+            <a:ext cx="7158990" cy="4649470"/>
+          </a:xfrm>
+          <a:prstGeom prst="rect">
+            <a:avLst/>
+          </a:prstGeom>
+          <a:ln>
+            <a:solidFill>
+              <a:schemeClr val="tx1"/>
+            </a:solidFill>
+          </a:ln>
+        </p:spPr>
+      </p:pic>
+      <p:sp>
+        <p:nvSpPr>
+          <p:cNvPr id="13" name="Caixa de Texto 12"/>
+          <p:cNvSpPr txBox="1"/>
+          <p:nvPr/>
+        </p:nvSpPr>
+        <p:spPr>
+          <a:xfrm>
+            <a:off x="992505" y="6356350"/>
+            <a:ext cx="1599565" cy="306705"/>
+          </a:xfrm>
+          <a:prstGeom prst="rect">
+            <a:avLst/>
+          </a:prstGeom>
+          <a:noFill/>
+        </p:spPr>
+        <p:txBody>
+          <a:bodyPr wrap="none" rtlCol="0">
+            <a:spAutoFit/>
+          </a:bodyPr>
+          <a:p>
+            <a:pPr algn="l"/>
+            <a:r>
+              <a:rPr lang="pt-BR" altLang="en-US" sz="1400"/>
+              <a:t>Fonte: Autor (2018)</a:t>
+            </a:r>
+            <a:endParaRPr lang="pt-BR" altLang="en-US" sz="1400"/>
+          </a:p>
+        </p:txBody>
+      </p:sp>
+    </p:spTree>
+  </p:cSld>
+  <p:clrMapOvr>
+    <a:masterClrMapping/>
+  </p:clrMapOvr>
+</p:sld>
+</file>
+
+<file path=ppt/slides/slide39.xml><?xml version="1.0" encoding="utf-8"?>
+<p:sld xmlns:a="http://schemas.openxmlformats.org/drawingml/2006/main" xmlns:r="http://schemas.openxmlformats.org/officeDocument/2006/relationships" xmlns:p="http://schemas.openxmlformats.org/presentationml/2006/main">
+  <p:cSld>
+    <p:spTree>
+      <p:nvGrpSpPr>
+        <p:cNvPr id="1" name=""/>
+        <p:cNvGrpSpPr/>
+        <p:nvPr/>
+      </p:nvGrpSpPr>
+      <p:grpSpPr/>
+      <p:sp>
+        <p:nvSpPr>
+          <p:cNvPr id="2" name="Título 1"/>
+          <p:cNvSpPr>
+            <a:spLocks noGrp="1"/>
+          </p:cNvSpPr>
+          <p:nvPr>
+            <p:ph type="title"/>
+          </p:nvPr>
+        </p:nvSpPr>
+        <p:spPr/>
+        <p:txBody>
+          <a:bodyPr/>
+          <a:p>
+            <a:r>
+              <a:rPr lang="pt-BR" altLang="en-US"/>
+              <a:t>Resultados Obtidos - Teste 1</a:t>
+            </a:r>
+            <a:endParaRPr lang="pt-BR" altLang="en-US"/>
+          </a:p>
+        </p:txBody>
+      </p:sp>
+      <p:sp>
+        <p:nvSpPr>
+          <p:cNvPr id="4" name="Espaço Reservado para Número de Slide 3"/>
+          <p:cNvSpPr>
+            <a:spLocks noGrp="1"/>
+          </p:cNvSpPr>
+          <p:nvPr>
+            <p:ph type="sldNum" sz="quarter" idx="12"/>
+          </p:nvPr>
+        </p:nvSpPr>
+        <p:spPr/>
+        <p:txBody>
+          <a:bodyPr/>
+          <a:p>
+            <a:fld id="{CFCDC573-C9BE-334B-B909-19E2F28512E7}" type="slidenum">
+              <a:rPr lang="pt-BR" smtClean="0"/>
+            </a:fld>
+            <a:endParaRPr lang="pt-BR"/>
+          </a:p>
+        </p:txBody>
+      </p:sp>
+      <p:graphicFrame>
+        <p:nvGraphicFramePr>
+          <p:cNvPr id="3" name="Espaço Reservado para Conteúdo -2147482623"/>
+          <p:cNvGraphicFramePr/>
+          <p:nvPr>
+            <p:ph idx="1"/>
+          </p:nvPr>
+        </p:nvGraphicFramePr>
+        <p:xfrm>
+          <a:off x="913130" y="1992630"/>
+          <a:ext cx="7317105" cy="2106930"/>
+        </p:xfrm>
+        <a:graphic>
+          <a:graphicData uri="http://schemas.openxmlformats.org/presentationml/2006/ole">
+            <mc:AlternateContent xmlns:mc="http://schemas.openxmlformats.org/markup-compatibility/2006">
+              <mc:Choice xmlns:v="urn:schemas-microsoft-com:vml" Requires="v">
+                <p:oleObj spid="_x0000_s3076" name="" r:id="rId1" imgW="3800475" imgH="828675" progId="Excel.Sheet.12">
+                  <p:embed/>
+                </p:oleObj>
+              </mc:Choice>
+              <mc:Fallback>
+                <p:oleObj name="" r:id="rId1" imgW="3800475" imgH="828675" progId="Excel.Sheet.12">
+                  <p:embed/>
+                  <p:pic>
+                    <p:nvPicPr>
+                      <p:cNvPr id="0" name="Imagem 3075"/>
+                      <p:cNvPicPr/>
+                      <p:nvPr/>
+                    </p:nvPicPr>
+                    <p:blipFill>
+                      <a:blip r:embed="rId2"/>
+                      <a:stretch>
+                        <a:fillRect/>
+                      </a:stretch>
+                    </p:blipFill>
+                    <p:spPr>
+                      <a:xfrm>
+                        <a:off x="913130" y="1992630"/>
+                        <a:ext cx="7317105" cy="2106930"/>
+                      </a:xfrm>
+                      <a:prstGeom prst="rect">
+                        <a:avLst/>
+                      </a:prstGeom>
+                      <a:noFill/>
+                      <a:ln w="38100">
+                        <a:noFill/>
+                        <a:miter/>
+                      </a:ln>
+                    </p:spPr>
+                  </p:pic>
+                </p:oleObj>
+              </mc:Fallback>
+            </mc:AlternateContent>
+          </a:graphicData>
+        </a:graphic>
+      </p:graphicFrame>
+      <p:sp>
+        <p:nvSpPr>
+          <p:cNvPr id="13" name="Caixa de Texto 12"/>
+          <p:cNvSpPr txBox="1"/>
+          <p:nvPr/>
+        </p:nvSpPr>
+        <p:spPr>
+          <a:xfrm>
+            <a:off x="913130" y="4180840"/>
+            <a:ext cx="1599565" cy="306705"/>
+          </a:xfrm>
+          <a:prstGeom prst="rect">
+            <a:avLst/>
+          </a:prstGeom>
+          <a:noFill/>
+        </p:spPr>
+        <p:txBody>
+          <a:bodyPr wrap="none" rtlCol="0">
+            <a:spAutoFit/>
+          </a:bodyPr>
+          <a:p>
+            <a:pPr algn="l"/>
+            <a:r>
+              <a:rPr lang="pt-BR" altLang="en-US" sz="1400"/>
+              <a:t>Fonte: Autor (2018)</a:t>
+            </a:r>
+            <a:endParaRPr lang="pt-BR" altLang="en-US" sz="1400"/>
+          </a:p>
+        </p:txBody>
+      </p:sp>
+    </p:spTree>
+  </p:cSld>
+  <p:clrMapOvr>
+    <a:masterClrMapping/>
+  </p:clrMapOvr>
+</p:sld>
+</file>
+
+<file path=ppt/slides/slide4.xml><?xml version="1.0" encoding="utf-8"?>
+<p:sld xmlns:a="http://schemas.openxmlformats.org/drawingml/2006/main" xmlns:r="http://schemas.openxmlformats.org/officeDocument/2006/relationships" xmlns:p="http://schemas.openxmlformats.org/presentationml/2006/main">
+  <p:cSld>
+    <p:spTree>
+      <p:nvGrpSpPr>
+        <p:cNvPr id="1" name=""/>
+        <p:cNvGrpSpPr/>
+        <p:nvPr/>
+      </p:nvGrpSpPr>
+      <p:grpSpPr>
+        <a:xfrm>
+          <a:off x="0" y="0"/>
+          <a:ext cx="0" cy="0"/>
+          <a:chOff x="0" y="0"/>
+          <a:chExt cx="0" cy="0"/>
+        </a:xfrm>
+      </p:grpSpPr>
+      <p:sp>
+        <p:nvSpPr>
+          <p:cNvPr id="2" name="Title 1"/>
+          <p:cNvSpPr>
+            <a:spLocks noGrp="1"/>
+          </p:cNvSpPr>
+          <p:nvPr>
+            <p:ph type="title"/>
+          </p:nvPr>
+        </p:nvSpPr>
+        <p:spPr/>
+        <p:txBody>
+          <a:bodyPr/>
+          <a:lstStyle/>
+          <a:p>
+            <a:r>
+              <a:rPr lang="pt-BR" dirty="0" err="1" smtClean="0"/>
+              <a:t>Introduç</a:t>
+            </a:r>
+            <a:r>
+              <a:rPr lang="en-US" dirty="0" err="1" smtClean="0"/>
+              <a:t>ão</a:t>
+            </a:r>
+            <a:endParaRPr lang="pt-BR" dirty="0"/>
+          </a:p>
+        </p:txBody>
+      </p:sp>
+      <p:sp>
+        <p:nvSpPr>
+          <p:cNvPr id="3" name="Content Placeholder 2"/>
+          <p:cNvSpPr>
+            <a:spLocks noGrp="1"/>
+          </p:cNvSpPr>
+          <p:nvPr>
+            <p:ph idx="1"/>
+          </p:nvPr>
+        </p:nvSpPr>
+        <p:spPr/>
+        <p:txBody>
+          <a:bodyPr>
+            <a:normAutofit/>
+          </a:bodyPr>
+          <a:lstStyle/>
+          <a:p>
+            <a:r>
+              <a:rPr smtClean="0"/>
+              <a:t>A logística é uma área vital e de extrema importância para as empresas (FLEURY, 1999).</a:t>
+            </a:r>
+            <a:endParaRPr smtClean="0"/>
+          </a:p>
+          <a:p>
+            <a:endParaRPr lang="en-US" dirty="0"/>
+          </a:p>
+          <a:p>
+            <a:r>
+              <a:rPr lang="en-US" smtClean="0"/>
+              <a:t>Empresas </a:t>
+            </a:r>
+            <a:r>
+              <a:rPr lang="pt-BR" altLang="en-US" smtClean="0"/>
+              <a:t>almejam lucro</a:t>
+            </a:r>
+            <a:r>
+              <a:rPr lang="en-US" smtClean="0"/>
+              <a:t>, portanto faz-se necessário atentarem-se as atividades logísticas  (DORNIER et al, 2000)</a:t>
+            </a:r>
+            <a:r>
+              <a:rPr lang="pt-BR" altLang="en-US" smtClean="0"/>
+              <a:t>.</a:t>
+            </a:r>
+            <a:endParaRPr lang="en-US" smtClean="0"/>
+          </a:p>
+          <a:p>
+            <a:endParaRPr lang="en-US" dirty="0"/>
+          </a:p>
+          <a:p>
+            <a:endParaRPr lang="en-US" dirty="0" smtClean="0"/>
+          </a:p>
+          <a:p>
+            <a:endParaRPr lang="en-US" dirty="0"/>
+          </a:p>
+          <a:p>
+            <a:pPr marL="0" indent="0" algn="r">
+              <a:buNone/>
+            </a:pPr>
+            <a:endParaRPr lang="en-US" sz="2000" dirty="0" smtClean="0"/>
+          </a:p>
+          <a:p>
+            <a:pPr marL="0" indent="0">
+              <a:buNone/>
+            </a:pPr>
+            <a:endParaRPr lang="en-US" dirty="0"/>
+          </a:p>
+        </p:txBody>
+      </p:sp>
+      <p:sp>
+        <p:nvSpPr>
+          <p:cNvPr id="4" name="Slide Number Placeholder 3"/>
+          <p:cNvSpPr>
+            <a:spLocks noGrp="1"/>
+          </p:cNvSpPr>
+          <p:nvPr>
+            <p:ph type="sldNum" sz="quarter" idx="12"/>
+          </p:nvPr>
+        </p:nvSpPr>
+        <p:spPr/>
+        <p:txBody>
+          <a:bodyPr/>
+          <a:lstStyle/>
+          <a:p>
+            <a:fld id="{CFCDC573-C9BE-334B-B909-19E2F28512E7}" type="slidenum">
+              <a:rPr lang="pt-BR" smtClean="0"/>
+            </a:fld>
+            <a:endParaRPr lang="pt-BR"/>
+          </a:p>
+        </p:txBody>
+      </p:sp>
+    </p:spTree>
+  </p:cSld>
+  <p:clrMapOvr>
+    <a:masterClrMapping/>
+  </p:clrMapOvr>
+  <p:timing>
+    <p:tnLst>
+      <p:par>
+        <p:cTn id="1" dur="indefinite" restart="never" nodeType="tmRoot"/>
+      </p:par>
+    </p:tnLst>
+  </p:timing>
+</p:sld>
+</file>
+
+<file path=ppt/slides/slide40.xml><?xml version="1.0" encoding="utf-8"?>
+<p:sld xmlns:a="http://schemas.openxmlformats.org/drawingml/2006/main" xmlns:r="http://schemas.openxmlformats.org/officeDocument/2006/relationships" xmlns:p="http://schemas.openxmlformats.org/presentationml/2006/main">
+  <p:cSld>
+    <p:spTree>
+      <p:nvGrpSpPr>
+        <p:cNvPr id="1" name=""/>
+        <p:cNvGrpSpPr/>
+        <p:nvPr/>
+      </p:nvGrpSpPr>
+      <p:grpSpPr/>
+      <p:sp>
+        <p:nvSpPr>
+          <p:cNvPr id="2" name="Título 1"/>
+          <p:cNvSpPr>
+            <a:spLocks noGrp="1"/>
+          </p:cNvSpPr>
+          <p:nvPr>
+            <p:ph type="title"/>
+          </p:nvPr>
+        </p:nvSpPr>
+        <p:spPr/>
+        <p:txBody>
+          <a:bodyPr>
+            <a:normAutofit fontScale="90000"/>
+          </a:bodyPr>
+          <a:p>
+            <a:r>
+              <a:rPr lang="en-US"/>
+              <a:t>Resultados Obtidos no Comparativo de Tempo das Rotas.</a:t>
+            </a:r>
+            <a:endParaRPr lang="en-US"/>
+          </a:p>
+        </p:txBody>
+      </p:sp>
+      <p:sp>
+        <p:nvSpPr>
+          <p:cNvPr id="4" name="Espaço Reservado para Número de Slide 3"/>
+          <p:cNvSpPr>
+            <a:spLocks noGrp="1"/>
+          </p:cNvSpPr>
+          <p:nvPr>
+            <p:ph type="sldNum" sz="quarter" idx="12"/>
+          </p:nvPr>
+        </p:nvSpPr>
+        <p:spPr/>
+        <p:txBody>
+          <a:bodyPr/>
+          <a:p>
+            <a:fld id="{CFCDC573-C9BE-334B-B909-19E2F28512E7}" type="slidenum">
+              <a:rPr lang="pt-BR" smtClean="0"/>
+            </a:fld>
+            <a:endParaRPr lang="pt-BR"/>
+          </a:p>
+        </p:txBody>
+      </p:sp>
+      <p:pic>
+        <p:nvPicPr>
+          <p:cNvPr id="5" name="Espaço Reservado para Conteúdo 4"/>
+          <p:cNvPicPr>
+            <a:picLocks noChangeAspect="1"/>
+          </p:cNvPicPr>
+          <p:nvPr>
+            <p:ph idx="1"/>
+          </p:nvPr>
+        </p:nvPicPr>
+        <p:blipFill>
+          <a:blip r:embed="rId1"/>
+          <a:srcRect l="1601" t="8730" r="21029"/>
+          <a:stretch>
+            <a:fillRect/>
+          </a:stretch>
+        </p:blipFill>
+        <p:spPr>
+          <a:xfrm>
+            <a:off x="736600" y="2070735"/>
+            <a:ext cx="7670800" cy="2715895"/>
+          </a:xfrm>
+          <a:prstGeom prst="rect">
+            <a:avLst/>
+          </a:prstGeom>
+          <a:ln>
+            <a:solidFill>
+              <a:schemeClr val="accent1"/>
+            </a:solidFill>
+          </a:ln>
+        </p:spPr>
+      </p:pic>
+      <p:sp>
+        <p:nvSpPr>
+          <p:cNvPr id="13" name="Caixa de Texto 12"/>
+          <p:cNvSpPr txBox="1"/>
+          <p:nvPr/>
+        </p:nvSpPr>
+        <p:spPr>
+          <a:xfrm>
+            <a:off x="736600" y="4786630"/>
+            <a:ext cx="1599565" cy="306705"/>
+          </a:xfrm>
+          <a:prstGeom prst="rect">
+            <a:avLst/>
+          </a:prstGeom>
+          <a:noFill/>
+        </p:spPr>
+        <p:txBody>
+          <a:bodyPr wrap="none" rtlCol="0">
+            <a:spAutoFit/>
+          </a:bodyPr>
+          <a:p>
+            <a:pPr algn="l"/>
+            <a:r>
+              <a:rPr lang="pt-BR" altLang="en-US" sz="1400"/>
+              <a:t>Fonte: Autor (2018)</a:t>
+            </a:r>
+            <a:endParaRPr lang="pt-BR" altLang="en-US" sz="1400"/>
+          </a:p>
+        </p:txBody>
+      </p:sp>
+    </p:spTree>
+  </p:cSld>
+  <p:clrMapOvr>
+    <a:masterClrMapping/>
+  </p:clrMapOvr>
+</p:sld>
+</file>
+
+<file path=ppt/slides/slide41.xml><?xml version="1.0" encoding="utf-8"?>
+<p:sld xmlns:a="http://schemas.openxmlformats.org/drawingml/2006/main" xmlns:r="http://schemas.openxmlformats.org/officeDocument/2006/relationships" xmlns:p="http://schemas.openxmlformats.org/presentationml/2006/main">
+  <p:cSld>
+    <p:spTree>
+      <p:nvGrpSpPr>
+        <p:cNvPr id="1" name=""/>
+        <p:cNvGrpSpPr/>
+        <p:nvPr/>
+      </p:nvGrpSpPr>
+      <p:grpSpPr/>
+      <p:sp>
+        <p:nvSpPr>
+          <p:cNvPr id="2" name="Título 1"/>
+          <p:cNvSpPr>
+            <a:spLocks noGrp="1"/>
+          </p:cNvSpPr>
+          <p:nvPr>
+            <p:ph type="title"/>
+          </p:nvPr>
+        </p:nvSpPr>
+        <p:spPr/>
+        <p:txBody>
+          <a:bodyPr>
+            <a:normAutofit fontScale="90000"/>
+          </a:bodyPr>
+          <a:p>
+            <a:r>
+              <a:rPr lang="en-US"/>
+              <a:t>Resultados Obtidos no Comparativo de Distância das Rotas</a:t>
+            </a:r>
+            <a:r>
+              <a:rPr lang="pt-BR" altLang="en-US"/>
+              <a:t>.</a:t>
+            </a:r>
+            <a:endParaRPr lang="pt-BR" altLang="en-US"/>
+          </a:p>
+        </p:txBody>
+      </p:sp>
+      <p:sp>
+        <p:nvSpPr>
+          <p:cNvPr id="4" name="Espaço Reservado para Número de Slide 3"/>
+          <p:cNvSpPr>
+            <a:spLocks noGrp="1"/>
+          </p:cNvSpPr>
+          <p:nvPr>
+            <p:ph type="sldNum" sz="quarter" idx="12"/>
+          </p:nvPr>
+        </p:nvSpPr>
+        <p:spPr/>
+        <p:txBody>
+          <a:bodyPr/>
+          <a:p>
+            <a:fld id="{CFCDC573-C9BE-334B-B909-19E2F28512E7}" type="slidenum">
+              <a:rPr lang="pt-BR" smtClean="0"/>
+            </a:fld>
+            <a:endParaRPr lang="pt-BR"/>
+          </a:p>
+        </p:txBody>
+      </p:sp>
+      <p:pic>
+        <p:nvPicPr>
+          <p:cNvPr id="5" name="Espaço Reservado para Conteúdo 4"/>
+          <p:cNvPicPr>
+            <a:picLocks noChangeAspect="1"/>
+          </p:cNvPicPr>
+          <p:nvPr>
+            <p:ph idx="1"/>
+          </p:nvPr>
+        </p:nvPicPr>
+        <p:blipFill>
+          <a:blip r:embed="rId1"/>
+          <a:srcRect l="926" t="5698" r="20205"/>
+          <a:stretch>
+            <a:fillRect/>
+          </a:stretch>
+        </p:blipFill>
+        <p:spPr>
+          <a:xfrm>
+            <a:off x="824865" y="2342515"/>
+            <a:ext cx="7494270" cy="2799715"/>
+          </a:xfrm>
+          <a:prstGeom prst="rect">
+            <a:avLst/>
+          </a:prstGeom>
+        </p:spPr>
+      </p:pic>
+      <p:sp>
+        <p:nvSpPr>
+          <p:cNvPr id="13" name="Caixa de Texto 12"/>
+          <p:cNvSpPr txBox="1"/>
+          <p:nvPr/>
+        </p:nvSpPr>
+        <p:spPr>
+          <a:xfrm>
+            <a:off x="824865" y="5142230"/>
+            <a:ext cx="1599565" cy="306705"/>
+          </a:xfrm>
+          <a:prstGeom prst="rect">
+            <a:avLst/>
+          </a:prstGeom>
+          <a:noFill/>
+        </p:spPr>
+        <p:txBody>
+          <a:bodyPr wrap="none" rtlCol="0">
+            <a:spAutoFit/>
+          </a:bodyPr>
+          <a:p>
+            <a:pPr algn="l"/>
+            <a:r>
+              <a:rPr lang="pt-BR" altLang="en-US" sz="1400"/>
+              <a:t>Fonte: Autor (2018)</a:t>
+            </a:r>
+            <a:endParaRPr lang="pt-BR" altLang="en-US" sz="1400"/>
+          </a:p>
+        </p:txBody>
+      </p:sp>
+    </p:spTree>
+  </p:cSld>
+  <p:clrMapOvr>
+    <a:masterClrMapping/>
+  </p:clrMapOvr>
+</p:sld>
+</file>
+
+<file path=ppt/slides/slide42.xml><?xml version="1.0" encoding="utf-8"?>
 <p:sld xmlns:a="http://schemas.openxmlformats.org/drawingml/2006/main" xmlns:r="http://schemas.openxmlformats.org/officeDocument/2006/relationships" xmlns:p="http://schemas.openxmlformats.org/presentationml/2006/main">
   <p:cSld>
     <p:spTree>
@@ -7882,7 +10510,7 @@
 </p:sld>
 </file>
 
-<file path=ppt/slides/slide25.xml><?xml version="1.0" encoding="utf-8"?>
+<file path=ppt/slides/slide43.xml><?xml version="1.0" encoding="utf-8"?>
 <p:sld xmlns:a="http://schemas.openxmlformats.org/drawingml/2006/main" xmlns:r="http://schemas.openxmlformats.org/officeDocument/2006/relationships" xmlns:p="http://schemas.openxmlformats.org/presentationml/2006/main">
   <p:cSld>
     <p:spTree>
@@ -7915,16 +10543,8 @@
           <a:lstStyle/>
           <a:p>
             <a:r>
-              <a:rPr lang="en-US" dirty="0" err="1" smtClean="0"/>
-              <a:t>Considerações</a:t>
-            </a:r>
-            <a:r>
-              <a:rPr lang="en-US" dirty="0" smtClean="0"/>
-              <a:t> </a:t>
-            </a:r>
-            <a:r>
-              <a:rPr lang="en-US" dirty="0" err="1" smtClean="0"/>
-              <a:t>Finais</a:t>
+              <a:rPr lang="pt-BR" dirty="0" err="1" smtClean="0"/>
+              <a:t>Principais Conclusões</a:t>
             </a:r>
             <a:endParaRPr lang="pt-BR" dirty="0"/>
           </a:p>
@@ -7940,70 +10560,29 @@
             <p:ph idx="1"/>
           </p:nvPr>
         </p:nvSpPr>
-        <p:spPr/>
+        <p:spPr>
+          <a:xfrm>
+            <a:off x="628650" y="2796540"/>
+            <a:ext cx="7886700" cy="3402965"/>
+          </a:xfrm>
+        </p:spPr>
         <p:txBody>
           <a:bodyPr/>
           <a:lstStyle/>
           <a:p>
             <a:r>
-              <a:rPr lang="pt-BR" dirty="0"/>
-              <a:t>Textos com, no m</a:t>
-            </a:r>
-            <a:r>
-              <a:rPr lang="en-US" dirty="0" err="1"/>
-              <a:t>áximo</a:t>
-            </a:r>
-            <a:r>
-              <a:rPr lang="en-US" dirty="0"/>
-              <a:t>, 3 </a:t>
-            </a:r>
-            <a:r>
-              <a:rPr lang="en-US" dirty="0" err="1"/>
-              <a:t>linhas</a:t>
-            </a:r>
-            <a:endParaRPr lang="en-US" dirty="0"/>
-          </a:p>
-          <a:p>
-            <a:endParaRPr lang="en-US" dirty="0"/>
-          </a:p>
-          <a:p>
-            <a:r>
-              <a:rPr lang="en-US" dirty="0"/>
-              <a:t>No </a:t>
-            </a:r>
-            <a:r>
-              <a:rPr lang="en-US" dirty="0" err="1"/>
-              <a:t>máximo</a:t>
-            </a:r>
-            <a:r>
-              <a:rPr lang="en-US" dirty="0"/>
-              <a:t> </a:t>
-            </a:r>
-            <a:r>
-              <a:rPr lang="en-US" dirty="0" err="1"/>
-              <a:t>dois</a:t>
-            </a:r>
-            <a:r>
-              <a:rPr lang="en-US" dirty="0"/>
-              <a:t> </a:t>
-            </a:r>
-            <a:r>
-              <a:rPr lang="en-US" dirty="0" err="1"/>
-              <a:t>tópicos</a:t>
-            </a:r>
-            <a:r>
-              <a:rPr lang="en-US" dirty="0"/>
-              <a:t> </a:t>
-            </a:r>
-            <a:r>
-              <a:rPr lang="en-US" dirty="0" err="1"/>
-              <a:t>por</a:t>
-            </a:r>
-            <a:r>
-              <a:rPr lang="en-US" dirty="0"/>
-              <a:t> slide</a:t>
-            </a:r>
-            <a:endParaRPr lang="en-US" dirty="0"/>
+              <a:t>Reduzir custos operacionais com transporte </a:t>
+            </a:r>
+          </a:p>
+          <a:p/>
+          <a:p>
+            <a:r>
+              <a:t>Aumentar a rentabilidade da empresa</a:t>
+            </a:r>
+          </a:p>
+          <a:p/>
+          <a:p>
+            <a:endParaRPr lang="pt-BR"/>
           </a:p>
         </p:txBody>
       </p:sp>
@@ -8044,7 +10623,288 @@
 </p:sld>
 </file>
 
-<file path=ppt/slides/slide26.xml><?xml version="1.0" encoding="utf-8"?>
+<file path=ppt/slides/slide44.xml><?xml version="1.0" encoding="utf-8"?>
+<p:sld xmlns:a="http://schemas.openxmlformats.org/drawingml/2006/main" xmlns:r="http://schemas.openxmlformats.org/officeDocument/2006/relationships" xmlns:p="http://schemas.openxmlformats.org/presentationml/2006/main">
+  <p:cSld>
+    <p:spTree>
+      <p:nvGrpSpPr>
+        <p:cNvPr id="1" name=""/>
+        <p:cNvGrpSpPr/>
+        <p:nvPr/>
+      </p:nvGrpSpPr>
+      <p:grpSpPr/>
+      <p:sp>
+        <p:nvSpPr>
+          <p:cNvPr id="2" name="Título 1"/>
+          <p:cNvSpPr>
+            <a:spLocks noGrp="1"/>
+          </p:cNvSpPr>
+          <p:nvPr>
+            <p:ph type="title"/>
+          </p:nvPr>
+        </p:nvSpPr>
+        <p:spPr/>
+        <p:txBody>
+          <a:bodyPr>
+            <a:normAutofit/>
+          </a:bodyPr>
+          <a:p>
+            <a:r>
+              <a:rPr lang="pt-BR" dirty="0" err="1" smtClean="0">
+                <a:sym typeface="+mn-ea"/>
+              </a:rPr>
+              <a:t>Principais Conclusões</a:t>
+            </a:r>
+            <a:endParaRPr lang="en-US"/>
+          </a:p>
+        </p:txBody>
+      </p:sp>
+      <p:sp>
+        <p:nvSpPr>
+          <p:cNvPr id="3" name="Espaço Reservado para Conteúdo 2"/>
+          <p:cNvSpPr>
+            <a:spLocks noGrp="1"/>
+          </p:cNvSpPr>
+          <p:nvPr>
+            <p:ph idx="1"/>
+          </p:nvPr>
+        </p:nvSpPr>
+        <p:spPr>
+          <a:xfrm>
+            <a:off x="628650" y="3075940"/>
+            <a:ext cx="7886700" cy="3101340"/>
+          </a:xfrm>
+        </p:spPr>
+        <p:txBody>
+          <a:bodyPr/>
+          <a:p>
+            <a:r>
+              <a:rPr>
+                <a:sym typeface="+mn-ea"/>
+              </a:rPr>
+              <a:t>Reduzir tempo desperdiçado</a:t>
+            </a:r>
+            <a:r>
+              <a:rPr lang="pt-BR">
+                <a:sym typeface="+mn-ea"/>
+              </a:rPr>
+              <a:t>	</a:t>
+            </a:r>
+            <a:endParaRPr lang="pt-BR"/>
+          </a:p>
+          <a:p>
+            <a:endParaRPr lang="pt-BR"/>
+          </a:p>
+          <a:p>
+            <a:r>
+              <a:rPr lang="pt-BR">
+                <a:sym typeface="+mn-ea"/>
+              </a:rPr>
+              <a:t>Proporcionar melhoria nos serviços da empresa</a:t>
+            </a:r>
+            <a:endParaRPr lang="pt-BR"/>
+          </a:p>
+          <a:p>
+            <a:endParaRPr lang="en-US"/>
+          </a:p>
+        </p:txBody>
+      </p:sp>
+      <p:sp>
+        <p:nvSpPr>
+          <p:cNvPr id="4" name="Espaço Reservado para Número de Slide 3"/>
+          <p:cNvSpPr>
+            <a:spLocks noGrp="1"/>
+          </p:cNvSpPr>
+          <p:nvPr>
+            <p:ph type="sldNum" sz="quarter" idx="12"/>
+          </p:nvPr>
+        </p:nvSpPr>
+        <p:spPr/>
+        <p:txBody>
+          <a:bodyPr/>
+          <a:p>
+            <a:fld id="{CFCDC573-C9BE-334B-B909-19E2F28512E7}" type="slidenum">
+              <a:rPr lang="pt-BR" smtClean="0"/>
+            </a:fld>
+            <a:endParaRPr lang="pt-BR"/>
+          </a:p>
+        </p:txBody>
+      </p:sp>
+    </p:spTree>
+  </p:cSld>
+  <p:clrMapOvr>
+    <a:masterClrMapping/>
+  </p:clrMapOvr>
+</p:sld>
+</file>
+
+<file path=ppt/slides/slide45.xml><?xml version="1.0" encoding="utf-8"?>
+<p:sld xmlns:a="http://schemas.openxmlformats.org/drawingml/2006/main" xmlns:r="http://schemas.openxmlformats.org/officeDocument/2006/relationships" xmlns:p="http://schemas.openxmlformats.org/presentationml/2006/main">
+  <p:cSld>
+    <p:spTree>
+      <p:nvGrpSpPr>
+        <p:cNvPr id="1" name=""/>
+        <p:cNvGrpSpPr/>
+        <p:nvPr/>
+      </p:nvGrpSpPr>
+      <p:grpSpPr/>
+      <p:sp>
+        <p:nvSpPr>
+          <p:cNvPr id="2" name="Título 1"/>
+          <p:cNvSpPr>
+            <a:spLocks noGrp="1"/>
+          </p:cNvSpPr>
+          <p:nvPr>
+            <p:ph type="title"/>
+          </p:nvPr>
+        </p:nvSpPr>
+        <p:spPr>
+          <a:xfrm>
+            <a:off x="628650" y="2958466"/>
+            <a:ext cx="7886700" cy="1325563"/>
+          </a:xfrm>
+        </p:spPr>
+        <p:txBody>
+          <a:bodyPr>
+            <a:normAutofit fontScale="90000"/>
+          </a:bodyPr>
+          <a:p>
+            <a:r>
+              <a:rPr lang="en-US"/>
+              <a:t>Considerações Gerais, Limitações e Dificuldades</a:t>
+            </a:r>
+            <a:endParaRPr lang="en-US"/>
+          </a:p>
+        </p:txBody>
+      </p:sp>
+      <p:sp>
+        <p:nvSpPr>
+          <p:cNvPr id="4" name="Espaço Reservado para Número de Slide 3"/>
+          <p:cNvSpPr>
+            <a:spLocks noGrp="1"/>
+          </p:cNvSpPr>
+          <p:nvPr>
+            <p:ph type="sldNum" sz="quarter" idx="12"/>
+          </p:nvPr>
+        </p:nvSpPr>
+        <p:spPr/>
+        <p:txBody>
+          <a:bodyPr/>
+          <a:p>
+            <a:fld id="{CFCDC573-C9BE-334B-B909-19E2F28512E7}" type="slidenum">
+              <a:rPr lang="pt-BR" smtClean="0"/>
+            </a:fld>
+            <a:endParaRPr lang="pt-BR"/>
+          </a:p>
+        </p:txBody>
+      </p:sp>
+    </p:spTree>
+  </p:cSld>
+  <p:clrMapOvr>
+    <a:masterClrMapping/>
+  </p:clrMapOvr>
+</p:sld>
+</file>
+
+<file path=ppt/slides/slide46.xml><?xml version="1.0" encoding="utf-8"?>
+<p:sld xmlns:a="http://schemas.openxmlformats.org/drawingml/2006/main" xmlns:r="http://schemas.openxmlformats.org/officeDocument/2006/relationships" xmlns:p="http://schemas.openxmlformats.org/presentationml/2006/main">
+  <p:cSld>
+    <p:spTree>
+      <p:nvGrpSpPr>
+        <p:cNvPr id="1" name=""/>
+        <p:cNvGrpSpPr/>
+        <p:nvPr/>
+      </p:nvGrpSpPr>
+      <p:grpSpPr/>
+      <p:sp>
+        <p:nvSpPr>
+          <p:cNvPr id="2" name="Título 1"/>
+          <p:cNvSpPr>
+            <a:spLocks noGrp="1"/>
+          </p:cNvSpPr>
+          <p:nvPr>
+            <p:ph type="title"/>
+          </p:nvPr>
+        </p:nvSpPr>
+        <p:spPr/>
+        <p:txBody>
+          <a:bodyPr/>
+          <a:p>
+            <a:r>
+              <a:rPr lang="en-US"/>
+              <a:t>Sugestão de trabalho futuro</a:t>
+            </a:r>
+            <a:endParaRPr lang="en-US"/>
+          </a:p>
+        </p:txBody>
+      </p:sp>
+      <p:sp>
+        <p:nvSpPr>
+          <p:cNvPr id="3" name="Espaço Reservado para Conteúdo 2"/>
+          <p:cNvSpPr>
+            <a:spLocks noGrp="1"/>
+          </p:cNvSpPr>
+          <p:nvPr>
+            <p:ph idx="1"/>
+          </p:nvPr>
+        </p:nvSpPr>
+        <p:spPr>
+          <a:xfrm>
+            <a:off x="628650" y="2404745"/>
+            <a:ext cx="7886700" cy="3772535"/>
+          </a:xfrm>
+        </p:spPr>
+        <p:txBody>
+          <a:bodyPr/>
+          <a:p>
+            <a:r>
+              <a:rPr lang="en-US"/>
+              <a:t>Transferir a utilização do mapa do Google Maps para o Bing Maps</a:t>
+            </a:r>
+            <a:endParaRPr lang="en-US"/>
+          </a:p>
+          <a:p>
+            <a:endParaRPr lang="en-US"/>
+          </a:p>
+          <a:p>
+            <a:r>
+              <a:rPr lang="en-US"/>
+              <a:t>Desenvolver exclusão lógica dos objetos</a:t>
+            </a:r>
+            <a:endParaRPr lang="en-US"/>
+          </a:p>
+        </p:txBody>
+      </p:sp>
+      <p:sp>
+        <p:nvSpPr>
+          <p:cNvPr id="4" name="Espaço Reservado para Número de Slide 3"/>
+          <p:cNvSpPr>
+            <a:spLocks noGrp="1"/>
+          </p:cNvSpPr>
+          <p:nvPr>
+            <p:ph type="sldNum" sz="quarter" idx="12"/>
+          </p:nvPr>
+        </p:nvSpPr>
+        <p:spPr/>
+        <p:txBody>
+          <a:bodyPr/>
+          <a:p>
+            <a:fld id="{CFCDC573-C9BE-334B-B909-19E2F28512E7}" type="slidenum">
+              <a:rPr lang="pt-BR" smtClean="0"/>
+            </a:fld>
+            <a:endParaRPr lang="pt-BR"/>
+          </a:p>
+        </p:txBody>
+      </p:sp>
+    </p:spTree>
+  </p:cSld>
+  <p:clrMapOvr>
+    <a:masterClrMapping/>
+  </p:clrMapOvr>
+</p:sld>
+</file>
+
+<file path=ppt/slides/slide47.xml><?xml version="1.0" encoding="utf-8"?>
 <p:sld xmlns:a="http://schemas.openxmlformats.org/drawingml/2006/main" xmlns:r="http://schemas.openxmlformats.org/officeDocument/2006/relationships" xmlns:p="http://schemas.openxmlformats.org/presentationml/2006/main">
   <p:cSld>
     <p:spTree>
@@ -8409,7 +11269,7 @@
 </p:sld>
 </file>
 
-<file path=ppt/slides/slide27.xml><?xml version="1.0" encoding="utf-8"?>
+<file path=ppt/slides/slide48.xml><?xml version="1.0" encoding="utf-8"?>
 <p:sld xmlns:a="http://schemas.openxmlformats.org/drawingml/2006/main" xmlns:r="http://schemas.openxmlformats.org/officeDocument/2006/relationships" xmlns:p="http://schemas.openxmlformats.org/presentationml/2006/main">
   <p:cSld>
     <p:spTree>
@@ -8461,70 +11321,39 @@
         </p:nvSpPr>
         <p:spPr/>
         <p:txBody>
-          <a:bodyPr/>
+          <a:bodyPr>
+            <a:normAutofit lnSpcReduction="20000"/>
+          </a:bodyPr>
           <a:lstStyle/>
           <a:p>
             <a:r>
-              <a:rPr lang="en-US" dirty="0" err="1" smtClean="0"/>
-              <a:t>Coloque</a:t>
-            </a:r>
-            <a:r>
-              <a:rPr lang="en-US" dirty="0" smtClean="0"/>
-              <a:t> </a:t>
-            </a:r>
-            <a:r>
-              <a:rPr lang="en-US" dirty="0" err="1" smtClean="0"/>
-              <a:t>apenas</a:t>
-            </a:r>
-            <a:r>
-              <a:rPr lang="en-US" dirty="0" smtClean="0"/>
-              <a:t> as </a:t>
-            </a:r>
-            <a:r>
-              <a:rPr lang="en-US" dirty="0" err="1" smtClean="0"/>
-              <a:t>referências</a:t>
-            </a:r>
-            <a:r>
-              <a:rPr lang="en-US" dirty="0" smtClean="0"/>
-              <a:t> </a:t>
-            </a:r>
-            <a:r>
-              <a:rPr lang="en-US" dirty="0" err="1" smtClean="0"/>
-              <a:t>que</a:t>
-            </a:r>
-            <a:r>
-              <a:rPr lang="en-US" dirty="0" smtClean="0"/>
-              <a:t> </a:t>
-            </a:r>
-            <a:r>
-              <a:rPr lang="en-US" dirty="0" err="1" smtClean="0"/>
-              <a:t>foram</a:t>
-            </a:r>
-            <a:r>
-              <a:rPr lang="en-US" dirty="0" smtClean="0"/>
-              <a:t> </a:t>
-            </a:r>
-            <a:r>
-              <a:rPr lang="en-US" dirty="0" err="1" smtClean="0"/>
-              <a:t>utilizadas</a:t>
-            </a:r>
-            <a:r>
-              <a:rPr lang="en-US" dirty="0" smtClean="0"/>
-              <a:t> </a:t>
-            </a:r>
-            <a:r>
-              <a:rPr lang="en-US" dirty="0" err="1" smtClean="0"/>
-              <a:t>na</a:t>
-            </a:r>
-            <a:r>
-              <a:rPr lang="en-US" dirty="0" smtClean="0"/>
-              <a:t> </a:t>
-            </a:r>
-            <a:r>
-              <a:rPr lang="en-US" dirty="0" err="1" smtClean="0"/>
-              <a:t>apresentação</a:t>
-            </a:r>
-            <a:endParaRPr lang="en-US" dirty="0"/>
+              <a:rPr lang="en-US" smtClean="0"/>
+              <a:t>FLEURY, P. F. Vantagens competitivas e estratégicas no uso de operadores logísticos. Revista TecnoLogística, São Paulo, ano V, n. 46, set. 1999.</a:t>
+            </a:r>
+            <a:endParaRPr lang="en-US" smtClean="0"/>
+          </a:p>
+          <a:p>
+            <a:endParaRPr lang="en-US" smtClean="0"/>
+          </a:p>
+          <a:p>
+            <a:r>
+              <a:rPr lang="en-US" smtClean="0"/>
+              <a:t>DORNIER, P. ERNST, R. FENDER, Michel. KOUVELIS, Panos. Logística e operações globais. Textos e casos.  São Paulo: Atlas, 2000.</a:t>
+            </a:r>
+            <a:endParaRPr lang="en-US" smtClean="0"/>
+          </a:p>
+          <a:p>
+            <a:endParaRPr lang="en-US" smtClean="0"/>
+          </a:p>
+          <a:p>
+            <a:r>
+              <a:rPr lang="en-US" smtClean="0"/>
+              <a:t>NAZÁRIO, P. A importância de sistemas de informação para a competitividade logística. Rio de Janeiro: Centro de Estudos em Logística, Coppead, 1999.</a:t>
+            </a:r>
+            <a:endParaRPr lang="en-US" smtClean="0"/>
+          </a:p>
+          <a:p>
+            <a:endParaRPr lang="en-US" smtClean="0"/>
           </a:p>
         </p:txBody>
       </p:sp>
@@ -8565,7 +11394,219 @@
 </p:sld>
 </file>
 
-<file path=ppt/slides/slide28.xml><?xml version="1.0" encoding="utf-8"?>
+<file path=ppt/slides/slide49.xml><?xml version="1.0" encoding="utf-8"?>
+<p:sld xmlns:a="http://schemas.openxmlformats.org/drawingml/2006/main" xmlns:r="http://schemas.openxmlformats.org/officeDocument/2006/relationships" xmlns:p="http://schemas.openxmlformats.org/presentationml/2006/main">
+  <p:cSld>
+    <p:spTree>
+      <p:nvGrpSpPr>
+        <p:cNvPr id="1" name=""/>
+        <p:cNvGrpSpPr/>
+        <p:nvPr/>
+      </p:nvGrpSpPr>
+      <p:grpSpPr/>
+      <p:sp>
+        <p:nvSpPr>
+          <p:cNvPr id="2" name="Título 1"/>
+          <p:cNvSpPr>
+            <a:spLocks noGrp="1"/>
+          </p:cNvSpPr>
+          <p:nvPr>
+            <p:ph type="title"/>
+          </p:nvPr>
+        </p:nvSpPr>
+        <p:spPr/>
+        <p:txBody>
+          <a:bodyPr>
+            <a:normAutofit/>
+          </a:bodyPr>
+          <a:p>
+            <a:r>
+              <a:rPr lang="en-US" dirty="0" err="1" smtClean="0">
+                <a:sym typeface="+mn-ea"/>
+              </a:rPr>
+              <a:t>Referências</a:t>
+            </a:r>
+            <a:endParaRPr lang="en-US"/>
+          </a:p>
+        </p:txBody>
+      </p:sp>
+      <p:sp>
+        <p:nvSpPr>
+          <p:cNvPr id="3" name="Espaço Reservado para Conteúdo 2"/>
+          <p:cNvSpPr>
+            <a:spLocks noGrp="1"/>
+          </p:cNvSpPr>
+          <p:nvPr>
+            <p:ph idx="1"/>
+          </p:nvPr>
+        </p:nvSpPr>
+        <p:spPr/>
+        <p:txBody>
+          <a:bodyPr>
+            <a:normAutofit lnSpcReduction="10000"/>
+          </a:bodyPr>
+          <a:p>
+            <a:r>
+              <a:rPr lang="en-US"/>
+              <a:t>CHOPRA, S. MEINDL, P. Gerenciamento da cadeia de suprimento: Estratégia, planejamento e operação. São Paulo: Prentice Hall, 2003.</a:t>
+            </a:r>
+            <a:endParaRPr lang="en-US"/>
+          </a:p>
+          <a:p>
+            <a:endParaRPr lang="en-US"/>
+          </a:p>
+          <a:p>
+            <a:r>
+              <a:rPr lang="en-US"/>
+              <a:t>CENTRO DE ESTUDOS EM LOGÍSTICA –CEL/COPPEAD. Panorama Logístico – Gestão do Transporte Rodoviário de Cargas nas Empresas - Práticas e Tendências, 2007.</a:t>
+            </a:r>
+            <a:endParaRPr lang="en-US"/>
+          </a:p>
+          <a:p>
+            <a:endParaRPr lang="en-US"/>
+          </a:p>
+          <a:p>
+            <a:r>
+              <a:rPr lang="pt-BR" altLang="en-US"/>
+              <a:t>-- Referenciar Ilos e Dados Da industria Cearense</a:t>
+            </a:r>
+            <a:endParaRPr lang="pt-BR" altLang="en-US"/>
+          </a:p>
+        </p:txBody>
+      </p:sp>
+      <p:sp>
+        <p:nvSpPr>
+          <p:cNvPr id="4" name="Espaço Reservado para Número de Slide 3"/>
+          <p:cNvSpPr>
+            <a:spLocks noGrp="1"/>
+          </p:cNvSpPr>
+          <p:nvPr>
+            <p:ph type="sldNum" sz="quarter" idx="12"/>
+          </p:nvPr>
+        </p:nvSpPr>
+        <p:spPr/>
+        <p:txBody>
+          <a:bodyPr/>
+          <a:p>
+            <a:fld id="{CFCDC573-C9BE-334B-B909-19E2F28512E7}" type="slidenum">
+              <a:rPr lang="pt-BR" smtClean="0"/>
+            </a:fld>
+            <a:endParaRPr lang="pt-BR"/>
+          </a:p>
+        </p:txBody>
+      </p:sp>
+    </p:spTree>
+  </p:cSld>
+  <p:clrMapOvr>
+    <a:masterClrMapping/>
+  </p:clrMapOvr>
+</p:sld>
+</file>
+
+<file path=ppt/slides/slide5.xml><?xml version="1.0" encoding="utf-8"?>
+<p:sld xmlns:a="http://schemas.openxmlformats.org/drawingml/2006/main" xmlns:r="http://schemas.openxmlformats.org/officeDocument/2006/relationships" xmlns:p="http://schemas.openxmlformats.org/presentationml/2006/main">
+  <p:cSld>
+    <p:spTree>
+      <p:nvGrpSpPr>
+        <p:cNvPr id="1" name=""/>
+        <p:cNvGrpSpPr/>
+        <p:nvPr/>
+      </p:nvGrpSpPr>
+      <p:grpSpPr/>
+      <p:sp>
+        <p:nvSpPr>
+          <p:cNvPr id="2" name="Título 1"/>
+          <p:cNvSpPr>
+            <a:spLocks noGrp="1"/>
+          </p:cNvSpPr>
+          <p:nvPr>
+            <p:ph type="title"/>
+          </p:nvPr>
+        </p:nvSpPr>
+        <p:spPr/>
+        <p:txBody>
+          <a:bodyPr>
+            <a:normAutofit/>
+          </a:bodyPr>
+          <a:p>
+            <a:r>
+              <a:rPr lang="pt-BR" dirty="0" err="1" smtClean="0">
+                <a:sym typeface="+mn-ea"/>
+              </a:rPr>
+              <a:t>Introduç</a:t>
+            </a:r>
+            <a:r>
+              <a:rPr lang="en-US" dirty="0" err="1" smtClean="0">
+                <a:sym typeface="+mn-ea"/>
+              </a:rPr>
+              <a:t>ão</a:t>
+            </a:r>
+            <a:endParaRPr lang="pt-BR" altLang="en-US"/>
+          </a:p>
+        </p:txBody>
+      </p:sp>
+      <p:sp>
+        <p:nvSpPr>
+          <p:cNvPr id="3" name="Espaço Reservado para Conteúdo 2"/>
+          <p:cNvSpPr>
+            <a:spLocks noGrp="1"/>
+          </p:cNvSpPr>
+          <p:nvPr>
+            <p:ph idx="1"/>
+          </p:nvPr>
+        </p:nvSpPr>
+        <p:spPr/>
+        <p:txBody>
+          <a:bodyPr/>
+          <a:p>
+            <a:r>
+              <a:rPr lang="pt-BR" altLang="en-US"/>
+              <a:t>Desde a antiguidade, a logística já fazia parte das guerras, devido ao deslocamento de tropas, suprimentos e armamentos.</a:t>
+            </a:r>
+            <a:endParaRPr lang="pt-BR" altLang="en-US"/>
+          </a:p>
+          <a:p>
+            <a:endParaRPr lang="pt-BR" altLang="en-US"/>
+          </a:p>
+          <a:p>
+            <a:r>
+              <a:rPr lang="pt-BR" altLang="en-US"/>
+              <a:t>Logistica foi evoluindo com o tempo até chegar no atual cenário de cadeia de suprimentos.</a:t>
+            </a:r>
+            <a:endParaRPr lang="pt-BR" altLang="en-US"/>
+          </a:p>
+        </p:txBody>
+      </p:sp>
+      <p:sp>
+        <p:nvSpPr>
+          <p:cNvPr id="4" name="Espaço Reservado para Número de Slide 3"/>
+          <p:cNvSpPr>
+            <a:spLocks noGrp="1"/>
+          </p:cNvSpPr>
+          <p:nvPr>
+            <p:ph type="sldNum" sz="quarter" idx="12"/>
+          </p:nvPr>
+        </p:nvSpPr>
+        <p:spPr/>
+        <p:txBody>
+          <a:bodyPr/>
+          <a:p>
+            <a:fld id="{CFCDC573-C9BE-334B-B909-19E2F28512E7}" type="slidenum">
+              <a:rPr lang="pt-BR" smtClean="0"/>
+            </a:fld>
+            <a:endParaRPr lang="pt-BR"/>
+          </a:p>
+        </p:txBody>
+      </p:sp>
+    </p:spTree>
+  </p:cSld>
+  <p:clrMapOvr>
+    <a:masterClrMapping/>
+  </p:clrMapOvr>
+</p:sld>
+</file>
+
+<file path=ppt/slides/slide50.xml><?xml version="1.0" encoding="utf-8"?>
 <p:sld xmlns:a="http://schemas.openxmlformats.org/drawingml/2006/main" xmlns:r="http://schemas.openxmlformats.org/officeDocument/2006/relationships" xmlns:p="http://schemas.openxmlformats.org/presentationml/2006/main">
   <p:cSld>
     <p:spTree>
@@ -8665,613 +11706,6 @@
       </p:par>
     </p:tnLst>
   </p:timing>
-</p:sld>
-</file>
-
-<file path=ppt/slides/slide3.xml><?xml version="1.0" encoding="utf-8"?>
-<p:sld xmlns:a="http://schemas.openxmlformats.org/drawingml/2006/main" xmlns:r="http://schemas.openxmlformats.org/officeDocument/2006/relationships" xmlns:p="http://schemas.openxmlformats.org/presentationml/2006/main">
-  <p:cSld>
-    <p:spTree>
-      <p:nvGrpSpPr>
-        <p:cNvPr id="1" name=""/>
-        <p:cNvGrpSpPr/>
-        <p:nvPr/>
-      </p:nvGrpSpPr>
-      <p:grpSpPr>
-        <a:xfrm>
-          <a:off x="0" y="0"/>
-          <a:ext cx="0" cy="0"/>
-          <a:chOff x="0" y="0"/>
-          <a:chExt cx="0" cy="0"/>
-        </a:xfrm>
-      </p:grpSpPr>
-      <p:sp>
-        <p:nvSpPr>
-          <p:cNvPr id="4" name="Rectangle 3"/>
-          <p:cNvSpPr/>
-          <p:nvPr/>
-        </p:nvSpPr>
-        <p:spPr>
-          <a:xfrm>
-            <a:off x="628650" y="1825628"/>
-            <a:ext cx="7886700" cy="417513"/>
-          </a:xfrm>
-          <a:prstGeom prst="rect">
-            <a:avLst/>
-          </a:prstGeom>
-          <a:solidFill>
-            <a:schemeClr val="accent2">
-              <a:alpha val="40000"/>
-            </a:schemeClr>
-          </a:solidFill>
-          <a:ln>
-            <a:noFill/>
-          </a:ln>
-        </p:spPr>
-        <p:style>
-          <a:lnRef idx="2">
-            <a:schemeClr val="accent1">
-              <a:shade val="50000"/>
-            </a:schemeClr>
-          </a:lnRef>
-          <a:fillRef idx="1">
-            <a:schemeClr val="accent1"/>
-          </a:fillRef>
-          <a:effectRef idx="0">
-            <a:schemeClr val="accent1"/>
-          </a:effectRef>
-          <a:fontRef idx="minor">
-            <a:schemeClr val="lt1"/>
-          </a:fontRef>
-        </p:style>
-        <p:txBody>
-          <a:bodyPr rtlCol="0" anchor="ctr"/>
-          <a:lstStyle/>
-          <a:p>
-            <a:pPr algn="ctr"/>
-            <a:endParaRPr lang="pt-BR"/>
-          </a:p>
-        </p:txBody>
-      </p:sp>
-      <p:sp>
-        <p:nvSpPr>
-          <p:cNvPr id="3" name="Content Placeholder 2"/>
-          <p:cNvSpPr>
-            <a:spLocks noGrp="1"/>
-          </p:cNvSpPr>
-          <p:nvPr>
-            <p:ph idx="1"/>
-          </p:nvPr>
-        </p:nvSpPr>
-        <p:spPr/>
-        <p:txBody>
-          <a:bodyPr anchor="ctr"/>
-          <a:lstStyle/>
-          <a:p>
-            <a:r>
-              <a:rPr lang="pt-BR" dirty="0" err="1" smtClean="0"/>
-              <a:t>Introduç</a:t>
-            </a:r>
-            <a:r>
-              <a:rPr lang="en-US" dirty="0" err="1" smtClean="0"/>
-              <a:t>ão</a:t>
-            </a:r>
-            <a:endParaRPr lang="en-US" dirty="0" smtClean="0"/>
-          </a:p>
-          <a:p>
-            <a:r>
-              <a:rPr lang="en-US" dirty="0" err="1" smtClean="0">
-                <a:solidFill>
-                  <a:schemeClr val="bg1">
-                    <a:lumMod val="50000"/>
-                  </a:schemeClr>
-                </a:solidFill>
-              </a:rPr>
-              <a:t>Objetivo</a:t>
-            </a:r>
-            <a:endParaRPr lang="en-US" dirty="0" smtClean="0">
-              <a:solidFill>
-                <a:schemeClr val="bg1">
-                  <a:lumMod val="50000"/>
-                </a:schemeClr>
-              </a:solidFill>
-            </a:endParaRPr>
-          </a:p>
-          <a:p>
-            <a:r>
-              <a:rPr lang="en-US" dirty="0" err="1" smtClean="0">
-                <a:solidFill>
-                  <a:schemeClr val="bg1">
-                    <a:lumMod val="50000"/>
-                  </a:schemeClr>
-                </a:solidFill>
-              </a:rPr>
-              <a:t>Fundamentação</a:t>
-            </a:r>
-            <a:r>
-              <a:rPr lang="en-US" dirty="0" smtClean="0">
-                <a:solidFill>
-                  <a:schemeClr val="bg1">
-                    <a:lumMod val="50000"/>
-                  </a:schemeClr>
-                </a:solidFill>
-              </a:rPr>
-              <a:t> </a:t>
-            </a:r>
-            <a:r>
-              <a:rPr lang="en-US" dirty="0" err="1" smtClean="0">
-                <a:solidFill>
-                  <a:schemeClr val="bg1">
-                    <a:lumMod val="50000"/>
-                  </a:schemeClr>
-                </a:solidFill>
-              </a:rPr>
-              <a:t>Teórica</a:t>
-            </a:r>
-            <a:endParaRPr lang="en-US" dirty="0" smtClean="0">
-              <a:solidFill>
-                <a:schemeClr val="bg1">
-                  <a:lumMod val="50000"/>
-                </a:schemeClr>
-              </a:solidFill>
-            </a:endParaRPr>
-          </a:p>
-          <a:p>
-            <a:r>
-              <a:rPr lang="en-US" dirty="0" err="1" smtClean="0">
-                <a:solidFill>
-                  <a:schemeClr val="bg1">
-                    <a:lumMod val="50000"/>
-                  </a:schemeClr>
-                </a:solidFill>
-              </a:rPr>
-              <a:t>Título</a:t>
-            </a:r>
-            <a:r>
-              <a:rPr lang="en-US" dirty="0" smtClean="0">
-                <a:solidFill>
-                  <a:schemeClr val="bg1">
-                    <a:lumMod val="50000"/>
-                  </a:schemeClr>
-                </a:solidFill>
-              </a:rPr>
-              <a:t> </a:t>
-            </a:r>
-            <a:r>
-              <a:rPr lang="en-US" dirty="0" err="1" smtClean="0">
-                <a:solidFill>
-                  <a:schemeClr val="bg1">
-                    <a:lumMod val="50000"/>
-                  </a:schemeClr>
-                </a:solidFill>
-              </a:rPr>
-              <a:t>Capítulo</a:t>
-            </a:r>
-            <a:r>
-              <a:rPr lang="en-US" dirty="0" smtClean="0">
-                <a:solidFill>
-                  <a:schemeClr val="bg1">
-                    <a:lumMod val="50000"/>
-                  </a:schemeClr>
-                </a:solidFill>
-              </a:rPr>
-              <a:t> 3</a:t>
-            </a:r>
-            <a:endParaRPr lang="en-US" dirty="0" smtClean="0">
-              <a:solidFill>
-                <a:schemeClr val="bg1">
-                  <a:lumMod val="50000"/>
-                </a:schemeClr>
-              </a:solidFill>
-            </a:endParaRPr>
-          </a:p>
-          <a:p>
-            <a:r>
-              <a:rPr lang="en-US" dirty="0" err="1" smtClean="0">
-                <a:solidFill>
-                  <a:schemeClr val="bg1">
-                    <a:lumMod val="50000"/>
-                  </a:schemeClr>
-                </a:solidFill>
-              </a:rPr>
-              <a:t>Título</a:t>
-            </a:r>
-            <a:r>
-              <a:rPr lang="en-US" dirty="0" smtClean="0">
-                <a:solidFill>
-                  <a:schemeClr val="bg1">
-                    <a:lumMod val="50000"/>
-                  </a:schemeClr>
-                </a:solidFill>
-              </a:rPr>
-              <a:t> </a:t>
-            </a:r>
-            <a:r>
-              <a:rPr lang="en-US" dirty="0" err="1" smtClean="0">
-                <a:solidFill>
-                  <a:schemeClr val="bg1">
-                    <a:lumMod val="50000"/>
-                  </a:schemeClr>
-                </a:solidFill>
-              </a:rPr>
-              <a:t>Capítulo</a:t>
-            </a:r>
-            <a:r>
-              <a:rPr lang="en-US" dirty="0" smtClean="0">
-                <a:solidFill>
-                  <a:schemeClr val="bg1">
-                    <a:lumMod val="50000"/>
-                  </a:schemeClr>
-                </a:solidFill>
-              </a:rPr>
-              <a:t> 4</a:t>
-            </a:r>
-            <a:endParaRPr lang="en-US" dirty="0" smtClean="0">
-              <a:solidFill>
-                <a:schemeClr val="bg1">
-                  <a:lumMod val="50000"/>
-                </a:schemeClr>
-              </a:solidFill>
-            </a:endParaRPr>
-          </a:p>
-          <a:p>
-            <a:r>
-              <a:rPr lang="en-US" dirty="0" err="1" smtClean="0">
-                <a:solidFill>
-                  <a:schemeClr val="bg1">
-                    <a:lumMod val="50000"/>
-                  </a:schemeClr>
-                </a:solidFill>
-              </a:rPr>
-              <a:t>Considerações</a:t>
-            </a:r>
-            <a:r>
-              <a:rPr lang="en-US" dirty="0" smtClean="0">
-                <a:solidFill>
-                  <a:schemeClr val="bg1">
-                    <a:lumMod val="50000"/>
-                  </a:schemeClr>
-                </a:solidFill>
-              </a:rPr>
-              <a:t> </a:t>
-            </a:r>
-            <a:r>
-              <a:rPr lang="en-US" dirty="0" err="1" smtClean="0">
-                <a:solidFill>
-                  <a:schemeClr val="bg1">
-                    <a:lumMod val="50000"/>
-                  </a:schemeClr>
-                </a:solidFill>
-              </a:rPr>
-              <a:t>Finais</a:t>
-            </a:r>
-            <a:endParaRPr lang="en-US" dirty="0" smtClean="0">
-              <a:solidFill>
-                <a:schemeClr val="bg1">
-                  <a:lumMod val="50000"/>
-                </a:schemeClr>
-              </a:solidFill>
-            </a:endParaRPr>
-          </a:p>
-          <a:p>
-            <a:r>
-              <a:rPr lang="en-US" dirty="0" err="1" smtClean="0">
-                <a:solidFill>
-                  <a:schemeClr val="bg1">
-                    <a:lumMod val="50000"/>
-                  </a:schemeClr>
-                </a:solidFill>
-              </a:rPr>
-              <a:t>Referências</a:t>
-            </a:r>
-            <a:endParaRPr lang="pt-BR" dirty="0">
-              <a:solidFill>
-                <a:schemeClr val="bg1">
-                  <a:lumMod val="50000"/>
-                </a:schemeClr>
-              </a:solidFill>
-            </a:endParaRPr>
-          </a:p>
-        </p:txBody>
-      </p:sp>
-      <p:sp>
-        <p:nvSpPr>
-          <p:cNvPr id="5" name="Slide Number Placeholder 4"/>
-          <p:cNvSpPr>
-            <a:spLocks noGrp="1"/>
-          </p:cNvSpPr>
-          <p:nvPr>
-            <p:ph type="sldNum" sz="quarter" idx="12"/>
-          </p:nvPr>
-        </p:nvSpPr>
-        <p:spPr/>
-        <p:txBody>
-          <a:bodyPr/>
-          <a:lstStyle/>
-          <a:p>
-            <a:fld id="{CFCDC573-C9BE-334B-B909-19E2F28512E7}" type="slidenum">
-              <a:rPr lang="pt-BR" smtClean="0"/>
-            </a:fld>
-            <a:endParaRPr lang="pt-BR"/>
-          </a:p>
-        </p:txBody>
-      </p:sp>
-    </p:spTree>
-  </p:cSld>
-  <p:clrMapOvr>
-    <a:masterClrMapping/>
-  </p:clrMapOvr>
-  <mc:AlternateContent xmlns:mc="http://schemas.openxmlformats.org/markup-compatibility/2006">
-    <mc:Choice xmlns:p14="http://schemas.microsoft.com/office/powerpoint/2010/main" Requires="p14">
-      <p:transition p14:dur="250">
-        <p:fade/>
-      </p:transition>
-    </mc:Choice>
-    <mc:Fallback>
-      <p:transition>
-        <p:fade/>
-      </p:transition>
-    </mc:Fallback>
-  </mc:AlternateContent>
-  <p:timing>
-    <p:tnLst>
-      <p:par>
-        <p:cTn id="1" dur="indefinite" restart="never" nodeType="tmRoot"/>
-      </p:par>
-    </p:tnLst>
-  </p:timing>
-</p:sld>
-</file>
-
-<file path=ppt/slides/slide4.xml><?xml version="1.0" encoding="utf-8"?>
-<p:sld xmlns:a="http://schemas.openxmlformats.org/drawingml/2006/main" xmlns:r="http://schemas.openxmlformats.org/officeDocument/2006/relationships" xmlns:p="http://schemas.openxmlformats.org/presentationml/2006/main">
-  <p:cSld>
-    <p:spTree>
-      <p:nvGrpSpPr>
-        <p:cNvPr id="1" name=""/>
-        <p:cNvGrpSpPr/>
-        <p:nvPr/>
-      </p:nvGrpSpPr>
-      <p:grpSpPr>
-        <a:xfrm>
-          <a:off x="0" y="0"/>
-          <a:ext cx="0" cy="0"/>
-          <a:chOff x="0" y="0"/>
-          <a:chExt cx="0" cy="0"/>
-        </a:xfrm>
-      </p:grpSpPr>
-      <p:sp>
-        <p:nvSpPr>
-          <p:cNvPr id="2" name="Title 1"/>
-          <p:cNvSpPr>
-            <a:spLocks noGrp="1"/>
-          </p:cNvSpPr>
-          <p:nvPr>
-            <p:ph type="title"/>
-          </p:nvPr>
-        </p:nvSpPr>
-        <p:spPr/>
-        <p:txBody>
-          <a:bodyPr/>
-          <a:lstStyle/>
-          <a:p>
-            <a:r>
-              <a:rPr lang="pt-BR" dirty="0" err="1" smtClean="0"/>
-              <a:t>Introduç</a:t>
-            </a:r>
-            <a:r>
-              <a:rPr lang="en-US" dirty="0" err="1" smtClean="0"/>
-              <a:t>ão</a:t>
-            </a:r>
-            <a:endParaRPr lang="pt-BR" dirty="0"/>
-          </a:p>
-        </p:txBody>
-      </p:sp>
-      <p:sp>
-        <p:nvSpPr>
-          <p:cNvPr id="3" name="Content Placeholder 2"/>
-          <p:cNvSpPr>
-            <a:spLocks noGrp="1"/>
-          </p:cNvSpPr>
-          <p:nvPr>
-            <p:ph idx="1"/>
-          </p:nvPr>
-        </p:nvSpPr>
-        <p:spPr/>
-        <p:txBody>
-          <a:bodyPr>
-            <a:normAutofit/>
-          </a:bodyPr>
-          <a:lstStyle/>
-          <a:p>
-            <a:r>
-              <a:rPr smtClean="0"/>
-              <a:t>A logística é uma área vital e de extrema importância para as empresas (FLEURY, 1999).</a:t>
-            </a:r>
-            <a:endParaRPr smtClean="0"/>
-          </a:p>
-          <a:p>
-            <a:endParaRPr lang="en-US" dirty="0"/>
-          </a:p>
-          <a:p>
-            <a:r>
-              <a:rPr lang="en-US" smtClean="0"/>
-              <a:t>Empresas </a:t>
-            </a:r>
-            <a:r>
-              <a:rPr lang="pt-BR" altLang="en-US" smtClean="0"/>
-              <a:t>almejam lucro</a:t>
-            </a:r>
-            <a:r>
-              <a:rPr lang="en-US" smtClean="0"/>
-              <a:t>, portanto faz-se necessário atentarem-se as atividades logísticas  (DORNIER et al, 2000)</a:t>
-            </a:r>
-            <a:r>
-              <a:rPr lang="pt-BR" altLang="en-US" smtClean="0"/>
-              <a:t>.</a:t>
-            </a:r>
-            <a:endParaRPr lang="en-US" smtClean="0"/>
-          </a:p>
-          <a:p>
-            <a:endParaRPr lang="en-US" dirty="0"/>
-          </a:p>
-          <a:p>
-            <a:endParaRPr lang="en-US" dirty="0" smtClean="0"/>
-          </a:p>
-          <a:p>
-            <a:endParaRPr lang="en-US" dirty="0"/>
-          </a:p>
-          <a:p>
-            <a:pPr marL="0" indent="0" algn="r">
-              <a:buNone/>
-            </a:pPr>
-            <a:endParaRPr lang="en-US" sz="2000" dirty="0" smtClean="0"/>
-          </a:p>
-          <a:p>
-            <a:pPr marL="0" indent="0">
-              <a:buNone/>
-            </a:pPr>
-            <a:endParaRPr lang="en-US" dirty="0"/>
-          </a:p>
-        </p:txBody>
-      </p:sp>
-      <p:sp>
-        <p:nvSpPr>
-          <p:cNvPr id="4" name="Slide Number Placeholder 3"/>
-          <p:cNvSpPr>
-            <a:spLocks noGrp="1"/>
-          </p:cNvSpPr>
-          <p:nvPr>
-            <p:ph type="sldNum" sz="quarter" idx="12"/>
-          </p:nvPr>
-        </p:nvSpPr>
-        <p:spPr/>
-        <p:txBody>
-          <a:bodyPr/>
-          <a:lstStyle/>
-          <a:p>
-            <a:fld id="{CFCDC573-C9BE-334B-B909-19E2F28512E7}" type="slidenum">
-              <a:rPr lang="pt-BR" smtClean="0"/>
-            </a:fld>
-            <a:endParaRPr lang="pt-BR"/>
-          </a:p>
-        </p:txBody>
-      </p:sp>
-    </p:spTree>
-  </p:cSld>
-  <p:clrMapOvr>
-    <a:masterClrMapping/>
-  </p:clrMapOvr>
-  <p:timing>
-    <p:tnLst>
-      <p:par>
-        <p:cTn id="1" dur="indefinite" restart="never" nodeType="tmRoot"/>
-      </p:par>
-    </p:tnLst>
-  </p:timing>
-</p:sld>
-</file>
-
-<file path=ppt/slides/slide5.xml><?xml version="1.0" encoding="utf-8"?>
-<p:sld xmlns:a="http://schemas.openxmlformats.org/drawingml/2006/main" xmlns:r="http://schemas.openxmlformats.org/officeDocument/2006/relationships" xmlns:p="http://schemas.openxmlformats.org/presentationml/2006/main">
-  <p:cSld>
-    <p:spTree>
-      <p:nvGrpSpPr>
-        <p:cNvPr id="1" name=""/>
-        <p:cNvGrpSpPr/>
-        <p:nvPr/>
-      </p:nvGrpSpPr>
-      <p:grpSpPr/>
-      <p:sp>
-        <p:nvSpPr>
-          <p:cNvPr id="2" name="Título 1"/>
-          <p:cNvSpPr>
-            <a:spLocks noGrp="1"/>
-          </p:cNvSpPr>
-          <p:nvPr>
-            <p:ph type="title"/>
-          </p:nvPr>
-        </p:nvSpPr>
-        <p:spPr/>
-        <p:txBody>
-          <a:bodyPr>
-            <a:normAutofit/>
-          </a:bodyPr>
-          <a:p>
-            <a:r>
-              <a:rPr lang="pt-BR" dirty="0" err="1" smtClean="0">
-                <a:sym typeface="+mn-ea"/>
-              </a:rPr>
-              <a:t>Introduç</a:t>
-            </a:r>
-            <a:r>
-              <a:rPr lang="en-US" dirty="0" err="1" smtClean="0">
-                <a:sym typeface="+mn-ea"/>
-              </a:rPr>
-              <a:t>ão</a:t>
-            </a:r>
-            <a:endParaRPr lang="pt-BR" altLang="en-US"/>
-          </a:p>
-        </p:txBody>
-      </p:sp>
-      <p:sp>
-        <p:nvSpPr>
-          <p:cNvPr id="3" name="Espaço Reservado para Conteúdo 2"/>
-          <p:cNvSpPr>
-            <a:spLocks noGrp="1"/>
-          </p:cNvSpPr>
-          <p:nvPr>
-            <p:ph idx="1"/>
-          </p:nvPr>
-        </p:nvSpPr>
-        <p:spPr/>
-        <p:txBody>
-          <a:bodyPr/>
-          <a:p>
-            <a:r>
-              <a:rPr lang="pt-BR" altLang="en-US"/>
-              <a:t>Desde a antiguidade, a logística já fazia parte das guerras, devido ao deslocamento de tropas, suprimentos e armamentos.</a:t>
-            </a:r>
-            <a:endParaRPr lang="pt-BR" altLang="en-US"/>
-          </a:p>
-          <a:p>
-            <a:endParaRPr lang="pt-BR" altLang="en-US"/>
-          </a:p>
-          <a:p>
-            <a:r>
-              <a:rPr lang="pt-BR" altLang="en-US"/>
-              <a:t>Logistica foi evoluindo com o tempo até chegar no atual cenário de cadeia de suprimentos.</a:t>
-            </a:r>
-            <a:endParaRPr lang="pt-BR" altLang="en-US"/>
-          </a:p>
-        </p:txBody>
-      </p:sp>
-      <p:sp>
-        <p:nvSpPr>
-          <p:cNvPr id="4" name="Espaço Reservado para Número de Slide 3"/>
-          <p:cNvSpPr>
-            <a:spLocks noGrp="1"/>
-          </p:cNvSpPr>
-          <p:nvPr>
-            <p:ph type="sldNum" sz="quarter" idx="12"/>
-          </p:nvPr>
-        </p:nvSpPr>
-        <p:spPr/>
-        <p:txBody>
-          <a:bodyPr/>
-          <a:p>
-            <a:fld id="{CFCDC573-C9BE-334B-B909-19E2F28512E7}" type="slidenum">
-              <a:rPr lang="pt-BR" smtClean="0"/>
-            </a:fld>
-            <a:endParaRPr lang="pt-BR"/>
-          </a:p>
-        </p:txBody>
-      </p:sp>
-    </p:spTree>
-  </p:cSld>
-  <p:clrMapOvr>
-    <a:masterClrMapping/>
-  </p:clrMapOvr>
 </p:sld>
 </file>
 
@@ -9480,7 +11914,7 @@
         </p:nvSpPr>
         <p:spPr>
           <a:xfrm>
-            <a:off x="1540510" y="5721350"/>
+            <a:off x="1539875" y="5687060"/>
             <a:ext cx="6219825" cy="521970"/>
           </a:xfrm>
           <a:prstGeom prst="rect">

</xml_diff>

<commit_message>
Finalizada a Documentaçao do TG | encerrado previa da Apresentacao
</commit_message>
<xml_diff>
--- a/APRESENTAÇÃO JOAO VITOR.pptx
+++ b/APRESENTAÇÃO JOAO VITOR.pptx
@@ -43,21 +43,18 @@
     <p:sldId id="314" r:id="rId36"/>
     <p:sldId id="315" r:id="rId37"/>
     <p:sldId id="316" r:id="rId38"/>
-    <p:sldId id="317" r:id="rId39"/>
-    <p:sldId id="318" r:id="rId40"/>
-    <p:sldId id="320" r:id="rId41"/>
-    <p:sldId id="319" r:id="rId42"/>
-    <p:sldId id="321" r:id="rId43"/>
-    <p:sldId id="322" r:id="rId44"/>
-    <p:sldId id="269" r:id="rId45"/>
-    <p:sldId id="270" r:id="rId46"/>
-    <p:sldId id="323" r:id="rId47"/>
-    <p:sldId id="324" r:id="rId48"/>
-    <p:sldId id="325" r:id="rId49"/>
-    <p:sldId id="272" r:id="rId50"/>
-    <p:sldId id="273" r:id="rId51"/>
-    <p:sldId id="327" r:id="rId52"/>
-    <p:sldId id="274" r:id="rId53"/>
+    <p:sldId id="320" r:id="rId39"/>
+    <p:sldId id="319" r:id="rId40"/>
+    <p:sldId id="321" r:id="rId41"/>
+    <p:sldId id="322" r:id="rId42"/>
+    <p:sldId id="269" r:id="rId43"/>
+    <p:sldId id="270" r:id="rId44"/>
+    <p:sldId id="324" r:id="rId45"/>
+    <p:sldId id="325" r:id="rId46"/>
+    <p:sldId id="272" r:id="rId47"/>
+    <p:sldId id="273" r:id="rId48"/>
+    <p:sldId id="327" r:id="rId49"/>
+    <p:sldId id="274" r:id="rId50"/>
   </p:sldIdLst>
   <p:sldSz cx="9144000" cy="6858000" type="screen4x3"/>
   <p:notesSz cx="6858000" cy="9144000"/>
@@ -4184,6 +4181,13 @@
               <a:rPr lang="pt-BR" altLang="en-US"/>
               <a:t>Comparativo de produtividade dos veículos com e sem a roteirização.</a:t>
             </a:r>
+            <a:br>
+              <a:rPr lang="pt-BR" altLang="en-US"/>
+            </a:br>
+            <a:r>
+              <a:rPr lang="pt-BR" altLang="en-US"/>
+              <a:t>Retirar?</a:t>
+            </a:r>
             <a:endParaRPr lang="pt-BR" altLang="en-US"/>
           </a:p>
         </p:txBody>
@@ -4391,34 +4395,14 @@
           </a:p>
           <a:p>
             <a:r>
-              <a:rPr lang="en-US" dirty="0" err="1" smtClean="0">
+              <a:rPr lang="pt-BR" altLang="en-US" dirty="0" err="1" smtClean="0">
                 <a:solidFill>
                   <a:schemeClr val="bg1">
                     <a:lumMod val="50000"/>
                   </a:schemeClr>
                 </a:solidFill>
               </a:rPr>
-              <a:t>Fundamentação</a:t>
-            </a:r>
-            <a:r>
-              <a:rPr lang="en-US" dirty="0" smtClean="0">
-                <a:solidFill>
-                  <a:schemeClr val="bg1">
-                    <a:lumMod val="50000"/>
-                  </a:schemeClr>
-                </a:solidFill>
-              </a:rPr>
-              <a:t> </a:t>
-            </a:r>
-            <a:r>
-              <a:rPr lang="en-US" dirty="0" err="1" smtClean="0">
-                <a:solidFill>
-                  <a:schemeClr val="bg1">
-                    <a:lumMod val="50000"/>
-                  </a:schemeClr>
-                </a:solidFill>
-              </a:rPr>
-              <a:t>Teórica</a:t>
+              <a:t>Levantamento de Requisitos</a:t>
             </a:r>
             <a:endParaRPr lang="en-US" dirty="0" smtClean="0">
               <a:solidFill>
@@ -5157,7 +5141,7 @@
               <a:rPr lang="pt-BR" altLang="en-US">
                 <a:sym typeface="+mn-ea"/>
               </a:rPr>
-              <a:t>Requisitos Não-Funcionais do Projeto.</a:t>
+              <a:t>Requisitos Não-Funcionais do Projeto. (remover)</a:t>
             </a:r>
             <a:endParaRPr lang="pt-BR" altLang="en-US"/>
           </a:p>
@@ -5203,8 +5187,8 @@
         </p:blipFill>
         <p:spPr>
           <a:xfrm>
-            <a:off x="1566545" y="1959610"/>
-            <a:ext cx="6010275" cy="2938780"/>
+            <a:off x="1381760" y="1959610"/>
+            <a:ext cx="6380480" cy="2938780"/>
           </a:xfrm>
           <a:prstGeom prst="rect">
             <a:avLst/>
@@ -7454,24 +7438,32 @@
           </a:p>
         </p:txBody>
       </p:sp>
-      <p:sp>
-        <p:nvSpPr>
-          <p:cNvPr id="3" name="Espaço Reservado para Conteúdo 2"/>
-          <p:cNvSpPr>
-            <a:spLocks noGrp="1"/>
-          </p:cNvSpPr>
+      <p:pic>
+        <p:nvPicPr>
+          <p:cNvPr id="5" name="Espaço Reservado para Conteúdo 4" descr="DiagramaClasseRota"/>
+          <p:cNvPicPr>
+            <a:picLocks noChangeAspect="1"/>
+          </p:cNvPicPr>
           <p:nvPr>
             <p:ph idx="1"/>
           </p:nvPr>
-        </p:nvSpPr>
-        <p:spPr/>
-        <p:txBody>
-          <a:bodyPr/>
-          <a:p>
-            <a:endParaRPr lang="en-US"/>
-          </a:p>
-        </p:txBody>
-      </p:sp>
+        </p:nvPicPr>
+        <p:blipFill>
+          <a:blip r:embed="rId1"/>
+          <a:stretch>
+            <a:fillRect/>
+          </a:stretch>
+        </p:blipFill>
+        <p:spPr>
+          <a:xfrm>
+            <a:off x="459740" y="1748790"/>
+            <a:ext cx="8225155" cy="4437380"/>
+          </a:xfrm>
+          <a:prstGeom prst="rect">
+            <a:avLst/>
+          </a:prstGeom>
+        </p:spPr>
+      </p:pic>
       <p:sp>
         <p:nvSpPr>
           <p:cNvPr id="4" name="Espaço Reservado para Número de Slide 3"/>
@@ -7490,6 +7482,36 @@
               <a:rPr lang="pt-BR" smtClean="0"/>
             </a:fld>
             <a:endParaRPr lang="pt-BR"/>
+          </a:p>
+        </p:txBody>
+      </p:sp>
+      <p:sp>
+        <p:nvSpPr>
+          <p:cNvPr id="13" name="Caixa de Texto 12"/>
+          <p:cNvSpPr txBox="1"/>
+          <p:nvPr/>
+        </p:nvSpPr>
+        <p:spPr>
+          <a:xfrm>
+            <a:off x="628650" y="6296660"/>
+            <a:ext cx="1599565" cy="306705"/>
+          </a:xfrm>
+          <a:prstGeom prst="rect">
+            <a:avLst/>
+          </a:prstGeom>
+          <a:noFill/>
+        </p:spPr>
+        <p:txBody>
+          <a:bodyPr wrap="none" rtlCol="0">
+            <a:spAutoFit/>
+          </a:bodyPr>
+          <a:p>
+            <a:pPr algn="l"/>
+            <a:r>
+              <a:rPr lang="pt-BR" altLang="en-US" sz="1400"/>
+              <a:t>Fonte: Autor (2018)</a:t>
+            </a:r>
+            <a:endParaRPr lang="pt-BR" altLang="en-US" sz="1400"/>
           </a:p>
         </p:txBody>
       </p:sp>
@@ -7534,7 +7556,7 @@
           <a:p>
             <a:r>
               <a:rPr lang="pt-BR" altLang="en-US"/>
-              <a:t>Modelo Entidade Relacionamento</a:t>
+              <a:t>Modelo Entidade Relacionamento - Ajustar</a:t>
             </a:r>
             <a:endParaRPr lang="pt-BR" altLang="en-US"/>
           </a:p>
@@ -7563,7 +7585,7 @@
       </p:sp>
       <p:pic>
         <p:nvPicPr>
-          <p:cNvPr id="28" name="Picture 28" descr="C:\Users\jintahibari\Documents\FACULDADE\TRABALHO DE GRADUACAO\documentacaoTG\BD.pngBD"/>
+          <p:cNvPr id="28" name="Picture 28" descr="C:\Users\jintahibari\Documents\FACULDADE\TRABALHO DE GRADUACAO\documentacaoTG\bd_apresentacao.pngbd_apresentacao"/>
           <p:cNvPicPr>
             <a:picLocks noChangeAspect="1"/>
           </p:cNvPicPr>
@@ -7580,8 +7602,8 @@
         </p:blipFill>
         <p:spPr>
           <a:xfrm>
-            <a:off x="1635125" y="1057275"/>
-            <a:ext cx="5584190" cy="5469255"/>
+            <a:off x="891540" y="1153795"/>
+            <a:ext cx="7360920" cy="5266055"/>
           </a:xfrm>
           <a:prstGeom prst="rect">
             <a:avLst/>
@@ -7593,6 +7615,36 @@
           </a:ln>
         </p:spPr>
       </p:pic>
+      <p:sp>
+        <p:nvSpPr>
+          <p:cNvPr id="13" name="Caixa de Texto 12"/>
+          <p:cNvSpPr txBox="1"/>
+          <p:nvPr/>
+        </p:nvSpPr>
+        <p:spPr>
+          <a:xfrm>
+            <a:off x="891540" y="6414770"/>
+            <a:ext cx="1599565" cy="306705"/>
+          </a:xfrm>
+          <a:prstGeom prst="rect">
+            <a:avLst/>
+          </a:prstGeom>
+          <a:noFill/>
+        </p:spPr>
+        <p:txBody>
+          <a:bodyPr wrap="none" rtlCol="0">
+            <a:spAutoFit/>
+          </a:bodyPr>
+          <a:p>
+            <a:pPr algn="l"/>
+            <a:r>
+              <a:rPr lang="pt-BR" altLang="en-US" sz="1400"/>
+              <a:t>Fonte: Autor (2018)</a:t>
+            </a:r>
+            <a:endParaRPr lang="pt-BR" altLang="en-US" sz="1400"/>
+          </a:p>
+        </p:txBody>
+      </p:sp>
     </p:spTree>
   </p:cSld>
   <p:clrMapOvr>
@@ -7816,7 +7868,7 @@
         </p:nvSpPr>
         <p:spPr>
           <a:xfrm>
-            <a:off x="456565" y="6049645"/>
+            <a:off x="456565" y="5835015"/>
             <a:ext cx="1599565" cy="306705"/>
           </a:xfrm>
           <a:prstGeom prst="rect">
@@ -7892,7 +7944,11 @@
         <p:txBody>
           <a:bodyPr/>
           <a:p>
-            <a:endParaRPr lang="en-US"/>
+            <a:r>
+              <a:rPr lang="pt-BR" altLang="en-US"/>
+              <a:t>video</a:t>
+            </a:r>
+            <a:endParaRPr lang="pt-BR" altLang="en-US"/>
           </a:p>
         </p:txBody>
       </p:sp>
@@ -8322,34 +8378,15 @@
           </a:p>
           <a:p>
             <a:r>
-              <a:rPr lang="en-US" dirty="0" err="1" smtClean="0">
+              <a:rPr lang="pt-BR" altLang="en-US" dirty="0" err="1" smtClean="0">
                 <a:solidFill>
                   <a:schemeClr val="bg1">
                     <a:lumMod val="50000"/>
                   </a:schemeClr>
                 </a:solidFill>
+                <a:sym typeface="+mn-ea"/>
               </a:rPr>
-              <a:t>Fundamentação</a:t>
-            </a:r>
-            <a:r>
-              <a:rPr lang="en-US" dirty="0" smtClean="0">
-                <a:solidFill>
-                  <a:schemeClr val="bg1">
-                    <a:lumMod val="50000"/>
-                  </a:schemeClr>
-                </a:solidFill>
-              </a:rPr>
-              <a:t> </a:t>
-            </a:r>
-            <a:r>
-              <a:rPr lang="en-US" dirty="0" err="1" smtClean="0">
-                <a:solidFill>
-                  <a:schemeClr val="bg1">
-                    <a:lumMod val="50000"/>
-                  </a:schemeClr>
-                </a:solidFill>
-              </a:rPr>
-              <a:t>Teórica</a:t>
+              <a:t>Levantamento de Requisitos</a:t>
             </a:r>
             <a:endParaRPr lang="en-US" dirty="0" smtClean="0">
               <a:solidFill>
@@ -8361,44 +8398,14 @@
           </a:p>
           <a:p>
             <a:r>
-              <a:rPr lang="en-US" dirty="0" err="1" smtClean="0">
+              <a:rPr lang="pt-BR" altLang="en-US" dirty="0" err="1" smtClean="0">
                 <a:solidFill>
                   <a:schemeClr val="bg1">
                     <a:lumMod val="50000"/>
                   </a:schemeClr>
                 </a:solidFill>
               </a:rPr>
-              <a:t>Título</a:t>
-            </a:r>
-            <a:r>
-              <a:rPr lang="en-US" dirty="0" smtClean="0">
-                <a:solidFill>
-                  <a:schemeClr val="bg1">
-                    <a:lumMod val="50000"/>
-                  </a:schemeClr>
-                </a:solidFill>
-              </a:rPr>
-              <a:t> </a:t>
-            </a:r>
-            <a:r>
-              <a:rPr lang="en-US" dirty="0" err="1" smtClean="0">
-                <a:solidFill>
-                  <a:schemeClr val="bg1">
-                    <a:lumMod val="50000"/>
-                  </a:schemeClr>
-                </a:solidFill>
-              </a:rPr>
-              <a:t>Capítulo</a:t>
-            </a:r>
-            <a:r>
-              <a:rPr lang="en-US" dirty="0" smtClean="0">
-                <a:solidFill>
-                  <a:schemeClr val="bg1">
-                    <a:lumMod val="50000"/>
-                  </a:schemeClr>
-                </a:solidFill>
-              </a:rPr>
-              <a:t> 3</a:t>
+              <a:t>Desenvolvimento</a:t>
             </a:r>
             <a:endParaRPr lang="en-US" dirty="0" smtClean="0">
               <a:solidFill>
@@ -8410,44 +8417,15 @@
           </a:p>
           <a:p>
             <a:r>
-              <a:rPr lang="en-US" dirty="0" err="1" smtClean="0">
+              <a:rPr lang="en-US" smtClean="0">
                 <a:solidFill>
                   <a:schemeClr val="bg1">
                     <a:lumMod val="50000"/>
                   </a:schemeClr>
                 </a:solidFill>
+                <a:sym typeface="+mn-ea"/>
               </a:rPr>
-              <a:t>Título</a:t>
-            </a:r>
-            <a:r>
-              <a:rPr lang="en-US" dirty="0" smtClean="0">
-                <a:solidFill>
-                  <a:schemeClr val="bg1">
-                    <a:lumMod val="50000"/>
-                  </a:schemeClr>
-                </a:solidFill>
-              </a:rPr>
-              <a:t> </a:t>
-            </a:r>
-            <a:r>
-              <a:rPr lang="en-US" dirty="0" err="1" smtClean="0">
-                <a:solidFill>
-                  <a:schemeClr val="bg1">
-                    <a:lumMod val="50000"/>
-                  </a:schemeClr>
-                </a:solidFill>
-              </a:rPr>
-              <a:t>Capítulo</a:t>
-            </a:r>
-            <a:r>
-              <a:rPr lang="en-US" dirty="0" smtClean="0">
-                <a:solidFill>
-                  <a:schemeClr val="bg1">
-                    <a:lumMod val="50000"/>
-                  </a:schemeClr>
-                </a:solidFill>
-              </a:rPr>
-              <a:t> 4</a:t>
+              <a:t>Validação e Análise dos Resultados Obtidos</a:t>
             </a:r>
             <a:endParaRPr lang="en-US" dirty="0" smtClean="0">
               <a:solidFill>
@@ -9242,8 +9220,8 @@
         </p:nvSpPr>
         <p:spPr>
           <a:xfrm>
-            <a:off x="628650" y="2943860"/>
-            <a:ext cx="7886700" cy="3233420"/>
+            <a:off x="628650" y="2038985"/>
+            <a:ext cx="7886700" cy="4138295"/>
           </a:xfrm>
         </p:spPr>
         <p:txBody>
@@ -9256,13 +9234,45 @@
             <a:endParaRPr lang="en-US"/>
           </a:p>
           <a:p>
-            <a:endParaRPr lang="en-US"/>
-          </a:p>
-          <a:p>
             <a:r>
               <a:rPr lang="pt-BR"/>
               <a:t>Montagem com a Lista de Endereços de Atendimento</a:t>
             </a:r>
+            <a:endParaRPr lang="pt-BR"/>
+          </a:p>
+          <a:p>
+            <a:r>
+              <a:rPr lang="pt-BR" altLang="en-US">
+                <a:sym typeface="+mn-ea"/>
+              </a:rPr>
+              <a:t>Inserir a Lista de Endereços no google</a:t>
+            </a:r>
+            <a:endParaRPr lang="pt-BR" altLang="en-US"/>
+          </a:p>
+          <a:p>
+            <a:r>
+              <a:rPr lang="pt-BR" altLang="en-US">
+                <a:sym typeface="+mn-ea"/>
+              </a:rPr>
+              <a:t>Inserir a Lista de Endereços do SysRLog</a:t>
+            </a:r>
+            <a:endParaRPr lang="pt-BR" altLang="en-US">
+              <a:sym typeface="+mn-ea"/>
+            </a:endParaRPr>
+          </a:p>
+          <a:p>
+            <a:r>
+              <a:rPr lang="pt-BR" altLang="en-US">
+                <a:sym typeface="+mn-ea"/>
+              </a:rPr>
+              <a:t>Avaliação e comparação dos resultados Obtidos de tempo e distância comparando o GoogleMaps e o SysRLog.</a:t>
+            </a:r>
+            <a:endParaRPr lang="pt-BR" altLang="en-US"/>
+          </a:p>
+          <a:p>
+            <a:endParaRPr lang="pt-BR" altLang="en-US"/>
+          </a:p>
+          <a:p>
             <a:endParaRPr lang="pt-BR"/>
           </a:p>
         </p:txBody>
@@ -9318,52 +9328,11 @@
         </p:nvSpPr>
         <p:spPr/>
         <p:txBody>
-          <a:bodyPr>
-            <a:normAutofit fontScale="90000"/>
-          </a:bodyPr>
-          <a:p>
-            <a:r>
-              <a:rPr lang="en-US">
-                <a:sym typeface="+mn-ea"/>
-              </a:rPr>
-              <a:t>Processo de Validação do Algoritmo de Roteirização</a:t>
-            </a:r>
-            <a:endParaRPr lang="en-US"/>
-          </a:p>
-        </p:txBody>
-      </p:sp>
-      <p:sp>
-        <p:nvSpPr>
-          <p:cNvPr id="3" name="Espaço Reservado para Conteúdo 2"/>
-          <p:cNvSpPr>
-            <a:spLocks noGrp="1"/>
-          </p:cNvSpPr>
-          <p:nvPr>
-            <p:ph idx="1"/>
-          </p:nvPr>
-        </p:nvSpPr>
-        <p:spPr>
-          <a:xfrm>
-            <a:off x="628650" y="2812415"/>
-            <a:ext cx="7886700" cy="3364865"/>
-          </a:xfrm>
-        </p:spPr>
-        <p:txBody>
           <a:bodyPr/>
           <a:p>
             <a:r>
               <a:rPr lang="pt-BR" altLang="en-US"/>
-              <a:t>Inserir a Lista de Endereços no google</a:t>
-            </a:r>
-            <a:endParaRPr lang="pt-BR" altLang="en-US"/>
-          </a:p>
-          <a:p>
-            <a:endParaRPr lang="pt-BR" altLang="en-US"/>
-          </a:p>
-          <a:p>
-            <a:r>
-              <a:rPr lang="pt-BR" altLang="en-US"/>
-              <a:t>Inserir a Lista de Endereços do SysRLog</a:t>
+              <a:t>Plano de Testes - Caso de Teste 1</a:t>
             </a:r>
             <a:endParaRPr lang="pt-BR" altLang="en-US"/>
           </a:p>
@@ -9387,6 +9356,67 @@
               <a:rPr lang="pt-BR" smtClean="0"/>
             </a:fld>
             <a:endParaRPr lang="pt-BR"/>
+          </a:p>
+        </p:txBody>
+      </p:sp>
+      <p:pic>
+        <p:nvPicPr>
+          <p:cNvPr id="84" name="Imagem 3"/>
+          <p:cNvPicPr>
+            <a:picLocks noChangeAspect="1"/>
+          </p:cNvPicPr>
+          <p:nvPr>
+            <p:ph idx="1"/>
+          </p:nvPr>
+        </p:nvPicPr>
+        <p:blipFill>
+          <a:blip r:embed="rId1"/>
+          <a:stretch>
+            <a:fillRect/>
+          </a:stretch>
+        </p:blipFill>
+        <p:spPr>
+          <a:xfrm>
+            <a:off x="992505" y="1536065"/>
+            <a:ext cx="7158990" cy="4649470"/>
+          </a:xfrm>
+          <a:prstGeom prst="rect">
+            <a:avLst/>
+          </a:prstGeom>
+          <a:ln>
+            <a:solidFill>
+              <a:schemeClr val="tx1"/>
+            </a:solidFill>
+          </a:ln>
+        </p:spPr>
+      </p:pic>
+      <p:sp>
+        <p:nvSpPr>
+          <p:cNvPr id="13" name="Caixa de Texto 12"/>
+          <p:cNvSpPr txBox="1"/>
+          <p:nvPr/>
+        </p:nvSpPr>
+        <p:spPr>
+          <a:xfrm>
+            <a:off x="992505" y="6356350"/>
+            <a:ext cx="1599565" cy="306705"/>
+          </a:xfrm>
+          <a:prstGeom prst="rect">
+            <a:avLst/>
+          </a:prstGeom>
+          <a:noFill/>
+        </p:spPr>
+        <p:txBody>
+          <a:bodyPr wrap="none" rtlCol="0">
+            <a:spAutoFit/>
+          </a:bodyPr>
+          <a:p>
+            <a:pPr algn="l"/>
+            <a:r>
+              <a:rPr lang="pt-BR" altLang="en-US" sz="1400"/>
+              <a:t>Fonte: Autor (2018)</a:t>
+            </a:r>
+            <a:endParaRPr lang="pt-BR" altLang="en-US" sz="1400"/>
           </a:p>
         </p:txBody>
       </p:sp>
@@ -9399,220 +9429,6 @@
 </file>
 
 <file path=ppt/slides/slide37.xml><?xml version="1.0" encoding="utf-8"?>
-<p:sld xmlns:a="http://schemas.openxmlformats.org/drawingml/2006/main" xmlns:r="http://schemas.openxmlformats.org/officeDocument/2006/relationships" xmlns:p="http://schemas.openxmlformats.org/presentationml/2006/main">
-  <p:cSld>
-    <p:spTree>
-      <p:nvGrpSpPr>
-        <p:cNvPr id="1" name=""/>
-        <p:cNvGrpSpPr/>
-        <p:nvPr/>
-      </p:nvGrpSpPr>
-      <p:grpSpPr/>
-      <p:sp>
-        <p:nvSpPr>
-          <p:cNvPr id="2" name="Título 1"/>
-          <p:cNvSpPr>
-            <a:spLocks noGrp="1"/>
-          </p:cNvSpPr>
-          <p:nvPr>
-            <p:ph type="title"/>
-          </p:nvPr>
-        </p:nvSpPr>
-        <p:spPr/>
-        <p:txBody>
-          <a:bodyPr>
-            <a:normAutofit fontScale="90000"/>
-          </a:bodyPr>
-          <a:p>
-            <a:r>
-              <a:rPr lang="en-US">
-                <a:sym typeface="+mn-ea"/>
-              </a:rPr>
-              <a:t>Processo de Validação do Algoritmo de Roteirização</a:t>
-            </a:r>
-            <a:endParaRPr lang="en-US"/>
-          </a:p>
-        </p:txBody>
-      </p:sp>
-      <p:sp>
-        <p:nvSpPr>
-          <p:cNvPr id="3" name="Espaço Reservado para Conteúdo 2"/>
-          <p:cNvSpPr>
-            <a:spLocks noGrp="1"/>
-          </p:cNvSpPr>
-          <p:nvPr>
-            <p:ph idx="1"/>
-          </p:nvPr>
-        </p:nvSpPr>
-        <p:spPr>
-          <a:xfrm>
-            <a:off x="628650" y="3181350"/>
-            <a:ext cx="7886700" cy="2995930"/>
-          </a:xfrm>
-        </p:spPr>
-        <p:txBody>
-          <a:bodyPr/>
-          <a:p>
-            <a:r>
-              <a:rPr lang="pt-BR" altLang="en-US"/>
-              <a:t>Avaliação e comparação dos resultados Obtidos de tempo e distância comparando o GoogleMaps e o SysRLog.</a:t>
-            </a:r>
-            <a:endParaRPr lang="pt-BR" altLang="en-US"/>
-          </a:p>
-        </p:txBody>
-      </p:sp>
-      <p:sp>
-        <p:nvSpPr>
-          <p:cNvPr id="4" name="Espaço Reservado para Número de Slide 3"/>
-          <p:cNvSpPr>
-            <a:spLocks noGrp="1"/>
-          </p:cNvSpPr>
-          <p:nvPr>
-            <p:ph type="sldNum" sz="quarter" idx="12"/>
-          </p:nvPr>
-        </p:nvSpPr>
-        <p:spPr/>
-        <p:txBody>
-          <a:bodyPr/>
-          <a:p>
-            <a:fld id="{CFCDC573-C9BE-334B-B909-19E2F28512E7}" type="slidenum">
-              <a:rPr lang="pt-BR" smtClean="0"/>
-            </a:fld>
-            <a:endParaRPr lang="pt-BR"/>
-          </a:p>
-        </p:txBody>
-      </p:sp>
-    </p:spTree>
-  </p:cSld>
-  <p:clrMapOvr>
-    <a:masterClrMapping/>
-  </p:clrMapOvr>
-</p:sld>
-</file>
-
-<file path=ppt/slides/slide38.xml><?xml version="1.0" encoding="utf-8"?>
-<p:sld xmlns:a="http://schemas.openxmlformats.org/drawingml/2006/main" xmlns:r="http://schemas.openxmlformats.org/officeDocument/2006/relationships" xmlns:p="http://schemas.openxmlformats.org/presentationml/2006/main">
-  <p:cSld>
-    <p:spTree>
-      <p:nvGrpSpPr>
-        <p:cNvPr id="1" name=""/>
-        <p:cNvGrpSpPr/>
-        <p:nvPr/>
-      </p:nvGrpSpPr>
-      <p:grpSpPr/>
-      <p:sp>
-        <p:nvSpPr>
-          <p:cNvPr id="2" name="Título 1"/>
-          <p:cNvSpPr>
-            <a:spLocks noGrp="1"/>
-          </p:cNvSpPr>
-          <p:nvPr>
-            <p:ph type="title"/>
-          </p:nvPr>
-        </p:nvSpPr>
-        <p:spPr/>
-        <p:txBody>
-          <a:bodyPr/>
-          <a:p>
-            <a:r>
-              <a:rPr lang="pt-BR" altLang="en-US"/>
-              <a:t>Plano de Testes - Caso de Teste 1</a:t>
-            </a:r>
-            <a:endParaRPr lang="pt-BR" altLang="en-US"/>
-          </a:p>
-        </p:txBody>
-      </p:sp>
-      <p:sp>
-        <p:nvSpPr>
-          <p:cNvPr id="4" name="Espaço Reservado para Número de Slide 3"/>
-          <p:cNvSpPr>
-            <a:spLocks noGrp="1"/>
-          </p:cNvSpPr>
-          <p:nvPr>
-            <p:ph type="sldNum" sz="quarter" idx="12"/>
-          </p:nvPr>
-        </p:nvSpPr>
-        <p:spPr/>
-        <p:txBody>
-          <a:bodyPr/>
-          <a:p>
-            <a:fld id="{CFCDC573-C9BE-334B-B909-19E2F28512E7}" type="slidenum">
-              <a:rPr lang="pt-BR" smtClean="0"/>
-            </a:fld>
-            <a:endParaRPr lang="pt-BR"/>
-          </a:p>
-        </p:txBody>
-      </p:sp>
-      <p:pic>
-        <p:nvPicPr>
-          <p:cNvPr id="84" name="Imagem 3"/>
-          <p:cNvPicPr>
-            <a:picLocks noChangeAspect="1"/>
-          </p:cNvPicPr>
-          <p:nvPr>
-            <p:ph idx="1"/>
-          </p:nvPr>
-        </p:nvPicPr>
-        <p:blipFill>
-          <a:blip r:embed="rId1"/>
-          <a:stretch>
-            <a:fillRect/>
-          </a:stretch>
-        </p:blipFill>
-        <p:spPr>
-          <a:xfrm>
-            <a:off x="992505" y="1536065"/>
-            <a:ext cx="7158990" cy="4649470"/>
-          </a:xfrm>
-          <a:prstGeom prst="rect">
-            <a:avLst/>
-          </a:prstGeom>
-          <a:ln>
-            <a:solidFill>
-              <a:schemeClr val="tx1"/>
-            </a:solidFill>
-          </a:ln>
-        </p:spPr>
-      </p:pic>
-      <p:sp>
-        <p:nvSpPr>
-          <p:cNvPr id="13" name="Caixa de Texto 12"/>
-          <p:cNvSpPr txBox="1"/>
-          <p:nvPr/>
-        </p:nvSpPr>
-        <p:spPr>
-          <a:xfrm>
-            <a:off x="992505" y="6356350"/>
-            <a:ext cx="1599565" cy="306705"/>
-          </a:xfrm>
-          <a:prstGeom prst="rect">
-            <a:avLst/>
-          </a:prstGeom>
-          <a:noFill/>
-        </p:spPr>
-        <p:txBody>
-          <a:bodyPr wrap="none" rtlCol="0">
-            <a:spAutoFit/>
-          </a:bodyPr>
-          <a:p>
-            <a:pPr algn="l"/>
-            <a:r>
-              <a:rPr lang="pt-BR" altLang="en-US" sz="1400"/>
-              <a:t>Fonte: Autor (2018)</a:t>
-            </a:r>
-            <a:endParaRPr lang="pt-BR" altLang="en-US" sz="1400"/>
-          </a:p>
-        </p:txBody>
-      </p:sp>
-    </p:spTree>
-  </p:cSld>
-  <p:clrMapOvr>
-    <a:masterClrMapping/>
-  </p:clrMapOvr>
-</p:sld>
-</file>
-
-<file path=ppt/slides/slide39.xml><?xml version="1.0" encoding="utf-8"?>
 <p:sld xmlns:a="http://schemas.openxmlformats.org/drawingml/2006/main" xmlns:r="http://schemas.openxmlformats.org/officeDocument/2006/relationships" xmlns:p="http://schemas.openxmlformats.org/presentationml/2006/main">
   <p:cSld>
     <p:spTree>
@@ -9759,6 +9575,255 @@
 </p:sld>
 </file>
 
+<file path=ppt/slides/slide38.xml><?xml version="1.0" encoding="utf-8"?>
+<p:sld xmlns:a="http://schemas.openxmlformats.org/drawingml/2006/main" xmlns:r="http://schemas.openxmlformats.org/officeDocument/2006/relationships" xmlns:p="http://schemas.openxmlformats.org/presentationml/2006/main">
+  <p:cSld>
+    <p:spTree>
+      <p:nvGrpSpPr>
+        <p:cNvPr id="1" name=""/>
+        <p:cNvGrpSpPr/>
+        <p:nvPr/>
+      </p:nvGrpSpPr>
+      <p:grpSpPr/>
+      <p:sp>
+        <p:nvSpPr>
+          <p:cNvPr id="2" name="Título 1"/>
+          <p:cNvSpPr>
+            <a:spLocks noGrp="1"/>
+          </p:cNvSpPr>
+          <p:nvPr>
+            <p:ph type="title"/>
+          </p:nvPr>
+        </p:nvSpPr>
+        <p:spPr/>
+        <p:txBody>
+          <a:bodyPr>
+            <a:normAutofit fontScale="90000"/>
+          </a:bodyPr>
+          <a:p>
+            <a:r>
+              <a:rPr lang="en-US"/>
+              <a:t>Resultados Obtidos no Comparativo de Tempo das Rotas.</a:t>
+            </a:r>
+            <a:endParaRPr lang="en-US"/>
+          </a:p>
+        </p:txBody>
+      </p:sp>
+      <p:sp>
+        <p:nvSpPr>
+          <p:cNvPr id="4" name="Espaço Reservado para Número de Slide 3"/>
+          <p:cNvSpPr>
+            <a:spLocks noGrp="1"/>
+          </p:cNvSpPr>
+          <p:nvPr>
+            <p:ph type="sldNum" sz="quarter" idx="12"/>
+          </p:nvPr>
+        </p:nvSpPr>
+        <p:spPr/>
+        <p:txBody>
+          <a:bodyPr/>
+          <a:p>
+            <a:fld id="{CFCDC573-C9BE-334B-B909-19E2F28512E7}" type="slidenum">
+              <a:rPr lang="pt-BR" smtClean="0"/>
+            </a:fld>
+            <a:endParaRPr lang="pt-BR"/>
+          </a:p>
+        </p:txBody>
+      </p:sp>
+      <p:pic>
+        <p:nvPicPr>
+          <p:cNvPr id="5" name="Espaço Reservado para Conteúdo 4"/>
+          <p:cNvPicPr>
+            <a:picLocks noChangeAspect="1"/>
+          </p:cNvPicPr>
+          <p:nvPr>
+            <p:ph idx="1"/>
+          </p:nvPr>
+        </p:nvPicPr>
+        <p:blipFill>
+          <a:blip r:embed="rId1"/>
+          <a:srcRect l="1601" t="8730" r="21029"/>
+          <a:stretch>
+            <a:fillRect/>
+          </a:stretch>
+        </p:blipFill>
+        <p:spPr>
+          <a:xfrm>
+            <a:off x="736600" y="2070735"/>
+            <a:ext cx="7670800" cy="2715895"/>
+          </a:xfrm>
+          <a:prstGeom prst="rect">
+            <a:avLst/>
+          </a:prstGeom>
+          <a:ln>
+            <a:solidFill>
+              <a:schemeClr val="accent1"/>
+            </a:solidFill>
+          </a:ln>
+        </p:spPr>
+      </p:pic>
+      <p:sp>
+        <p:nvSpPr>
+          <p:cNvPr id="13" name="Caixa de Texto 12"/>
+          <p:cNvSpPr txBox="1"/>
+          <p:nvPr/>
+        </p:nvSpPr>
+        <p:spPr>
+          <a:xfrm>
+            <a:off x="736600" y="4786630"/>
+            <a:ext cx="1599565" cy="306705"/>
+          </a:xfrm>
+          <a:prstGeom prst="rect">
+            <a:avLst/>
+          </a:prstGeom>
+          <a:noFill/>
+        </p:spPr>
+        <p:txBody>
+          <a:bodyPr wrap="none" rtlCol="0">
+            <a:spAutoFit/>
+          </a:bodyPr>
+          <a:p>
+            <a:pPr algn="l"/>
+            <a:r>
+              <a:rPr lang="pt-BR" altLang="en-US" sz="1400"/>
+              <a:t>Fonte: Autor (2018)</a:t>
+            </a:r>
+            <a:endParaRPr lang="pt-BR" altLang="en-US" sz="1400"/>
+          </a:p>
+        </p:txBody>
+      </p:sp>
+    </p:spTree>
+  </p:cSld>
+  <p:clrMapOvr>
+    <a:masterClrMapping/>
+  </p:clrMapOvr>
+</p:sld>
+</file>
+
+<file path=ppt/slides/slide39.xml><?xml version="1.0" encoding="utf-8"?>
+<p:sld xmlns:a="http://schemas.openxmlformats.org/drawingml/2006/main" xmlns:r="http://schemas.openxmlformats.org/officeDocument/2006/relationships" xmlns:p="http://schemas.openxmlformats.org/presentationml/2006/main">
+  <p:cSld>
+    <p:spTree>
+      <p:nvGrpSpPr>
+        <p:cNvPr id="1" name=""/>
+        <p:cNvGrpSpPr/>
+        <p:nvPr/>
+      </p:nvGrpSpPr>
+      <p:grpSpPr/>
+      <p:sp>
+        <p:nvSpPr>
+          <p:cNvPr id="2" name="Título 1"/>
+          <p:cNvSpPr>
+            <a:spLocks noGrp="1"/>
+          </p:cNvSpPr>
+          <p:nvPr>
+            <p:ph type="title"/>
+          </p:nvPr>
+        </p:nvSpPr>
+        <p:spPr/>
+        <p:txBody>
+          <a:bodyPr>
+            <a:normAutofit fontScale="90000"/>
+          </a:bodyPr>
+          <a:p>
+            <a:r>
+              <a:rPr lang="en-US"/>
+              <a:t>Resultados Obtidos no Comparativo de Distância das Rotas</a:t>
+            </a:r>
+            <a:r>
+              <a:rPr lang="pt-BR" altLang="en-US"/>
+              <a:t>.</a:t>
+            </a:r>
+            <a:endParaRPr lang="pt-BR" altLang="en-US"/>
+          </a:p>
+        </p:txBody>
+      </p:sp>
+      <p:sp>
+        <p:nvSpPr>
+          <p:cNvPr id="4" name="Espaço Reservado para Número de Slide 3"/>
+          <p:cNvSpPr>
+            <a:spLocks noGrp="1"/>
+          </p:cNvSpPr>
+          <p:nvPr>
+            <p:ph type="sldNum" sz="quarter" idx="12"/>
+          </p:nvPr>
+        </p:nvSpPr>
+        <p:spPr/>
+        <p:txBody>
+          <a:bodyPr/>
+          <a:p>
+            <a:fld id="{CFCDC573-C9BE-334B-B909-19E2F28512E7}" type="slidenum">
+              <a:rPr lang="pt-BR" smtClean="0"/>
+            </a:fld>
+            <a:endParaRPr lang="pt-BR"/>
+          </a:p>
+        </p:txBody>
+      </p:sp>
+      <p:pic>
+        <p:nvPicPr>
+          <p:cNvPr id="5" name="Espaço Reservado para Conteúdo 4"/>
+          <p:cNvPicPr>
+            <a:picLocks noChangeAspect="1"/>
+          </p:cNvPicPr>
+          <p:nvPr>
+            <p:ph idx="1"/>
+          </p:nvPr>
+        </p:nvPicPr>
+        <p:blipFill>
+          <a:blip r:embed="rId1"/>
+          <a:srcRect l="926" t="5698" r="20205"/>
+          <a:stretch>
+            <a:fillRect/>
+          </a:stretch>
+        </p:blipFill>
+        <p:spPr>
+          <a:xfrm>
+            <a:off x="824865" y="2342515"/>
+            <a:ext cx="7494270" cy="2799715"/>
+          </a:xfrm>
+          <a:prstGeom prst="rect">
+            <a:avLst/>
+          </a:prstGeom>
+        </p:spPr>
+      </p:pic>
+      <p:sp>
+        <p:nvSpPr>
+          <p:cNvPr id="13" name="Caixa de Texto 12"/>
+          <p:cNvSpPr txBox="1"/>
+          <p:nvPr/>
+        </p:nvSpPr>
+        <p:spPr>
+          <a:xfrm>
+            <a:off x="824865" y="5142230"/>
+            <a:ext cx="1599565" cy="306705"/>
+          </a:xfrm>
+          <a:prstGeom prst="rect">
+            <a:avLst/>
+          </a:prstGeom>
+          <a:noFill/>
+        </p:spPr>
+        <p:txBody>
+          <a:bodyPr wrap="none" rtlCol="0">
+            <a:spAutoFit/>
+          </a:bodyPr>
+          <a:p>
+            <a:pPr algn="l"/>
+            <a:r>
+              <a:rPr lang="pt-BR" altLang="en-US" sz="1400"/>
+              <a:t>Fonte: Autor (2018)</a:t>
+            </a:r>
+            <a:endParaRPr lang="pt-BR" altLang="en-US" sz="1400"/>
+          </a:p>
+        </p:txBody>
+      </p:sp>
+    </p:spTree>
+  </p:cSld>
+  <p:clrMapOvr>
+    <a:masterClrMapping/>
+  </p:clrMapOvr>
+</p:sld>
+</file>
+
 <file path=ppt/slides/slide4.xml><?xml version="1.0" encoding="utf-8"?>
 <p:sld xmlns:a="http://schemas.openxmlformats.org/drawingml/2006/main" xmlns:r="http://schemas.openxmlformats.org/officeDocument/2006/relationships" xmlns:p="http://schemas.openxmlformats.org/presentationml/2006/main">
   <p:cSld>
@@ -9909,255 +9974,6 @@
 </file>
 
 <file path=ppt/slides/slide40.xml><?xml version="1.0" encoding="utf-8"?>
-<p:sld xmlns:a="http://schemas.openxmlformats.org/drawingml/2006/main" xmlns:r="http://schemas.openxmlformats.org/officeDocument/2006/relationships" xmlns:p="http://schemas.openxmlformats.org/presentationml/2006/main">
-  <p:cSld>
-    <p:spTree>
-      <p:nvGrpSpPr>
-        <p:cNvPr id="1" name=""/>
-        <p:cNvGrpSpPr/>
-        <p:nvPr/>
-      </p:nvGrpSpPr>
-      <p:grpSpPr/>
-      <p:sp>
-        <p:nvSpPr>
-          <p:cNvPr id="2" name="Título 1"/>
-          <p:cNvSpPr>
-            <a:spLocks noGrp="1"/>
-          </p:cNvSpPr>
-          <p:nvPr>
-            <p:ph type="title"/>
-          </p:nvPr>
-        </p:nvSpPr>
-        <p:spPr/>
-        <p:txBody>
-          <a:bodyPr>
-            <a:normAutofit fontScale="90000"/>
-          </a:bodyPr>
-          <a:p>
-            <a:r>
-              <a:rPr lang="en-US"/>
-              <a:t>Resultados Obtidos no Comparativo de Tempo das Rotas.</a:t>
-            </a:r>
-            <a:endParaRPr lang="en-US"/>
-          </a:p>
-        </p:txBody>
-      </p:sp>
-      <p:sp>
-        <p:nvSpPr>
-          <p:cNvPr id="4" name="Espaço Reservado para Número de Slide 3"/>
-          <p:cNvSpPr>
-            <a:spLocks noGrp="1"/>
-          </p:cNvSpPr>
-          <p:nvPr>
-            <p:ph type="sldNum" sz="quarter" idx="12"/>
-          </p:nvPr>
-        </p:nvSpPr>
-        <p:spPr/>
-        <p:txBody>
-          <a:bodyPr/>
-          <a:p>
-            <a:fld id="{CFCDC573-C9BE-334B-B909-19E2F28512E7}" type="slidenum">
-              <a:rPr lang="pt-BR" smtClean="0"/>
-            </a:fld>
-            <a:endParaRPr lang="pt-BR"/>
-          </a:p>
-        </p:txBody>
-      </p:sp>
-      <p:pic>
-        <p:nvPicPr>
-          <p:cNvPr id="5" name="Espaço Reservado para Conteúdo 4"/>
-          <p:cNvPicPr>
-            <a:picLocks noChangeAspect="1"/>
-          </p:cNvPicPr>
-          <p:nvPr>
-            <p:ph idx="1"/>
-          </p:nvPr>
-        </p:nvPicPr>
-        <p:blipFill>
-          <a:blip r:embed="rId1"/>
-          <a:srcRect l="1601" t="8730" r="21029"/>
-          <a:stretch>
-            <a:fillRect/>
-          </a:stretch>
-        </p:blipFill>
-        <p:spPr>
-          <a:xfrm>
-            <a:off x="736600" y="2070735"/>
-            <a:ext cx="7670800" cy="2715895"/>
-          </a:xfrm>
-          <a:prstGeom prst="rect">
-            <a:avLst/>
-          </a:prstGeom>
-          <a:ln>
-            <a:solidFill>
-              <a:schemeClr val="accent1"/>
-            </a:solidFill>
-          </a:ln>
-        </p:spPr>
-      </p:pic>
-      <p:sp>
-        <p:nvSpPr>
-          <p:cNvPr id="13" name="Caixa de Texto 12"/>
-          <p:cNvSpPr txBox="1"/>
-          <p:nvPr/>
-        </p:nvSpPr>
-        <p:spPr>
-          <a:xfrm>
-            <a:off x="736600" y="4786630"/>
-            <a:ext cx="1599565" cy="306705"/>
-          </a:xfrm>
-          <a:prstGeom prst="rect">
-            <a:avLst/>
-          </a:prstGeom>
-          <a:noFill/>
-        </p:spPr>
-        <p:txBody>
-          <a:bodyPr wrap="none" rtlCol="0">
-            <a:spAutoFit/>
-          </a:bodyPr>
-          <a:p>
-            <a:pPr algn="l"/>
-            <a:r>
-              <a:rPr lang="pt-BR" altLang="en-US" sz="1400"/>
-              <a:t>Fonte: Autor (2018)</a:t>
-            </a:r>
-            <a:endParaRPr lang="pt-BR" altLang="en-US" sz="1400"/>
-          </a:p>
-        </p:txBody>
-      </p:sp>
-    </p:spTree>
-  </p:cSld>
-  <p:clrMapOvr>
-    <a:masterClrMapping/>
-  </p:clrMapOvr>
-</p:sld>
-</file>
-
-<file path=ppt/slides/slide41.xml><?xml version="1.0" encoding="utf-8"?>
-<p:sld xmlns:a="http://schemas.openxmlformats.org/drawingml/2006/main" xmlns:r="http://schemas.openxmlformats.org/officeDocument/2006/relationships" xmlns:p="http://schemas.openxmlformats.org/presentationml/2006/main">
-  <p:cSld>
-    <p:spTree>
-      <p:nvGrpSpPr>
-        <p:cNvPr id="1" name=""/>
-        <p:cNvGrpSpPr/>
-        <p:nvPr/>
-      </p:nvGrpSpPr>
-      <p:grpSpPr/>
-      <p:sp>
-        <p:nvSpPr>
-          <p:cNvPr id="2" name="Título 1"/>
-          <p:cNvSpPr>
-            <a:spLocks noGrp="1"/>
-          </p:cNvSpPr>
-          <p:nvPr>
-            <p:ph type="title"/>
-          </p:nvPr>
-        </p:nvSpPr>
-        <p:spPr/>
-        <p:txBody>
-          <a:bodyPr>
-            <a:normAutofit fontScale="90000"/>
-          </a:bodyPr>
-          <a:p>
-            <a:r>
-              <a:rPr lang="en-US"/>
-              <a:t>Resultados Obtidos no Comparativo de Distância das Rotas</a:t>
-            </a:r>
-            <a:r>
-              <a:rPr lang="pt-BR" altLang="en-US"/>
-              <a:t>.</a:t>
-            </a:r>
-            <a:endParaRPr lang="pt-BR" altLang="en-US"/>
-          </a:p>
-        </p:txBody>
-      </p:sp>
-      <p:sp>
-        <p:nvSpPr>
-          <p:cNvPr id="4" name="Espaço Reservado para Número de Slide 3"/>
-          <p:cNvSpPr>
-            <a:spLocks noGrp="1"/>
-          </p:cNvSpPr>
-          <p:nvPr>
-            <p:ph type="sldNum" sz="quarter" idx="12"/>
-          </p:nvPr>
-        </p:nvSpPr>
-        <p:spPr/>
-        <p:txBody>
-          <a:bodyPr/>
-          <a:p>
-            <a:fld id="{CFCDC573-C9BE-334B-B909-19E2F28512E7}" type="slidenum">
-              <a:rPr lang="pt-BR" smtClean="0"/>
-            </a:fld>
-            <a:endParaRPr lang="pt-BR"/>
-          </a:p>
-        </p:txBody>
-      </p:sp>
-      <p:pic>
-        <p:nvPicPr>
-          <p:cNvPr id="5" name="Espaço Reservado para Conteúdo 4"/>
-          <p:cNvPicPr>
-            <a:picLocks noChangeAspect="1"/>
-          </p:cNvPicPr>
-          <p:nvPr>
-            <p:ph idx="1"/>
-          </p:nvPr>
-        </p:nvPicPr>
-        <p:blipFill>
-          <a:blip r:embed="rId1"/>
-          <a:srcRect l="926" t="5698" r="20205"/>
-          <a:stretch>
-            <a:fillRect/>
-          </a:stretch>
-        </p:blipFill>
-        <p:spPr>
-          <a:xfrm>
-            <a:off x="824865" y="2342515"/>
-            <a:ext cx="7494270" cy="2799715"/>
-          </a:xfrm>
-          <a:prstGeom prst="rect">
-            <a:avLst/>
-          </a:prstGeom>
-        </p:spPr>
-      </p:pic>
-      <p:sp>
-        <p:nvSpPr>
-          <p:cNvPr id="13" name="Caixa de Texto 12"/>
-          <p:cNvSpPr txBox="1"/>
-          <p:nvPr/>
-        </p:nvSpPr>
-        <p:spPr>
-          <a:xfrm>
-            <a:off x="824865" y="5142230"/>
-            <a:ext cx="1599565" cy="306705"/>
-          </a:xfrm>
-          <a:prstGeom prst="rect">
-            <a:avLst/>
-          </a:prstGeom>
-          <a:noFill/>
-        </p:spPr>
-        <p:txBody>
-          <a:bodyPr wrap="none" rtlCol="0">
-            <a:spAutoFit/>
-          </a:bodyPr>
-          <a:p>
-            <a:pPr algn="l"/>
-            <a:r>
-              <a:rPr lang="pt-BR" altLang="en-US" sz="1400"/>
-              <a:t>Fonte: Autor (2018)</a:t>
-            </a:r>
-            <a:endParaRPr lang="pt-BR" altLang="en-US" sz="1400"/>
-          </a:p>
-        </p:txBody>
-      </p:sp>
-    </p:spTree>
-  </p:cSld>
-  <p:clrMapOvr>
-    <a:masterClrMapping/>
-  </p:clrMapOvr>
-</p:sld>
-</file>
-
-<file path=ppt/slides/slide42.xml><?xml version="1.0" encoding="utf-8"?>
 <p:sld xmlns:a="http://schemas.openxmlformats.org/drawingml/2006/main" xmlns:r="http://schemas.openxmlformats.org/officeDocument/2006/relationships" xmlns:p="http://schemas.openxmlformats.org/presentationml/2006/main">
   <p:cSld>
     <p:spTree>
@@ -10510,7 +10326,7 @@
 </p:sld>
 </file>
 
-<file path=ppt/slides/slide43.xml><?xml version="1.0" encoding="utf-8"?>
+<file path=ppt/slides/slide41.xml><?xml version="1.0" encoding="utf-8"?>
 <p:sld xmlns:a="http://schemas.openxmlformats.org/drawingml/2006/main" xmlns:r="http://schemas.openxmlformats.org/officeDocument/2006/relationships" xmlns:p="http://schemas.openxmlformats.org/presentationml/2006/main">
   <p:cSld>
     <p:spTree>
@@ -10544,7 +10360,7 @@
           <a:p>
             <a:r>
               <a:rPr lang="pt-BR" dirty="0" err="1" smtClean="0"/>
-              <a:t>Principais Conclusões</a:t>
+              <a:t>Principais Contribuições</a:t>
             </a:r>
             <a:endParaRPr lang="pt-BR" dirty="0"/>
           </a:p>
@@ -10562,8 +10378,8 @@
         </p:nvSpPr>
         <p:spPr>
           <a:xfrm>
-            <a:off x="628650" y="2796540"/>
-            <a:ext cx="7886700" cy="3402965"/>
+            <a:off x="628650" y="2221865"/>
+            <a:ext cx="7886700" cy="3977640"/>
           </a:xfrm>
         </p:spPr>
         <p:txBody>
@@ -10574,11 +10390,45 @@
               <a:t>Reduzir custos operacionais com transporte </a:t>
             </a:r>
           </a:p>
+          <a:p>
+            <a:pPr marL="0" indent="0">
+              <a:buNone/>
+            </a:pPr>
+          </a:p>
+          <a:p>
+            <a:r>
+              <a:t>Aumentar a rentabilidade da empresa</a:t>
+            </a:r>
+          </a:p>
           <a:p/>
           <a:p>
             <a:r>
-              <a:t>Aumentar a rentabilidade da empresa</a:t>
-            </a:r>
+              <a:rPr>
+                <a:sym typeface="+mn-ea"/>
+              </a:rPr>
+              <a:t>Reduzir tempo desperdiçado</a:t>
+            </a:r>
+            <a:r>
+              <a:rPr lang="pt-BR">
+                <a:sym typeface="+mn-ea"/>
+              </a:rPr>
+              <a:t>	</a:t>
+            </a:r>
+            <a:endParaRPr lang="pt-BR"/>
+          </a:p>
+          <a:p>
+            <a:endParaRPr lang="pt-BR"/>
+          </a:p>
+          <a:p>
+            <a:r>
+              <a:rPr lang="pt-BR">
+                <a:sym typeface="+mn-ea"/>
+              </a:rPr>
+              <a:t>Proporcionar melhoria nos serviços da empresa</a:t>
+            </a:r>
+            <a:endParaRPr lang="pt-BR">
+              <a:sym typeface="+mn-ea"/>
+            </a:endParaRPr>
           </a:p>
           <a:p/>
           <a:p>
@@ -10623,7 +10473,7 @@
 </p:sld>
 </file>
 
-<file path=ppt/slides/slide44.xml><?xml version="1.0" encoding="utf-8"?>
+<file path=ppt/slides/slide42.xml><?xml version="1.0" encoding="utf-8"?>
 <p:sld xmlns:a="http://schemas.openxmlformats.org/drawingml/2006/main" xmlns:r="http://schemas.openxmlformats.org/officeDocument/2006/relationships" xmlns:p="http://schemas.openxmlformats.org/presentationml/2006/main">
   <p:cSld>
     <p:spTree>
@@ -10643,68 +10493,21 @@
             <p:ph type="title"/>
           </p:nvPr>
         </p:nvSpPr>
-        <p:spPr/>
+        <p:spPr>
+          <a:xfrm>
+            <a:off x="628650" y="2958466"/>
+            <a:ext cx="7886700" cy="1325563"/>
+          </a:xfrm>
+        </p:spPr>
         <p:txBody>
           <a:bodyPr>
-            <a:normAutofit/>
+            <a:normAutofit fontScale="90000"/>
           </a:bodyPr>
           <a:p>
             <a:r>
-              <a:rPr lang="pt-BR" dirty="0" err="1" smtClean="0">
-                <a:sym typeface="+mn-ea"/>
-              </a:rPr>
-              <a:t>Principais Conclusões</a:t>
-            </a:r>
-            <a:endParaRPr lang="en-US"/>
-          </a:p>
-        </p:txBody>
-      </p:sp>
-      <p:sp>
-        <p:nvSpPr>
-          <p:cNvPr id="3" name="Espaço Reservado para Conteúdo 2"/>
-          <p:cNvSpPr>
-            <a:spLocks noGrp="1"/>
-          </p:cNvSpPr>
-          <p:nvPr>
-            <p:ph idx="1"/>
-          </p:nvPr>
-        </p:nvSpPr>
-        <p:spPr>
-          <a:xfrm>
-            <a:off x="628650" y="3075940"/>
-            <a:ext cx="7886700" cy="3101340"/>
-          </a:xfrm>
-        </p:spPr>
-        <p:txBody>
-          <a:bodyPr/>
-          <a:p>
-            <a:r>
-              <a:rPr>
-                <a:sym typeface="+mn-ea"/>
-              </a:rPr>
-              <a:t>Reduzir tempo desperdiçado</a:t>
-            </a:r>
-            <a:r>
-              <a:rPr lang="pt-BR">
-                <a:sym typeface="+mn-ea"/>
-              </a:rPr>
-              <a:t>	</a:t>
-            </a:r>
-            <a:endParaRPr lang="pt-BR"/>
-          </a:p>
-          <a:p>
-            <a:endParaRPr lang="pt-BR"/>
-          </a:p>
-          <a:p>
-            <a:r>
-              <a:rPr lang="pt-BR">
-                <a:sym typeface="+mn-ea"/>
-              </a:rPr>
-              <a:t>Proporcionar melhoria nos serviços da empresa</a:t>
-            </a:r>
-            <a:endParaRPr lang="pt-BR"/>
-          </a:p>
-          <a:p>
+              <a:rPr lang="en-US"/>
+              <a:t>Considerações Gerais, Limitações e Dificuldades</a:t>
+            </a:r>
             <a:endParaRPr lang="en-US"/>
           </a:p>
         </p:txBody>
@@ -10738,7 +10541,7 @@
 </p:sld>
 </file>
 
-<file path=ppt/slides/slide45.xml><?xml version="1.0" encoding="utf-8"?>
+<file path=ppt/slides/slide43.xml><?xml version="1.0" encoding="utf-8"?>
 <p:sld xmlns:a="http://schemas.openxmlformats.org/drawingml/2006/main" xmlns:r="http://schemas.openxmlformats.org/officeDocument/2006/relationships" xmlns:p="http://schemas.openxmlformats.org/presentationml/2006/main">
   <p:cSld>
     <p:spTree>
@@ -10758,20 +10561,50 @@
             <p:ph type="title"/>
           </p:nvPr>
         </p:nvSpPr>
-        <p:spPr>
-          <a:xfrm>
-            <a:off x="628650" y="2958466"/>
-            <a:ext cx="7886700" cy="1325563"/>
-          </a:xfrm>
-        </p:spPr>
-        <p:txBody>
-          <a:bodyPr>
-            <a:normAutofit fontScale="90000"/>
-          </a:bodyPr>
+        <p:spPr/>
+        <p:txBody>
+          <a:bodyPr/>
           <a:p>
             <a:r>
               <a:rPr lang="en-US"/>
-              <a:t>Considerações Gerais, Limitações e Dificuldades</a:t>
+              <a:t>Sugestão de trabalho futuro</a:t>
+            </a:r>
+            <a:endParaRPr lang="en-US"/>
+          </a:p>
+        </p:txBody>
+      </p:sp>
+      <p:sp>
+        <p:nvSpPr>
+          <p:cNvPr id="3" name="Espaço Reservado para Conteúdo 2"/>
+          <p:cNvSpPr>
+            <a:spLocks noGrp="1"/>
+          </p:cNvSpPr>
+          <p:nvPr>
+            <p:ph idx="1"/>
+          </p:nvPr>
+        </p:nvSpPr>
+        <p:spPr>
+          <a:xfrm>
+            <a:off x="628650" y="2404745"/>
+            <a:ext cx="7886700" cy="3772535"/>
+          </a:xfrm>
+        </p:spPr>
+        <p:txBody>
+          <a:bodyPr/>
+          <a:p>
+            <a:r>
+              <a:rPr lang="en-US"/>
+              <a:t>Transferir a utilização do mapa do Google Maps para o Bing Maps</a:t>
+            </a:r>
+            <a:endParaRPr lang="en-US"/>
+          </a:p>
+          <a:p>
+            <a:endParaRPr lang="en-US"/>
+          </a:p>
+          <a:p>
+            <a:r>
+              <a:rPr lang="en-US"/>
+              <a:t>Desenvolver exclusão lógica dos objetos</a:t>
             </a:r>
             <a:endParaRPr lang="en-US"/>
           </a:p>
@@ -10806,105 +10639,7 @@
 </p:sld>
 </file>
 
-<file path=ppt/slides/slide46.xml><?xml version="1.0" encoding="utf-8"?>
-<p:sld xmlns:a="http://schemas.openxmlformats.org/drawingml/2006/main" xmlns:r="http://schemas.openxmlformats.org/officeDocument/2006/relationships" xmlns:p="http://schemas.openxmlformats.org/presentationml/2006/main">
-  <p:cSld>
-    <p:spTree>
-      <p:nvGrpSpPr>
-        <p:cNvPr id="1" name=""/>
-        <p:cNvGrpSpPr/>
-        <p:nvPr/>
-      </p:nvGrpSpPr>
-      <p:grpSpPr/>
-      <p:sp>
-        <p:nvSpPr>
-          <p:cNvPr id="2" name="Título 1"/>
-          <p:cNvSpPr>
-            <a:spLocks noGrp="1"/>
-          </p:cNvSpPr>
-          <p:nvPr>
-            <p:ph type="title"/>
-          </p:nvPr>
-        </p:nvSpPr>
-        <p:spPr/>
-        <p:txBody>
-          <a:bodyPr/>
-          <a:p>
-            <a:r>
-              <a:rPr lang="en-US"/>
-              <a:t>Sugestão de trabalho futuro</a:t>
-            </a:r>
-            <a:endParaRPr lang="en-US"/>
-          </a:p>
-        </p:txBody>
-      </p:sp>
-      <p:sp>
-        <p:nvSpPr>
-          <p:cNvPr id="3" name="Espaço Reservado para Conteúdo 2"/>
-          <p:cNvSpPr>
-            <a:spLocks noGrp="1"/>
-          </p:cNvSpPr>
-          <p:nvPr>
-            <p:ph idx="1"/>
-          </p:nvPr>
-        </p:nvSpPr>
-        <p:spPr>
-          <a:xfrm>
-            <a:off x="628650" y="2404745"/>
-            <a:ext cx="7886700" cy="3772535"/>
-          </a:xfrm>
-        </p:spPr>
-        <p:txBody>
-          <a:bodyPr/>
-          <a:p>
-            <a:r>
-              <a:rPr lang="en-US"/>
-              <a:t>Transferir a utilização do mapa do Google Maps para o Bing Maps</a:t>
-            </a:r>
-            <a:endParaRPr lang="en-US"/>
-          </a:p>
-          <a:p>
-            <a:endParaRPr lang="en-US"/>
-          </a:p>
-          <a:p>
-            <a:r>
-              <a:rPr lang="en-US"/>
-              <a:t>Desenvolver exclusão lógica dos objetos</a:t>
-            </a:r>
-            <a:endParaRPr lang="en-US"/>
-          </a:p>
-        </p:txBody>
-      </p:sp>
-      <p:sp>
-        <p:nvSpPr>
-          <p:cNvPr id="4" name="Espaço Reservado para Número de Slide 3"/>
-          <p:cNvSpPr>
-            <a:spLocks noGrp="1"/>
-          </p:cNvSpPr>
-          <p:nvPr>
-            <p:ph type="sldNum" sz="quarter" idx="12"/>
-          </p:nvPr>
-        </p:nvSpPr>
-        <p:spPr/>
-        <p:txBody>
-          <a:bodyPr/>
-          <a:p>
-            <a:fld id="{CFCDC573-C9BE-334B-B909-19E2F28512E7}" type="slidenum">
-              <a:rPr lang="pt-BR" smtClean="0"/>
-            </a:fld>
-            <a:endParaRPr lang="pt-BR"/>
-          </a:p>
-        </p:txBody>
-      </p:sp>
-    </p:spTree>
-  </p:cSld>
-  <p:clrMapOvr>
-    <a:masterClrMapping/>
-  </p:clrMapOvr>
-</p:sld>
-</file>
-
-<file path=ppt/slides/slide47.xml><?xml version="1.0" encoding="utf-8"?>
+<file path=ppt/slides/slide44.xml><?xml version="1.0" encoding="utf-8"?>
 <p:sld xmlns:a="http://schemas.openxmlformats.org/drawingml/2006/main" xmlns:r="http://schemas.openxmlformats.org/officeDocument/2006/relationships" xmlns:p="http://schemas.openxmlformats.org/presentationml/2006/main">
   <p:cSld>
     <p:spTree>
@@ -11269,7 +11004,7 @@
 </p:sld>
 </file>
 
-<file path=ppt/slides/slide48.xml><?xml version="1.0" encoding="utf-8"?>
+<file path=ppt/slides/slide45.xml><?xml version="1.0" encoding="utf-8"?>
 <p:sld xmlns:a="http://schemas.openxmlformats.org/drawingml/2006/main" xmlns:r="http://schemas.openxmlformats.org/officeDocument/2006/relationships" xmlns:p="http://schemas.openxmlformats.org/presentationml/2006/main">
   <p:cSld>
     <p:spTree>
@@ -11333,9 +11068,6 @@
             <a:endParaRPr lang="en-US" smtClean="0"/>
           </a:p>
           <a:p>
-            <a:endParaRPr lang="en-US" smtClean="0"/>
-          </a:p>
-          <a:p>
             <a:r>
               <a:rPr lang="en-US" smtClean="0"/>
               <a:t>DORNIER, P. ERNST, R. FENDER, Michel. KOUVELIS, Panos. Logística e operações globais. Textos e casos.  São Paulo: Atlas, 2000.</a:t>
@@ -11343,13 +11075,22 @@
             <a:endParaRPr lang="en-US" smtClean="0"/>
           </a:p>
           <a:p>
-            <a:endParaRPr lang="en-US" smtClean="0"/>
-          </a:p>
-          <a:p>
             <a:r>
               <a:rPr lang="en-US" smtClean="0"/>
               <a:t>NAZÁRIO, P. A importância de sistemas de informação para a competitividade logística. Rio de Janeiro: Centro de Estudos em Logística, Coppead, 1999.</a:t>
             </a:r>
+            <a:endParaRPr lang="en-US" smtClean="0"/>
+          </a:p>
+          <a:p>
+            <a:r>
+              <a:rPr lang="pt-BR" altLang="en-US">
+                <a:sym typeface="+mn-ea"/>
+              </a:rPr>
+              <a:t>ILOS. Panorama “Custos Logísticos na Economia e nas Empresas no Brasil”. Rio de Janeiro. 2012.</a:t>
+            </a:r>
+            <a:endParaRPr lang="pt-BR" altLang="en-US"/>
+          </a:p>
+          <a:p>
             <a:endParaRPr lang="en-US" smtClean="0"/>
           </a:p>
           <a:p>
@@ -11394,7 +11135,7 @@
 </p:sld>
 </file>
 
-<file path=ppt/slides/slide49.xml><?xml version="1.0" encoding="utf-8"?>
+<file path=ppt/slides/slide46.xml><?xml version="1.0" encoding="utf-8"?>
 <p:sld xmlns:a="http://schemas.openxmlformats.org/drawingml/2006/main" xmlns:r="http://schemas.openxmlformats.org/officeDocument/2006/relationships" xmlns:p="http://schemas.openxmlformats.org/presentationml/2006/main">
   <p:cSld>
     <p:spTree>
@@ -11443,7 +11184,7 @@
         <p:spPr/>
         <p:txBody>
           <a:bodyPr>
-            <a:normAutofit lnSpcReduction="10000"/>
+            <a:normAutofit fontScale="90000" lnSpcReduction="10000"/>
           </a:bodyPr>
           <a:p>
             <a:r>
@@ -11453,9 +11194,6 @@
             <a:endParaRPr lang="en-US"/>
           </a:p>
           <a:p>
-            <a:endParaRPr lang="en-US"/>
-          </a:p>
-          <a:p>
             <a:r>
               <a:rPr lang="en-US"/>
               <a:t>CENTRO DE ESTUDOS EM LOGÍSTICA –CEL/COPPEAD. Panorama Logístico – Gestão do Transporte Rodoviário de Cargas nas Empresas - Práticas e Tendências, 2007.</a:t>
@@ -11463,13 +11201,13 @@
             <a:endParaRPr lang="en-US"/>
           </a:p>
           <a:p>
+            <a:r>
+              <a:rPr lang="en-US"/>
+              <a:t>MATOS JUNIOR, C. A.; NUNES, R. V.; ASSIS, C. W. C.; FONSECA, R. C.; ADRIANO; N. A.; SANTOS, G. P. O papel da roteirização na redução de custos logísticos e melhoria do nível de serviço em uma empresa do segmento alimentício no Ceará. In: Anais do Congresso Brasileiro de Custos-ABC. 2013.</a:t>
+            </a:r>
             <a:endParaRPr lang="en-US"/>
           </a:p>
           <a:p>
-            <a:r>
-              <a:rPr lang="pt-BR" altLang="en-US"/>
-              <a:t>-- Referenciar Ilos e Dados Da industria Cearense</a:t>
-            </a:r>
             <a:endParaRPr lang="pt-BR" altLang="en-US"/>
           </a:p>
         </p:txBody>
@@ -11503,110 +11241,7 @@
 </p:sld>
 </file>
 
-<file path=ppt/slides/slide5.xml><?xml version="1.0" encoding="utf-8"?>
-<p:sld xmlns:a="http://schemas.openxmlformats.org/drawingml/2006/main" xmlns:r="http://schemas.openxmlformats.org/officeDocument/2006/relationships" xmlns:p="http://schemas.openxmlformats.org/presentationml/2006/main">
-  <p:cSld>
-    <p:spTree>
-      <p:nvGrpSpPr>
-        <p:cNvPr id="1" name=""/>
-        <p:cNvGrpSpPr/>
-        <p:nvPr/>
-      </p:nvGrpSpPr>
-      <p:grpSpPr/>
-      <p:sp>
-        <p:nvSpPr>
-          <p:cNvPr id="2" name="Título 1"/>
-          <p:cNvSpPr>
-            <a:spLocks noGrp="1"/>
-          </p:cNvSpPr>
-          <p:nvPr>
-            <p:ph type="title"/>
-          </p:nvPr>
-        </p:nvSpPr>
-        <p:spPr/>
-        <p:txBody>
-          <a:bodyPr>
-            <a:normAutofit/>
-          </a:bodyPr>
-          <a:p>
-            <a:r>
-              <a:rPr lang="pt-BR" dirty="0" err="1" smtClean="0">
-                <a:sym typeface="+mn-ea"/>
-              </a:rPr>
-              <a:t>Introduç</a:t>
-            </a:r>
-            <a:r>
-              <a:rPr lang="en-US" dirty="0" err="1" smtClean="0">
-                <a:sym typeface="+mn-ea"/>
-              </a:rPr>
-              <a:t>ão</a:t>
-            </a:r>
-            <a:endParaRPr lang="pt-BR" altLang="en-US"/>
-          </a:p>
-        </p:txBody>
-      </p:sp>
-      <p:sp>
-        <p:nvSpPr>
-          <p:cNvPr id="3" name="Espaço Reservado para Conteúdo 2"/>
-          <p:cNvSpPr>
-            <a:spLocks noGrp="1"/>
-          </p:cNvSpPr>
-          <p:nvPr>
-            <p:ph idx="1"/>
-          </p:nvPr>
-        </p:nvSpPr>
-        <p:spPr/>
-        <p:txBody>
-          <a:bodyPr/>
-          <a:p>
-            <a:r>
-              <a:rPr lang="pt-BR" altLang="en-US"/>
-              <a:t>Desde a antiguidade, a logística já fazia parte das guerras, devido ao deslocamento de tropas, suprimentos e armamentos.</a:t>
-            </a:r>
-            <a:endParaRPr lang="pt-BR" altLang="en-US"/>
-          </a:p>
-          <a:p>
-            <a:endParaRPr lang="pt-BR" altLang="en-US"/>
-          </a:p>
-          <a:p>
-            <a:r>
-              <a:rPr lang="pt-BR" altLang="en-US"/>
-              <a:t>Logistica foi evoluindo com o tempo até chegar no atual cenário de cadeia de suprimentos.</a:t>
-            </a:r>
-            <a:endParaRPr lang="pt-BR" altLang="en-US"/>
-          </a:p>
-        </p:txBody>
-      </p:sp>
-      <p:sp>
-        <p:nvSpPr>
-          <p:cNvPr id="4" name="Espaço Reservado para Número de Slide 3"/>
-          <p:cNvSpPr>
-            <a:spLocks noGrp="1"/>
-          </p:cNvSpPr>
-          <p:nvPr>
-            <p:ph type="sldNum" sz="quarter" idx="12"/>
-          </p:nvPr>
-        </p:nvSpPr>
-        <p:spPr/>
-        <p:txBody>
-          <a:bodyPr/>
-          <a:p>
-            <a:fld id="{CFCDC573-C9BE-334B-B909-19E2F28512E7}" type="slidenum">
-              <a:rPr lang="pt-BR" smtClean="0"/>
-            </a:fld>
-            <a:endParaRPr lang="pt-BR"/>
-          </a:p>
-        </p:txBody>
-      </p:sp>
-    </p:spTree>
-  </p:cSld>
-  <p:clrMapOvr>
-    <a:masterClrMapping/>
-  </p:clrMapOvr>
-</p:sld>
-</file>
-
-<file path=ppt/slides/slide50.xml><?xml version="1.0" encoding="utf-8"?>
+<file path=ppt/slides/slide47.xml><?xml version="1.0" encoding="utf-8"?>
 <p:sld xmlns:a="http://schemas.openxmlformats.org/drawingml/2006/main" xmlns:r="http://schemas.openxmlformats.org/officeDocument/2006/relationships" xmlns:p="http://schemas.openxmlformats.org/presentationml/2006/main">
   <p:cSld>
     <p:spTree>
@@ -11706,6 +11341,117 @@
       </p:par>
     </p:tnLst>
   </p:timing>
+</p:sld>
+</file>
+
+<file path=ppt/slides/slide5.xml><?xml version="1.0" encoding="utf-8"?>
+<p:sld xmlns:a="http://schemas.openxmlformats.org/drawingml/2006/main" xmlns:r="http://schemas.openxmlformats.org/officeDocument/2006/relationships" xmlns:p="http://schemas.openxmlformats.org/presentationml/2006/main">
+  <p:cSld>
+    <p:spTree>
+      <p:nvGrpSpPr>
+        <p:cNvPr id="1" name=""/>
+        <p:cNvGrpSpPr/>
+        <p:nvPr/>
+      </p:nvGrpSpPr>
+      <p:grpSpPr/>
+      <p:sp>
+        <p:nvSpPr>
+          <p:cNvPr id="2" name="Título 1"/>
+          <p:cNvSpPr>
+            <a:spLocks noGrp="1"/>
+          </p:cNvSpPr>
+          <p:nvPr>
+            <p:ph type="title"/>
+          </p:nvPr>
+        </p:nvSpPr>
+        <p:spPr/>
+        <p:txBody>
+          <a:bodyPr>
+            <a:normAutofit/>
+          </a:bodyPr>
+          <a:p>
+            <a:r>
+              <a:rPr lang="pt-BR" dirty="0" err="1" smtClean="0">
+                <a:sym typeface="+mn-ea"/>
+              </a:rPr>
+              <a:t>Introduç</a:t>
+            </a:r>
+            <a:r>
+              <a:rPr lang="en-US" dirty="0" err="1" smtClean="0">
+                <a:sym typeface="+mn-ea"/>
+              </a:rPr>
+              <a:t>ão</a:t>
+            </a:r>
+            <a:r>
+              <a:rPr lang="pt-BR" altLang="en-US" dirty="0" err="1" smtClean="0">
+                <a:sym typeface="+mn-ea"/>
+              </a:rPr>
+              <a:t>(retirar?)</a:t>
+            </a:r>
+            <a:endParaRPr lang="pt-BR" altLang="en-US" dirty="0" err="1" smtClean="0">
+              <a:sym typeface="+mn-ea"/>
+            </a:endParaRPr>
+          </a:p>
+        </p:txBody>
+      </p:sp>
+      <p:sp>
+        <p:nvSpPr>
+          <p:cNvPr id="3" name="Espaço Reservado para Conteúdo 2"/>
+          <p:cNvSpPr>
+            <a:spLocks noGrp="1"/>
+          </p:cNvSpPr>
+          <p:nvPr>
+            <p:ph idx="1"/>
+          </p:nvPr>
+        </p:nvSpPr>
+        <p:spPr/>
+        <p:txBody>
+          <a:bodyPr/>
+          <a:p>
+            <a:r>
+              <a:rPr lang="pt-BR" altLang="en-US"/>
+              <a:t>Desde a antiguidade, a logística já fazia parte das guerras, devido ao deslocamento de tropas, suprimentos e armamentos.</a:t>
+            </a:r>
+            <a:endParaRPr lang="pt-BR" altLang="en-US"/>
+          </a:p>
+          <a:p>
+            <a:endParaRPr lang="pt-BR" altLang="en-US"/>
+          </a:p>
+          <a:p>
+            <a:r>
+              <a:rPr lang="pt-BR" altLang="en-US"/>
+              <a:t>Logistica foi evoluindo com o tempo até chegar no atual cenário de cadeia de suprimentos.</a:t>
+            </a:r>
+            <a:endParaRPr lang="pt-BR" altLang="en-US"/>
+          </a:p>
+        </p:txBody>
+      </p:sp>
+      <p:sp>
+        <p:nvSpPr>
+          <p:cNvPr id="4" name="Espaço Reservado para Número de Slide 3"/>
+          <p:cNvSpPr>
+            <a:spLocks noGrp="1"/>
+          </p:cNvSpPr>
+          <p:nvPr>
+            <p:ph type="sldNum" sz="quarter" idx="12"/>
+          </p:nvPr>
+        </p:nvSpPr>
+        <p:spPr/>
+        <p:txBody>
+          <a:bodyPr/>
+          <a:p>
+            <a:fld id="{CFCDC573-C9BE-334B-B909-19E2F28512E7}" type="slidenum">
+              <a:rPr lang="pt-BR" smtClean="0"/>
+            </a:fld>
+            <a:endParaRPr lang="pt-BR"/>
+          </a:p>
+        </p:txBody>
+      </p:sp>
+    </p:spTree>
+  </p:cSld>
+  <p:clrMapOvr>
+    <a:masterClrMapping/>
+  </p:clrMapOvr>
 </p:sld>
 </file>
 

</xml_diff>

<commit_message>
Versão final apresentação | Projeto movie maker | Inserção de dois itens em trabalhos futuros
</commit_message>
<xml_diff>
--- a/APRESENTAÇÃO JOAO VITOR.pptx
+++ b/APRESENTAÇÃO JOAO VITOR.pptx
@@ -32,28 +32,27 @@
     <p:sldId id="304" r:id="rId25"/>
     <p:sldId id="307" r:id="rId26"/>
     <p:sldId id="308" r:id="rId27"/>
-    <p:sldId id="309" r:id="rId28"/>
-    <p:sldId id="310" r:id="rId29"/>
-    <p:sldId id="311" r:id="rId30"/>
-    <p:sldId id="267" r:id="rId31"/>
-    <p:sldId id="268" r:id="rId32"/>
-    <p:sldId id="312" r:id="rId33"/>
-    <p:sldId id="313" r:id="rId34"/>
-    <p:sldId id="314" r:id="rId35"/>
-    <p:sldId id="315" r:id="rId36"/>
-    <p:sldId id="316" r:id="rId37"/>
-    <p:sldId id="320" r:id="rId38"/>
-    <p:sldId id="319" r:id="rId39"/>
-    <p:sldId id="321" r:id="rId40"/>
-    <p:sldId id="322" r:id="rId41"/>
-    <p:sldId id="269" r:id="rId42"/>
-    <p:sldId id="270" r:id="rId43"/>
-    <p:sldId id="324" r:id="rId44"/>
-    <p:sldId id="325" r:id="rId45"/>
-    <p:sldId id="272" r:id="rId46"/>
-    <p:sldId id="273" r:id="rId47"/>
-    <p:sldId id="327" r:id="rId48"/>
-    <p:sldId id="274" r:id="rId49"/>
+    <p:sldId id="310" r:id="rId28"/>
+    <p:sldId id="311" r:id="rId29"/>
+    <p:sldId id="267" r:id="rId30"/>
+    <p:sldId id="268" r:id="rId31"/>
+    <p:sldId id="312" r:id="rId32"/>
+    <p:sldId id="313" r:id="rId33"/>
+    <p:sldId id="314" r:id="rId34"/>
+    <p:sldId id="315" r:id="rId35"/>
+    <p:sldId id="316" r:id="rId36"/>
+    <p:sldId id="320" r:id="rId37"/>
+    <p:sldId id="319" r:id="rId38"/>
+    <p:sldId id="321" r:id="rId39"/>
+    <p:sldId id="322" r:id="rId40"/>
+    <p:sldId id="269" r:id="rId41"/>
+    <p:sldId id="270" r:id="rId42"/>
+    <p:sldId id="324" r:id="rId43"/>
+    <p:sldId id="325" r:id="rId44"/>
+    <p:sldId id="272" r:id="rId45"/>
+    <p:sldId id="273" r:id="rId46"/>
+    <p:sldId id="327" r:id="rId47"/>
+    <p:sldId id="274" r:id="rId48"/>
   </p:sldIdLst>
   <p:sldSz cx="9144000" cy="6858000" type="screen4x3"/>
   <p:notesSz cx="6858000" cy="9144000"/>
@@ -7402,15 +7401,20 @@
             <p:ph type="title"/>
           </p:nvPr>
         </p:nvSpPr>
-        <p:spPr/>
-        <p:txBody>
-          <a:bodyPr/>
-          <a:p>
-            <a:r>
-              <a:rPr lang="pt-BR" altLang="en-US"/>
-              <a:t>Dicionário de Dados - Tabela Rota</a:t>
-            </a:r>
-            <a:endParaRPr lang="pt-BR" altLang="en-US"/>
+        <p:spPr>
+          <a:xfrm>
+            <a:off x="628650" y="365125"/>
+            <a:ext cx="7886700" cy="984250"/>
+          </a:xfrm>
+        </p:spPr>
+        <p:txBody>
+          <a:bodyPr/>
+          <a:p>
+            <a:r>
+              <a:rPr lang="en-US"/>
+              <a:t>Visão Geral - Segurança</a:t>
+            </a:r>
+            <a:endParaRPr lang="en-US"/>
           </a:p>
         </p:txBody>
       </p:sp>
@@ -7437,7 +7441,7 @@
       </p:sp>
       <p:pic>
         <p:nvPicPr>
-          <p:cNvPr id="6" name="Espaço Reservado para Conteúdo 5"/>
+          <p:cNvPr id="29" name="Picture 29" descr="Segurança"/>
           <p:cNvPicPr>
             <a:picLocks noChangeAspect="1"/>
           </p:cNvPicPr>
@@ -7447,19 +7451,23 @@
         </p:nvPicPr>
         <p:blipFill>
           <a:blip r:embed="rId1"/>
-          <a:srcRect l="2779" r="18597" b="6320"/>
           <a:stretch>
             <a:fillRect/>
           </a:stretch>
         </p:blipFill>
         <p:spPr>
           <a:xfrm>
-            <a:off x="922655" y="1860550"/>
-            <a:ext cx="7299325" cy="3136265"/>
+            <a:off x="456565" y="1456690"/>
+            <a:ext cx="8231505" cy="4378325"/>
           </a:xfrm>
           <a:prstGeom prst="rect">
             <a:avLst/>
           </a:prstGeom>
+          <a:ln>
+            <a:solidFill>
+              <a:schemeClr val="tx1"/>
+            </a:solidFill>
+          </a:ln>
         </p:spPr>
       </p:pic>
       <p:sp>
@@ -7470,7 +7478,7 @@
         </p:nvSpPr>
         <p:spPr>
           <a:xfrm>
-            <a:off x="922655" y="5114925"/>
+            <a:off x="456565" y="5835015"/>
             <a:ext cx="1599565" cy="306705"/>
           </a:xfrm>
           <a:prstGeom prst="rect">
@@ -7522,18 +7530,18 @@
         </p:nvSpPr>
         <p:spPr>
           <a:xfrm>
-            <a:off x="628650" y="365125"/>
-            <a:ext cx="7886700" cy="984250"/>
-          </a:xfrm>
-        </p:spPr>
-        <p:txBody>
-          <a:bodyPr/>
-          <a:p>
-            <a:r>
-              <a:rPr lang="en-US"/>
-              <a:t>Visão Geral - Segurança</a:t>
-            </a:r>
-            <a:endParaRPr lang="en-US"/>
+            <a:off x="628650" y="3032126"/>
+            <a:ext cx="7886700" cy="1325563"/>
+          </a:xfrm>
+        </p:spPr>
+        <p:txBody>
+          <a:bodyPr/>
+          <a:p>
+            <a:r>
+              <a:rPr lang="pt-BR" altLang="en-US"/>
+              <a:t>Apresentação do Sistema</a:t>
+            </a:r>
+            <a:endParaRPr lang="pt-BR" altLang="en-US"/>
           </a:p>
         </p:txBody>
       </p:sp>
@@ -7555,67 +7563,6 @@
               <a:rPr lang="pt-BR" smtClean="0"/>
             </a:fld>
             <a:endParaRPr lang="pt-BR"/>
-          </a:p>
-        </p:txBody>
-      </p:sp>
-      <p:pic>
-        <p:nvPicPr>
-          <p:cNvPr id="29" name="Picture 29" descr="Segurança"/>
-          <p:cNvPicPr>
-            <a:picLocks noChangeAspect="1"/>
-          </p:cNvPicPr>
-          <p:nvPr>
-            <p:ph idx="1"/>
-          </p:nvPr>
-        </p:nvPicPr>
-        <p:blipFill>
-          <a:blip r:embed="rId1"/>
-          <a:stretch>
-            <a:fillRect/>
-          </a:stretch>
-        </p:blipFill>
-        <p:spPr>
-          <a:xfrm>
-            <a:off x="456565" y="1456690"/>
-            <a:ext cx="8231505" cy="4378325"/>
-          </a:xfrm>
-          <a:prstGeom prst="rect">
-            <a:avLst/>
-          </a:prstGeom>
-          <a:ln>
-            <a:solidFill>
-              <a:schemeClr val="tx1"/>
-            </a:solidFill>
-          </a:ln>
-        </p:spPr>
-      </p:pic>
-      <p:sp>
-        <p:nvSpPr>
-          <p:cNvPr id="13" name="Caixa de Texto 12"/>
-          <p:cNvSpPr txBox="1"/>
-          <p:nvPr/>
-        </p:nvSpPr>
-        <p:spPr>
-          <a:xfrm>
-            <a:off x="456565" y="5835015"/>
-            <a:ext cx="1599565" cy="306705"/>
-          </a:xfrm>
-          <a:prstGeom prst="rect">
-            <a:avLst/>
-          </a:prstGeom>
-          <a:noFill/>
-        </p:spPr>
-        <p:txBody>
-          <a:bodyPr wrap="none" rtlCol="0">
-            <a:spAutoFit/>
-          </a:bodyPr>
-          <a:p>
-            <a:pPr algn="l"/>
-            <a:r>
-              <a:rPr lang="pt-BR" altLang="en-US" sz="1400"/>
-              <a:t>Fonte: Autor (2018)</a:t>
-            </a:r>
-            <a:endParaRPr lang="pt-BR" altLang="en-US" sz="1400"/>
           </a:p>
         </p:txBody>
       </p:sp>
@@ -7628,89 +7575,6 @@
 </file>
 
 <file path=ppt/slides/slide27.xml><?xml version="1.0" encoding="utf-8"?>
-<p:sld xmlns:a="http://schemas.openxmlformats.org/drawingml/2006/main" xmlns:r="http://schemas.openxmlformats.org/officeDocument/2006/relationships" xmlns:p="http://schemas.openxmlformats.org/presentationml/2006/main">
-  <p:cSld>
-    <p:spTree>
-      <p:nvGrpSpPr>
-        <p:cNvPr id="1" name=""/>
-        <p:cNvGrpSpPr/>
-        <p:nvPr/>
-      </p:nvGrpSpPr>
-      <p:grpSpPr/>
-      <p:sp>
-        <p:nvSpPr>
-          <p:cNvPr id="2" name="Título 1"/>
-          <p:cNvSpPr>
-            <a:spLocks noGrp="1"/>
-          </p:cNvSpPr>
-          <p:nvPr>
-            <p:ph type="title"/>
-          </p:nvPr>
-        </p:nvSpPr>
-        <p:spPr/>
-        <p:txBody>
-          <a:bodyPr/>
-          <a:p>
-            <a:r>
-              <a:rPr lang="pt-BR" altLang="en-US"/>
-              <a:t>Apresentação do Sistema</a:t>
-            </a:r>
-            <a:endParaRPr lang="pt-BR" altLang="en-US"/>
-          </a:p>
-        </p:txBody>
-      </p:sp>
-      <p:sp>
-        <p:nvSpPr>
-          <p:cNvPr id="3" name="Espaço Reservado para Conteúdo 2"/>
-          <p:cNvSpPr>
-            <a:spLocks noGrp="1"/>
-          </p:cNvSpPr>
-          <p:nvPr>
-            <p:ph idx="1"/>
-          </p:nvPr>
-        </p:nvSpPr>
-        <p:spPr/>
-        <p:txBody>
-          <a:bodyPr/>
-          <a:p>
-            <a:r>
-              <a:rPr lang="pt-BR" altLang="en-US"/>
-              <a:t>video</a:t>
-            </a:r>
-            <a:endParaRPr lang="pt-BR" altLang="en-US"/>
-          </a:p>
-        </p:txBody>
-      </p:sp>
-      <p:sp>
-        <p:nvSpPr>
-          <p:cNvPr id="4" name="Espaço Reservado para Número de Slide 3"/>
-          <p:cNvSpPr>
-            <a:spLocks noGrp="1"/>
-          </p:cNvSpPr>
-          <p:nvPr>
-            <p:ph type="sldNum" sz="quarter" idx="12"/>
-          </p:nvPr>
-        </p:nvSpPr>
-        <p:spPr/>
-        <p:txBody>
-          <a:bodyPr/>
-          <a:p>
-            <a:fld id="{CFCDC573-C9BE-334B-B909-19E2F28512E7}" type="slidenum">
-              <a:rPr lang="pt-BR" smtClean="0"/>
-            </a:fld>
-            <a:endParaRPr lang="pt-BR"/>
-          </a:p>
-        </p:txBody>
-      </p:sp>
-    </p:spTree>
-  </p:cSld>
-  <p:clrMapOvr>
-    <a:masterClrMapping/>
-  </p:clrMapOvr>
-</p:sld>
-</file>
-
-<file path=ppt/slides/slide28.xml><?xml version="1.0" encoding="utf-8"?>
 <p:sld xmlns:a="http://schemas.openxmlformats.org/drawingml/2006/main" xmlns:r="http://schemas.openxmlformats.org/officeDocument/2006/relationships" xmlns:p="http://schemas.openxmlformats.org/presentationml/2006/main">
   <p:cSld>
     <p:spTree>
@@ -7996,7 +7860,7 @@
 </p:sld>
 </file>
 
-<file path=ppt/slides/slide29.xml><?xml version="1.0" encoding="utf-8"?>
+<file path=ppt/slides/slide28.xml><?xml version="1.0" encoding="utf-8"?>
 <p:sld xmlns:a="http://schemas.openxmlformats.org/drawingml/2006/main" xmlns:r="http://schemas.openxmlformats.org/officeDocument/2006/relationships" xmlns:p="http://schemas.openxmlformats.org/presentationml/2006/main">
   <p:cSld>
     <p:spTree>
@@ -8134,6 +7998,137 @@
       </p:par>
     </p:tnLst>
   </p:timing>
+</p:sld>
+</file>
+
+<file path=ppt/slides/slide29.xml><?xml version="1.0" encoding="utf-8"?>
+<p:sld xmlns:a="http://schemas.openxmlformats.org/drawingml/2006/main" xmlns:r="http://schemas.openxmlformats.org/officeDocument/2006/relationships" xmlns:p="http://schemas.openxmlformats.org/presentationml/2006/main">
+  <p:cSld>
+    <p:spTree>
+      <p:nvGrpSpPr>
+        <p:cNvPr id="1" name=""/>
+        <p:cNvGrpSpPr/>
+        <p:nvPr/>
+      </p:nvGrpSpPr>
+      <p:grpSpPr/>
+      <p:sp>
+        <p:nvSpPr>
+          <p:cNvPr id="2" name="Título 1"/>
+          <p:cNvSpPr>
+            <a:spLocks noGrp="1"/>
+          </p:cNvSpPr>
+          <p:nvPr>
+            <p:ph type="title"/>
+          </p:nvPr>
+        </p:nvSpPr>
+        <p:spPr>
+          <a:xfrm>
+            <a:off x="628650" y="365125"/>
+            <a:ext cx="7886700" cy="878205"/>
+          </a:xfrm>
+        </p:spPr>
+        <p:txBody>
+          <a:bodyPr>
+            <a:normAutofit/>
+          </a:bodyPr>
+          <a:p>
+            <a:r>
+              <a:rPr lang="en-US" smtClean="0">
+                <a:sym typeface="+mn-ea"/>
+              </a:rPr>
+              <a:t>Resultados das Métricas Back-end</a:t>
+            </a:r>
+            <a:endParaRPr lang="en-US"/>
+          </a:p>
+        </p:txBody>
+      </p:sp>
+      <p:sp>
+        <p:nvSpPr>
+          <p:cNvPr id="4" name="Espaço Reservado para Número de Slide 3"/>
+          <p:cNvSpPr>
+            <a:spLocks noGrp="1"/>
+          </p:cNvSpPr>
+          <p:nvPr>
+            <p:ph type="sldNum" sz="quarter" idx="12"/>
+          </p:nvPr>
+        </p:nvSpPr>
+        <p:spPr/>
+        <p:txBody>
+          <a:bodyPr/>
+          <a:p>
+            <a:fld id="{CFCDC573-C9BE-334B-B909-19E2F28512E7}" type="slidenum">
+              <a:rPr lang="pt-BR" smtClean="0"/>
+            </a:fld>
+            <a:endParaRPr lang="pt-BR"/>
+          </a:p>
+        </p:txBody>
+      </p:sp>
+      <p:pic>
+        <p:nvPicPr>
+          <p:cNvPr id="69" name="Imagem 69" descr="4.1.5"/>
+          <p:cNvPicPr>
+            <a:picLocks noChangeAspect="1"/>
+          </p:cNvPicPr>
+          <p:nvPr>
+            <p:ph idx="1"/>
+          </p:nvPr>
+        </p:nvPicPr>
+        <p:blipFill>
+          <a:blip r:embed="rId1"/>
+          <a:stretch>
+            <a:fillRect/>
+          </a:stretch>
+        </p:blipFill>
+        <p:spPr>
+          <a:xfrm>
+            <a:off x="1652270" y="1858010"/>
+            <a:ext cx="5838825" cy="4286250"/>
+          </a:xfrm>
+          <a:prstGeom prst="rect">
+            <a:avLst/>
+          </a:prstGeom>
+          <a:ln>
+            <a:solidFill>
+              <a:schemeClr val="tx1"/>
+            </a:solidFill>
+          </a:ln>
+        </p:spPr>
+      </p:pic>
+      <p:sp>
+        <p:nvSpPr>
+          <p:cNvPr id="13" name="Caixa de Texto 12"/>
+          <p:cNvSpPr txBox="1"/>
+          <p:nvPr/>
+        </p:nvSpPr>
+        <p:spPr>
+          <a:xfrm>
+            <a:off x="1678940" y="6181090"/>
+            <a:ext cx="1599565" cy="306705"/>
+          </a:xfrm>
+          <a:prstGeom prst="rect">
+            <a:avLst/>
+          </a:prstGeom>
+          <a:noFill/>
+        </p:spPr>
+        <p:txBody>
+          <a:bodyPr wrap="none" rtlCol="0">
+            <a:spAutoFit/>
+          </a:bodyPr>
+          <a:p>
+            <a:pPr algn="l"/>
+            <a:r>
+              <a:rPr lang="pt-BR" altLang="en-US" sz="1400"/>
+              <a:t>Fonte: Autor (2018)</a:t>
+            </a:r>
+            <a:endParaRPr lang="pt-BR" altLang="en-US" sz="1400"/>
+          </a:p>
+        </p:txBody>
+      </p:sp>
+    </p:spTree>
+  </p:cSld>
+  <p:clrMapOvr>
+    <a:masterClrMapping/>
+  </p:clrMapOvr>
 </p:sld>
 </file>
 
@@ -8437,19 +8432,17 @@
         <p:spPr>
           <a:xfrm>
             <a:off x="628650" y="365125"/>
-            <a:ext cx="7886700" cy="878205"/>
+            <a:ext cx="7886700" cy="772160"/>
           </a:xfrm>
         </p:spPr>
         <p:txBody>
           <a:bodyPr>
-            <a:normAutofit/>
+            <a:normAutofit fontScale="90000"/>
           </a:bodyPr>
           <a:p>
             <a:r>
-              <a:rPr lang="en-US" smtClean="0">
-                <a:sym typeface="+mn-ea"/>
-              </a:rPr>
-              <a:t>Resultados das Métricas Back-end</a:t>
+              <a:rPr lang="en-US"/>
+              <a:t>Resultados das Métricas Front-end</a:t>
             </a:r>
             <a:endParaRPr lang="en-US"/>
           </a:p>
@@ -8478,7 +8471,7 @@
       </p:sp>
       <p:pic>
         <p:nvPicPr>
-          <p:cNvPr id="69" name="Imagem 69" descr="4.1.5"/>
+          <p:cNvPr id="70" name="Imagem 70" descr="4.1.3"/>
           <p:cNvPicPr>
             <a:picLocks noChangeAspect="1"/>
           </p:cNvPicPr>
@@ -8488,14 +8481,15 @@
         </p:nvPicPr>
         <p:blipFill>
           <a:blip r:embed="rId1"/>
+          <a:srcRect r="27714" b="1466"/>
           <a:stretch>
             <a:fillRect/>
           </a:stretch>
         </p:blipFill>
         <p:spPr>
           <a:xfrm>
-            <a:off x="1652270" y="1858010"/>
-            <a:ext cx="5838825" cy="4286250"/>
+            <a:off x="1859915" y="1610995"/>
+            <a:ext cx="5424170" cy="4351655"/>
           </a:xfrm>
           <a:prstGeom prst="rect">
             <a:avLst/>
@@ -8515,7 +8509,7 @@
         </p:nvSpPr>
         <p:spPr>
           <a:xfrm>
-            <a:off x="1678940" y="6181090"/>
+            <a:off x="1859915" y="6049645"/>
             <a:ext cx="1599565" cy="306705"/>
           </a:xfrm>
           <a:prstGeom prst="rect">
@@ -8565,12 +8559,7 @@
             <p:ph type="title"/>
           </p:nvPr>
         </p:nvSpPr>
-        <p:spPr>
-          <a:xfrm>
-            <a:off x="628650" y="365125"/>
-            <a:ext cx="7886700" cy="772160"/>
-          </a:xfrm>
-        </p:spPr>
+        <p:spPr/>
         <p:txBody>
           <a:bodyPr>
             <a:normAutofit fontScale="90000"/>
@@ -8578,9 +8567,46 @@
           <a:p>
             <a:r>
               <a:rPr lang="en-US"/>
-              <a:t>Resultados das Métricas Front-end</a:t>
+              <a:t>Técnicas de Verificação e Validação aplicadas</a:t>
             </a:r>
             <a:endParaRPr lang="en-US"/>
+          </a:p>
+        </p:txBody>
+      </p:sp>
+      <p:sp>
+        <p:nvSpPr>
+          <p:cNvPr id="3" name="Espaço Reservado para Conteúdo 2"/>
+          <p:cNvSpPr>
+            <a:spLocks noGrp="1"/>
+          </p:cNvSpPr>
+          <p:nvPr>
+            <p:ph idx="1"/>
+          </p:nvPr>
+        </p:nvSpPr>
+        <p:spPr>
+          <a:xfrm>
+            <a:off x="628650" y="2360930"/>
+            <a:ext cx="7886700" cy="3838575"/>
+          </a:xfrm>
+        </p:spPr>
+        <p:txBody>
+          <a:bodyPr/>
+          <a:p>
+            <a:r>
+              <a:rPr lang="pt-BR" altLang="en-US"/>
+              <a:t>Testes de Unidade - Utilizado JUnit em métodos específicos das camadas Repository e Service</a:t>
+            </a:r>
+            <a:endParaRPr lang="pt-BR" altLang="en-US"/>
+          </a:p>
+          <a:p>
+            <a:endParaRPr lang="pt-BR" altLang="en-US"/>
+          </a:p>
+          <a:p>
+            <a:r>
+              <a:rPr lang="pt-BR" altLang="en-US"/>
+              <a:t>Testes de Recursos Externos - Utilizdo JUnit para execução de Métodos que fazem requisições para o Serviços do Via Cep e DistanceMatrix do Google. </a:t>
+            </a:r>
+            <a:endParaRPr lang="pt-BR" altLang="en-US"/>
           </a:p>
         </p:txBody>
       </p:sp>
@@ -8602,68 +8628,6 @@
               <a:rPr lang="pt-BR" smtClean="0"/>
             </a:fld>
             <a:endParaRPr lang="pt-BR"/>
-          </a:p>
-        </p:txBody>
-      </p:sp>
-      <p:pic>
-        <p:nvPicPr>
-          <p:cNvPr id="70" name="Imagem 70" descr="4.1.3"/>
-          <p:cNvPicPr>
-            <a:picLocks noChangeAspect="1"/>
-          </p:cNvPicPr>
-          <p:nvPr>
-            <p:ph idx="1"/>
-          </p:nvPr>
-        </p:nvPicPr>
-        <p:blipFill>
-          <a:blip r:embed="rId1"/>
-          <a:srcRect r="27714" b="1466"/>
-          <a:stretch>
-            <a:fillRect/>
-          </a:stretch>
-        </p:blipFill>
-        <p:spPr>
-          <a:xfrm>
-            <a:off x="1859915" y="1610995"/>
-            <a:ext cx="5424170" cy="4351655"/>
-          </a:xfrm>
-          <a:prstGeom prst="rect">
-            <a:avLst/>
-          </a:prstGeom>
-          <a:ln>
-            <a:solidFill>
-              <a:schemeClr val="tx1"/>
-            </a:solidFill>
-          </a:ln>
-        </p:spPr>
-      </p:pic>
-      <p:sp>
-        <p:nvSpPr>
-          <p:cNvPr id="13" name="Caixa de Texto 12"/>
-          <p:cNvSpPr txBox="1"/>
-          <p:nvPr/>
-        </p:nvSpPr>
-        <p:spPr>
-          <a:xfrm>
-            <a:off x="1859915" y="6049645"/>
-            <a:ext cx="1599565" cy="306705"/>
-          </a:xfrm>
-          <a:prstGeom prst="rect">
-            <a:avLst/>
-          </a:prstGeom>
-          <a:noFill/>
-        </p:spPr>
-        <p:txBody>
-          <a:bodyPr wrap="none" rtlCol="0">
-            <a:spAutoFit/>
-          </a:bodyPr>
-          <a:p>
-            <a:pPr algn="l"/>
-            <a:r>
-              <a:rPr lang="pt-BR" altLang="en-US" sz="1400"/>
-              <a:t>Fonte: Autor (2018)</a:t>
-            </a:r>
-            <a:endParaRPr lang="pt-BR" altLang="en-US" sz="1400"/>
           </a:p>
         </p:txBody>
       </p:sp>
@@ -8695,54 +8659,20 @@
             <p:ph type="title"/>
           </p:nvPr>
         </p:nvSpPr>
-        <p:spPr/>
-        <p:txBody>
-          <a:bodyPr>
-            <a:normAutofit fontScale="90000"/>
-          </a:bodyPr>
+        <p:spPr>
+          <a:xfrm>
+            <a:off x="628650" y="365125"/>
+            <a:ext cx="7886700" cy="996950"/>
+          </a:xfrm>
+        </p:spPr>
+        <p:txBody>
+          <a:bodyPr/>
           <a:p>
             <a:r>
               <a:rPr lang="en-US"/>
-              <a:t>Técnicas de Verificação e Validação aplicadas</a:t>
+              <a:t>Teste Funcional de API</a:t>
             </a:r>
             <a:endParaRPr lang="en-US"/>
-          </a:p>
-        </p:txBody>
-      </p:sp>
-      <p:sp>
-        <p:nvSpPr>
-          <p:cNvPr id="3" name="Espaço Reservado para Conteúdo 2"/>
-          <p:cNvSpPr>
-            <a:spLocks noGrp="1"/>
-          </p:cNvSpPr>
-          <p:nvPr>
-            <p:ph idx="1"/>
-          </p:nvPr>
-        </p:nvSpPr>
-        <p:spPr>
-          <a:xfrm>
-            <a:off x="628650" y="2360930"/>
-            <a:ext cx="7886700" cy="3838575"/>
-          </a:xfrm>
-        </p:spPr>
-        <p:txBody>
-          <a:bodyPr/>
-          <a:p>
-            <a:r>
-              <a:rPr lang="pt-BR" altLang="en-US"/>
-              <a:t>Testes de Unidade - Utilizado JUnit em métodos específicos das camadas Repository e Service</a:t>
-            </a:r>
-            <a:endParaRPr lang="pt-BR" altLang="en-US"/>
-          </a:p>
-          <a:p>
-            <a:endParaRPr lang="pt-BR" altLang="en-US"/>
-          </a:p>
-          <a:p>
-            <a:r>
-              <a:rPr lang="pt-BR" altLang="en-US"/>
-              <a:t>Testes de Recursos Externos - Utilizdo JUnit para execução de Métodos que fazem requisições para o Serviços do Via Cep e DistanceMatrix do Google. </a:t>
-            </a:r>
-            <a:endParaRPr lang="pt-BR" altLang="en-US"/>
           </a:p>
         </p:txBody>
       </p:sp>
@@ -8764,6 +8694,68 @@
               <a:rPr lang="pt-BR" smtClean="0"/>
             </a:fld>
             <a:endParaRPr lang="pt-BR"/>
+          </a:p>
+        </p:txBody>
+      </p:sp>
+      <p:pic>
+        <p:nvPicPr>
+          <p:cNvPr id="74" name="Picture 2"/>
+          <p:cNvPicPr>
+            <a:picLocks noChangeAspect="1"/>
+          </p:cNvPicPr>
+          <p:nvPr>
+            <p:ph idx="1"/>
+          </p:nvPr>
+        </p:nvPicPr>
+        <p:blipFill>
+          <a:blip r:embed="rId1"/>
+          <a:stretch>
+            <a:fillRect/>
+          </a:stretch>
+        </p:blipFill>
+        <p:spPr>
+          <a:xfrm>
+            <a:off x="501650" y="1362075"/>
+            <a:ext cx="8140700" cy="4872355"/>
+          </a:xfrm>
+          <a:prstGeom prst="rect">
+            <a:avLst/>
+          </a:prstGeom>
+          <a:noFill/>
+          <a:ln w="9525">
+            <a:solidFill>
+              <a:schemeClr val="tx1"/>
+            </a:solidFill>
+          </a:ln>
+        </p:spPr>
+      </p:pic>
+      <p:sp>
+        <p:nvSpPr>
+          <p:cNvPr id="13" name="Caixa de Texto 12"/>
+          <p:cNvSpPr txBox="1"/>
+          <p:nvPr/>
+        </p:nvSpPr>
+        <p:spPr>
+          <a:xfrm>
+            <a:off x="501650" y="6234430"/>
+            <a:ext cx="1599565" cy="306705"/>
+          </a:xfrm>
+          <a:prstGeom prst="rect">
+            <a:avLst/>
+          </a:prstGeom>
+          <a:noFill/>
+        </p:spPr>
+        <p:txBody>
+          <a:bodyPr wrap="none" rtlCol="0">
+            <a:spAutoFit/>
+          </a:bodyPr>
+          <a:p>
+            <a:pPr algn="l"/>
+            <a:r>
+              <a:rPr lang="pt-BR" altLang="en-US" sz="1400"/>
+              <a:t>Fonte: Autor (2018)</a:t>
+            </a:r>
+            <a:endParaRPr lang="pt-BR" altLang="en-US" sz="1400"/>
           </a:p>
         </p:txBody>
       </p:sp>
@@ -8795,20 +8787,86 @@
             <p:ph type="title"/>
           </p:nvPr>
         </p:nvSpPr>
-        <p:spPr>
-          <a:xfrm>
-            <a:off x="628650" y="365125"/>
-            <a:ext cx="7886700" cy="996950"/>
-          </a:xfrm>
-        </p:spPr>
-        <p:txBody>
-          <a:bodyPr/>
+        <p:spPr/>
+        <p:txBody>
+          <a:bodyPr>
+            <a:normAutofit fontScale="90000"/>
+          </a:bodyPr>
           <a:p>
             <a:r>
               <a:rPr lang="en-US"/>
-              <a:t>Teste Funcional de API</a:t>
+              <a:t>Processo de Validação do Algoritmo de Roteirização</a:t>
             </a:r>
             <a:endParaRPr lang="en-US"/>
+          </a:p>
+        </p:txBody>
+      </p:sp>
+      <p:sp>
+        <p:nvSpPr>
+          <p:cNvPr id="3" name="Espaço Reservado para Conteúdo 2"/>
+          <p:cNvSpPr>
+            <a:spLocks noGrp="1"/>
+          </p:cNvSpPr>
+          <p:nvPr>
+            <p:ph idx="1"/>
+          </p:nvPr>
+        </p:nvSpPr>
+        <p:spPr>
+          <a:xfrm>
+            <a:off x="628650" y="2038985"/>
+            <a:ext cx="7886700" cy="4138295"/>
+          </a:xfrm>
+        </p:spPr>
+        <p:txBody>
+          <a:bodyPr/>
+          <a:p>
+            <a:r>
+              <a:rPr lang="pt-BR" altLang="en-US"/>
+              <a:t>Cadastro de empresas</a:t>
+            </a:r>
+            <a:endParaRPr lang="en-US"/>
+          </a:p>
+          <a:p>
+            <a:r>
+              <a:rPr lang="pt-BR"/>
+              <a:t>Montagem com a Lista de Endereços de Atendimento</a:t>
+            </a:r>
+            <a:endParaRPr lang="pt-BR"/>
+          </a:p>
+          <a:p>
+            <a:r>
+              <a:rPr lang="pt-BR" altLang="en-US">
+                <a:sym typeface="+mn-ea"/>
+              </a:rPr>
+              <a:t>Inserir a Lista de Endereços no google</a:t>
+            </a:r>
+            <a:endParaRPr lang="pt-BR" altLang="en-US"/>
+          </a:p>
+          <a:p>
+            <a:r>
+              <a:rPr lang="pt-BR" altLang="en-US">
+                <a:sym typeface="+mn-ea"/>
+              </a:rPr>
+              <a:t>Inserir a Lista de Endereços do SysRLog</a:t>
+            </a:r>
+            <a:endParaRPr lang="pt-BR" altLang="en-US">
+              <a:sym typeface="+mn-ea"/>
+            </a:endParaRPr>
+          </a:p>
+          <a:p>
+            <a:r>
+              <a:rPr lang="pt-BR" altLang="en-US">
+                <a:sym typeface="+mn-ea"/>
+              </a:rPr>
+              <a:t>Avaliação e comparação dos resultados Obtidos de tempo e distância comparando o GoogleMaps e o SysRLog.</a:t>
+            </a:r>
+            <a:endParaRPr lang="pt-BR" altLang="en-US"/>
+          </a:p>
+          <a:p>
+            <a:endParaRPr lang="pt-BR" altLang="en-US"/>
+          </a:p>
+          <a:p>
+            <a:endParaRPr lang="pt-BR"/>
           </a:p>
         </p:txBody>
       </p:sp>
@@ -8830,68 +8888,6 @@
               <a:rPr lang="pt-BR" smtClean="0"/>
             </a:fld>
             <a:endParaRPr lang="pt-BR"/>
-          </a:p>
-        </p:txBody>
-      </p:sp>
-      <p:pic>
-        <p:nvPicPr>
-          <p:cNvPr id="74" name="Picture 2"/>
-          <p:cNvPicPr>
-            <a:picLocks noChangeAspect="1"/>
-          </p:cNvPicPr>
-          <p:nvPr>
-            <p:ph idx="1"/>
-          </p:nvPr>
-        </p:nvPicPr>
-        <p:blipFill>
-          <a:blip r:embed="rId1"/>
-          <a:stretch>
-            <a:fillRect/>
-          </a:stretch>
-        </p:blipFill>
-        <p:spPr>
-          <a:xfrm>
-            <a:off x="501650" y="1362075"/>
-            <a:ext cx="8140700" cy="4872355"/>
-          </a:xfrm>
-          <a:prstGeom prst="rect">
-            <a:avLst/>
-          </a:prstGeom>
-          <a:noFill/>
-          <a:ln w="9525">
-            <a:solidFill>
-              <a:schemeClr val="tx1"/>
-            </a:solidFill>
-          </a:ln>
-        </p:spPr>
-      </p:pic>
-      <p:sp>
-        <p:nvSpPr>
-          <p:cNvPr id="13" name="Caixa de Texto 12"/>
-          <p:cNvSpPr txBox="1"/>
-          <p:nvPr/>
-        </p:nvSpPr>
-        <p:spPr>
-          <a:xfrm>
-            <a:off x="501650" y="6234430"/>
-            <a:ext cx="1599565" cy="306705"/>
-          </a:xfrm>
-          <a:prstGeom prst="rect">
-            <a:avLst/>
-          </a:prstGeom>
-          <a:noFill/>
-        </p:spPr>
-        <p:txBody>
-          <a:bodyPr wrap="none" rtlCol="0">
-            <a:spAutoFit/>
-          </a:bodyPr>
-          <a:p>
-            <a:pPr algn="l"/>
-            <a:r>
-              <a:rPr lang="pt-BR" altLang="en-US" sz="1400"/>
-              <a:t>Fonte: Autor (2018)</a:t>
-            </a:r>
-            <a:endParaRPr lang="pt-BR" altLang="en-US" sz="1400"/>
           </a:p>
         </p:txBody>
       </p:sp>
@@ -8925,84 +8921,13 @@
         </p:nvSpPr>
         <p:spPr/>
         <p:txBody>
-          <a:bodyPr>
-            <a:normAutofit fontScale="90000"/>
-          </a:bodyPr>
-          <a:p>
-            <a:r>
-              <a:rPr lang="en-US"/>
-              <a:t>Processo de Validação do Algoritmo de Roteirização</a:t>
-            </a:r>
-            <a:endParaRPr lang="en-US"/>
-          </a:p>
-        </p:txBody>
-      </p:sp>
-      <p:sp>
-        <p:nvSpPr>
-          <p:cNvPr id="3" name="Espaço Reservado para Conteúdo 2"/>
-          <p:cNvSpPr>
-            <a:spLocks noGrp="1"/>
-          </p:cNvSpPr>
-          <p:nvPr>
-            <p:ph idx="1"/>
-          </p:nvPr>
-        </p:nvSpPr>
-        <p:spPr>
-          <a:xfrm>
-            <a:off x="628650" y="2038985"/>
-            <a:ext cx="7886700" cy="4138295"/>
-          </a:xfrm>
-        </p:spPr>
-        <p:txBody>
           <a:bodyPr/>
           <a:p>
             <a:r>
               <a:rPr lang="pt-BR" altLang="en-US"/>
-              <a:t>Cadastro de empresas</a:t>
-            </a:r>
-            <a:endParaRPr lang="en-US"/>
-          </a:p>
-          <a:p>
-            <a:r>
-              <a:rPr lang="pt-BR"/>
-              <a:t>Montagem com a Lista de Endereços de Atendimento</a:t>
-            </a:r>
-            <a:endParaRPr lang="pt-BR"/>
-          </a:p>
-          <a:p>
-            <a:r>
-              <a:rPr lang="pt-BR" altLang="en-US">
-                <a:sym typeface="+mn-ea"/>
-              </a:rPr>
-              <a:t>Inserir a Lista de Endereços no google</a:t>
+              <a:t>Plano de Testes - Caso de Teste 1</a:t>
             </a:r>
             <a:endParaRPr lang="pt-BR" altLang="en-US"/>
-          </a:p>
-          <a:p>
-            <a:r>
-              <a:rPr lang="pt-BR" altLang="en-US">
-                <a:sym typeface="+mn-ea"/>
-              </a:rPr>
-              <a:t>Inserir a Lista de Endereços do SysRLog</a:t>
-            </a:r>
-            <a:endParaRPr lang="pt-BR" altLang="en-US">
-              <a:sym typeface="+mn-ea"/>
-            </a:endParaRPr>
-          </a:p>
-          <a:p>
-            <a:r>
-              <a:rPr lang="pt-BR" altLang="en-US">
-                <a:sym typeface="+mn-ea"/>
-              </a:rPr>
-              <a:t>Avaliação e comparação dos resultados Obtidos de tempo e distância comparando o GoogleMaps e o SysRLog.</a:t>
-            </a:r>
-            <a:endParaRPr lang="pt-BR" altLang="en-US"/>
-          </a:p>
-          <a:p>
-            <a:endParaRPr lang="pt-BR" altLang="en-US"/>
-          </a:p>
-          <a:p>
-            <a:endParaRPr lang="pt-BR"/>
           </a:p>
         </p:txBody>
       </p:sp>
@@ -9024,6 +8949,67 @@
               <a:rPr lang="pt-BR" smtClean="0"/>
             </a:fld>
             <a:endParaRPr lang="pt-BR"/>
+          </a:p>
+        </p:txBody>
+      </p:sp>
+      <p:pic>
+        <p:nvPicPr>
+          <p:cNvPr id="84" name="Imagem 3"/>
+          <p:cNvPicPr>
+            <a:picLocks noChangeAspect="1"/>
+          </p:cNvPicPr>
+          <p:nvPr>
+            <p:ph idx="1"/>
+          </p:nvPr>
+        </p:nvPicPr>
+        <p:blipFill>
+          <a:blip r:embed="rId1"/>
+          <a:stretch>
+            <a:fillRect/>
+          </a:stretch>
+        </p:blipFill>
+        <p:spPr>
+          <a:xfrm>
+            <a:off x="992505" y="1536065"/>
+            <a:ext cx="7158990" cy="4649470"/>
+          </a:xfrm>
+          <a:prstGeom prst="rect">
+            <a:avLst/>
+          </a:prstGeom>
+          <a:ln>
+            <a:solidFill>
+              <a:schemeClr val="tx1"/>
+            </a:solidFill>
+          </a:ln>
+        </p:spPr>
+      </p:pic>
+      <p:sp>
+        <p:nvSpPr>
+          <p:cNvPr id="13" name="Caixa de Texto 12"/>
+          <p:cNvSpPr txBox="1"/>
+          <p:nvPr/>
+        </p:nvSpPr>
+        <p:spPr>
+          <a:xfrm>
+            <a:off x="992505" y="6356350"/>
+            <a:ext cx="1599565" cy="306705"/>
+          </a:xfrm>
+          <a:prstGeom prst="rect">
+            <a:avLst/>
+          </a:prstGeom>
+          <a:noFill/>
+        </p:spPr>
+        <p:txBody>
+          <a:bodyPr wrap="none" rtlCol="0">
+            <a:spAutoFit/>
+          </a:bodyPr>
+          <a:p>
+            <a:pPr algn="l"/>
+            <a:r>
+              <a:rPr lang="pt-BR" altLang="en-US" sz="1400"/>
+              <a:t>Fonte: Autor (2018)</a:t>
+            </a:r>
+            <a:endParaRPr lang="pt-BR" altLang="en-US" sz="1400"/>
           </a:p>
         </p:txBody>
       </p:sp>
@@ -9036,128 +9022,6 @@
 </file>
 
 <file path=ppt/slides/slide35.xml><?xml version="1.0" encoding="utf-8"?>
-<p:sld xmlns:a="http://schemas.openxmlformats.org/drawingml/2006/main" xmlns:r="http://schemas.openxmlformats.org/officeDocument/2006/relationships" xmlns:p="http://schemas.openxmlformats.org/presentationml/2006/main">
-  <p:cSld>
-    <p:spTree>
-      <p:nvGrpSpPr>
-        <p:cNvPr id="1" name=""/>
-        <p:cNvGrpSpPr/>
-        <p:nvPr/>
-      </p:nvGrpSpPr>
-      <p:grpSpPr/>
-      <p:sp>
-        <p:nvSpPr>
-          <p:cNvPr id="2" name="Título 1"/>
-          <p:cNvSpPr>
-            <a:spLocks noGrp="1"/>
-          </p:cNvSpPr>
-          <p:nvPr>
-            <p:ph type="title"/>
-          </p:nvPr>
-        </p:nvSpPr>
-        <p:spPr/>
-        <p:txBody>
-          <a:bodyPr/>
-          <a:p>
-            <a:r>
-              <a:rPr lang="pt-BR" altLang="en-US"/>
-              <a:t>Plano de Testes - Caso de Teste 1</a:t>
-            </a:r>
-            <a:endParaRPr lang="pt-BR" altLang="en-US"/>
-          </a:p>
-        </p:txBody>
-      </p:sp>
-      <p:sp>
-        <p:nvSpPr>
-          <p:cNvPr id="4" name="Espaço Reservado para Número de Slide 3"/>
-          <p:cNvSpPr>
-            <a:spLocks noGrp="1"/>
-          </p:cNvSpPr>
-          <p:nvPr>
-            <p:ph type="sldNum" sz="quarter" idx="12"/>
-          </p:nvPr>
-        </p:nvSpPr>
-        <p:spPr/>
-        <p:txBody>
-          <a:bodyPr/>
-          <a:p>
-            <a:fld id="{CFCDC573-C9BE-334B-B909-19E2F28512E7}" type="slidenum">
-              <a:rPr lang="pt-BR" smtClean="0"/>
-            </a:fld>
-            <a:endParaRPr lang="pt-BR"/>
-          </a:p>
-        </p:txBody>
-      </p:sp>
-      <p:pic>
-        <p:nvPicPr>
-          <p:cNvPr id="84" name="Imagem 3"/>
-          <p:cNvPicPr>
-            <a:picLocks noChangeAspect="1"/>
-          </p:cNvPicPr>
-          <p:nvPr>
-            <p:ph idx="1"/>
-          </p:nvPr>
-        </p:nvPicPr>
-        <p:blipFill>
-          <a:blip r:embed="rId1"/>
-          <a:stretch>
-            <a:fillRect/>
-          </a:stretch>
-        </p:blipFill>
-        <p:spPr>
-          <a:xfrm>
-            <a:off x="992505" y="1536065"/>
-            <a:ext cx="7158990" cy="4649470"/>
-          </a:xfrm>
-          <a:prstGeom prst="rect">
-            <a:avLst/>
-          </a:prstGeom>
-          <a:ln>
-            <a:solidFill>
-              <a:schemeClr val="tx1"/>
-            </a:solidFill>
-          </a:ln>
-        </p:spPr>
-      </p:pic>
-      <p:sp>
-        <p:nvSpPr>
-          <p:cNvPr id="13" name="Caixa de Texto 12"/>
-          <p:cNvSpPr txBox="1"/>
-          <p:nvPr/>
-        </p:nvSpPr>
-        <p:spPr>
-          <a:xfrm>
-            <a:off x="992505" y="6356350"/>
-            <a:ext cx="1599565" cy="306705"/>
-          </a:xfrm>
-          <a:prstGeom prst="rect">
-            <a:avLst/>
-          </a:prstGeom>
-          <a:noFill/>
-        </p:spPr>
-        <p:txBody>
-          <a:bodyPr wrap="none" rtlCol="0">
-            <a:spAutoFit/>
-          </a:bodyPr>
-          <a:p>
-            <a:pPr algn="l"/>
-            <a:r>
-              <a:rPr lang="pt-BR" altLang="en-US" sz="1400"/>
-              <a:t>Fonte: Autor (2018)</a:t>
-            </a:r>
-            <a:endParaRPr lang="pt-BR" altLang="en-US" sz="1400"/>
-          </a:p>
-        </p:txBody>
-      </p:sp>
-    </p:spTree>
-  </p:cSld>
-  <p:clrMapOvr>
-    <a:masterClrMapping/>
-  </p:clrMapOvr>
-</p:sld>
-</file>
-
-<file path=ppt/slides/slide36.xml><?xml version="1.0" encoding="utf-8"?>
 <p:sld xmlns:a="http://schemas.openxmlformats.org/drawingml/2006/main" xmlns:r="http://schemas.openxmlformats.org/officeDocument/2006/relationships" xmlns:p="http://schemas.openxmlformats.org/presentationml/2006/main">
   <p:cSld>
     <p:spTree>
@@ -9304,6 +9168,131 @@
 </p:sld>
 </file>
 
+<file path=ppt/slides/slide36.xml><?xml version="1.0" encoding="utf-8"?>
+<p:sld xmlns:a="http://schemas.openxmlformats.org/drawingml/2006/main" xmlns:r="http://schemas.openxmlformats.org/officeDocument/2006/relationships" xmlns:p="http://schemas.openxmlformats.org/presentationml/2006/main">
+  <p:cSld>
+    <p:spTree>
+      <p:nvGrpSpPr>
+        <p:cNvPr id="1" name=""/>
+        <p:cNvGrpSpPr/>
+        <p:nvPr/>
+      </p:nvGrpSpPr>
+      <p:grpSpPr/>
+      <p:sp>
+        <p:nvSpPr>
+          <p:cNvPr id="2" name="Título 1"/>
+          <p:cNvSpPr>
+            <a:spLocks noGrp="1"/>
+          </p:cNvSpPr>
+          <p:nvPr>
+            <p:ph type="title"/>
+          </p:nvPr>
+        </p:nvSpPr>
+        <p:spPr/>
+        <p:txBody>
+          <a:bodyPr>
+            <a:normAutofit fontScale="90000"/>
+          </a:bodyPr>
+          <a:p>
+            <a:r>
+              <a:rPr lang="en-US"/>
+              <a:t>Resultados Obtidos no Comparativo de Tempo das Rotas.</a:t>
+            </a:r>
+            <a:endParaRPr lang="en-US"/>
+          </a:p>
+        </p:txBody>
+      </p:sp>
+      <p:sp>
+        <p:nvSpPr>
+          <p:cNvPr id="4" name="Espaço Reservado para Número de Slide 3"/>
+          <p:cNvSpPr>
+            <a:spLocks noGrp="1"/>
+          </p:cNvSpPr>
+          <p:nvPr>
+            <p:ph type="sldNum" sz="quarter" idx="12"/>
+          </p:nvPr>
+        </p:nvSpPr>
+        <p:spPr/>
+        <p:txBody>
+          <a:bodyPr/>
+          <a:p>
+            <a:fld id="{CFCDC573-C9BE-334B-B909-19E2F28512E7}" type="slidenum">
+              <a:rPr lang="pt-BR" smtClean="0"/>
+            </a:fld>
+            <a:endParaRPr lang="pt-BR"/>
+          </a:p>
+        </p:txBody>
+      </p:sp>
+      <p:pic>
+        <p:nvPicPr>
+          <p:cNvPr id="5" name="Espaço Reservado para Conteúdo 4"/>
+          <p:cNvPicPr>
+            <a:picLocks noChangeAspect="1"/>
+          </p:cNvPicPr>
+          <p:nvPr>
+            <p:ph idx="1"/>
+          </p:nvPr>
+        </p:nvPicPr>
+        <p:blipFill>
+          <a:blip r:embed="rId1"/>
+          <a:srcRect l="1601" t="8730" r="21029"/>
+          <a:stretch>
+            <a:fillRect/>
+          </a:stretch>
+        </p:blipFill>
+        <p:spPr>
+          <a:xfrm>
+            <a:off x="736600" y="2070735"/>
+            <a:ext cx="7670800" cy="2715895"/>
+          </a:xfrm>
+          <a:prstGeom prst="rect">
+            <a:avLst/>
+          </a:prstGeom>
+          <a:ln>
+            <a:solidFill>
+              <a:schemeClr val="accent1"/>
+            </a:solidFill>
+          </a:ln>
+        </p:spPr>
+      </p:pic>
+      <p:sp>
+        <p:nvSpPr>
+          <p:cNvPr id="13" name="Caixa de Texto 12"/>
+          <p:cNvSpPr txBox="1"/>
+          <p:nvPr/>
+        </p:nvSpPr>
+        <p:spPr>
+          <a:xfrm>
+            <a:off x="736600" y="4786630"/>
+            <a:ext cx="1599565" cy="306705"/>
+          </a:xfrm>
+          <a:prstGeom prst="rect">
+            <a:avLst/>
+          </a:prstGeom>
+          <a:noFill/>
+        </p:spPr>
+        <p:txBody>
+          <a:bodyPr wrap="none" rtlCol="0">
+            <a:spAutoFit/>
+          </a:bodyPr>
+          <a:p>
+            <a:pPr algn="l"/>
+            <a:r>
+              <a:rPr lang="pt-BR" altLang="en-US" sz="1400"/>
+              <a:t>Fonte: Autor (2018)</a:t>
+            </a:r>
+            <a:endParaRPr lang="pt-BR" altLang="en-US" sz="1400"/>
+          </a:p>
+        </p:txBody>
+      </p:sp>
+    </p:spTree>
+  </p:cSld>
+  <p:clrMapOvr>
+    <a:masterClrMapping/>
+  </p:clrMapOvr>
+</p:sld>
+</file>
+
 <file path=ppt/slides/slide37.xml><?xml version="1.0" encoding="utf-8"?>
 <p:sld xmlns:a="http://schemas.openxmlformats.org/drawingml/2006/main" xmlns:r="http://schemas.openxmlformats.org/officeDocument/2006/relationships" xmlns:p="http://schemas.openxmlformats.org/presentationml/2006/main">
   <p:cSld>
@@ -9332,9 +9321,13 @@
           <a:p>
             <a:r>
               <a:rPr lang="en-US"/>
-              <a:t>Resultados Obtidos no Comparativo de Tempo das Rotas.</a:t>
-            </a:r>
-            <a:endParaRPr lang="en-US"/>
+              <a:t>Resultados Obtidos no Comparativo de Distância das Rotas</a:t>
+            </a:r>
+            <a:r>
+              <a:rPr lang="pt-BR" altLang="en-US"/>
+              <a:t>.</a:t>
+            </a:r>
+            <a:endParaRPr lang="pt-BR" altLang="en-US"/>
           </a:p>
         </p:txBody>
       </p:sp>
@@ -9371,24 +9364,19 @@
         </p:nvPicPr>
         <p:blipFill>
           <a:blip r:embed="rId1"/>
-          <a:srcRect l="1601" t="8730" r="21029"/>
+          <a:srcRect l="926" t="5698" r="20205"/>
           <a:stretch>
             <a:fillRect/>
           </a:stretch>
         </p:blipFill>
         <p:spPr>
           <a:xfrm>
-            <a:off x="736600" y="2070735"/>
-            <a:ext cx="7670800" cy="2715895"/>
+            <a:off x="824865" y="2342515"/>
+            <a:ext cx="7494270" cy="2799715"/>
           </a:xfrm>
           <a:prstGeom prst="rect">
             <a:avLst/>
           </a:prstGeom>
-          <a:ln>
-            <a:solidFill>
-              <a:schemeClr val="accent1"/>
-            </a:solidFill>
-          </a:ln>
         </p:spPr>
       </p:pic>
       <p:sp>
@@ -9399,7 +9387,7 @@
         </p:nvSpPr>
         <p:spPr>
           <a:xfrm>
-            <a:off x="736600" y="4786630"/>
+            <a:off x="824865" y="5142230"/>
             <a:ext cx="1599565" cy="306705"/>
           </a:xfrm>
           <a:prstGeom prst="rect">
@@ -9430,130 +9418,6 @@
 </file>
 
 <file path=ppt/slides/slide38.xml><?xml version="1.0" encoding="utf-8"?>
-<p:sld xmlns:a="http://schemas.openxmlformats.org/drawingml/2006/main" xmlns:r="http://schemas.openxmlformats.org/officeDocument/2006/relationships" xmlns:p="http://schemas.openxmlformats.org/presentationml/2006/main">
-  <p:cSld>
-    <p:spTree>
-      <p:nvGrpSpPr>
-        <p:cNvPr id="1" name=""/>
-        <p:cNvGrpSpPr/>
-        <p:nvPr/>
-      </p:nvGrpSpPr>
-      <p:grpSpPr/>
-      <p:sp>
-        <p:nvSpPr>
-          <p:cNvPr id="2" name="Título 1"/>
-          <p:cNvSpPr>
-            <a:spLocks noGrp="1"/>
-          </p:cNvSpPr>
-          <p:nvPr>
-            <p:ph type="title"/>
-          </p:nvPr>
-        </p:nvSpPr>
-        <p:spPr/>
-        <p:txBody>
-          <a:bodyPr>
-            <a:normAutofit fontScale="90000"/>
-          </a:bodyPr>
-          <a:p>
-            <a:r>
-              <a:rPr lang="en-US"/>
-              <a:t>Resultados Obtidos no Comparativo de Distância das Rotas</a:t>
-            </a:r>
-            <a:r>
-              <a:rPr lang="pt-BR" altLang="en-US"/>
-              <a:t>.</a:t>
-            </a:r>
-            <a:endParaRPr lang="pt-BR" altLang="en-US"/>
-          </a:p>
-        </p:txBody>
-      </p:sp>
-      <p:sp>
-        <p:nvSpPr>
-          <p:cNvPr id="4" name="Espaço Reservado para Número de Slide 3"/>
-          <p:cNvSpPr>
-            <a:spLocks noGrp="1"/>
-          </p:cNvSpPr>
-          <p:nvPr>
-            <p:ph type="sldNum" sz="quarter" idx="12"/>
-          </p:nvPr>
-        </p:nvSpPr>
-        <p:spPr/>
-        <p:txBody>
-          <a:bodyPr/>
-          <a:p>
-            <a:fld id="{CFCDC573-C9BE-334B-B909-19E2F28512E7}" type="slidenum">
-              <a:rPr lang="pt-BR" smtClean="0"/>
-            </a:fld>
-            <a:endParaRPr lang="pt-BR"/>
-          </a:p>
-        </p:txBody>
-      </p:sp>
-      <p:pic>
-        <p:nvPicPr>
-          <p:cNvPr id="5" name="Espaço Reservado para Conteúdo 4"/>
-          <p:cNvPicPr>
-            <a:picLocks noChangeAspect="1"/>
-          </p:cNvPicPr>
-          <p:nvPr>
-            <p:ph idx="1"/>
-          </p:nvPr>
-        </p:nvPicPr>
-        <p:blipFill>
-          <a:blip r:embed="rId1"/>
-          <a:srcRect l="926" t="5698" r="20205"/>
-          <a:stretch>
-            <a:fillRect/>
-          </a:stretch>
-        </p:blipFill>
-        <p:spPr>
-          <a:xfrm>
-            <a:off x="824865" y="2342515"/>
-            <a:ext cx="7494270" cy="2799715"/>
-          </a:xfrm>
-          <a:prstGeom prst="rect">
-            <a:avLst/>
-          </a:prstGeom>
-        </p:spPr>
-      </p:pic>
-      <p:sp>
-        <p:nvSpPr>
-          <p:cNvPr id="13" name="Caixa de Texto 12"/>
-          <p:cNvSpPr txBox="1"/>
-          <p:nvPr/>
-        </p:nvSpPr>
-        <p:spPr>
-          <a:xfrm>
-            <a:off x="824865" y="5142230"/>
-            <a:ext cx="1599565" cy="306705"/>
-          </a:xfrm>
-          <a:prstGeom prst="rect">
-            <a:avLst/>
-          </a:prstGeom>
-          <a:noFill/>
-        </p:spPr>
-        <p:txBody>
-          <a:bodyPr wrap="none" rtlCol="0">
-            <a:spAutoFit/>
-          </a:bodyPr>
-          <a:p>
-            <a:pPr algn="l"/>
-            <a:r>
-              <a:rPr lang="pt-BR" altLang="en-US" sz="1400"/>
-              <a:t>Fonte: Autor (2018)</a:t>
-            </a:r>
-            <a:endParaRPr lang="pt-BR" altLang="en-US" sz="1400"/>
-          </a:p>
-        </p:txBody>
-      </p:sp>
-    </p:spTree>
-  </p:cSld>
-  <p:clrMapOvr>
-    <a:masterClrMapping/>
-  </p:clrMapOvr>
-</p:sld>
-</file>
-
-<file path=ppt/slides/slide39.xml><?xml version="1.0" encoding="utf-8"?>
 <p:sld xmlns:a="http://schemas.openxmlformats.org/drawingml/2006/main" xmlns:r="http://schemas.openxmlformats.org/officeDocument/2006/relationships" xmlns:p="http://schemas.openxmlformats.org/presentationml/2006/main">
   <p:cSld>
     <p:spTree>
@@ -9906,6 +9770,153 @@
 </p:sld>
 </file>
 
+<file path=ppt/slides/slide39.xml><?xml version="1.0" encoding="utf-8"?>
+<p:sld xmlns:a="http://schemas.openxmlformats.org/drawingml/2006/main" xmlns:r="http://schemas.openxmlformats.org/officeDocument/2006/relationships" xmlns:p="http://schemas.openxmlformats.org/presentationml/2006/main">
+  <p:cSld>
+    <p:spTree>
+      <p:nvGrpSpPr>
+        <p:cNvPr id="1" name=""/>
+        <p:cNvGrpSpPr/>
+        <p:nvPr/>
+      </p:nvGrpSpPr>
+      <p:grpSpPr>
+        <a:xfrm>
+          <a:off x="0" y="0"/>
+          <a:ext cx="0" cy="0"/>
+          <a:chOff x="0" y="0"/>
+          <a:chExt cx="0" cy="0"/>
+        </a:xfrm>
+      </p:grpSpPr>
+      <p:sp>
+        <p:nvSpPr>
+          <p:cNvPr id="2" name="Title 1"/>
+          <p:cNvSpPr>
+            <a:spLocks noGrp="1"/>
+          </p:cNvSpPr>
+          <p:nvPr>
+            <p:ph type="title"/>
+          </p:nvPr>
+        </p:nvSpPr>
+        <p:spPr/>
+        <p:txBody>
+          <a:bodyPr/>
+          <a:lstStyle/>
+          <a:p>
+            <a:r>
+              <a:rPr lang="pt-BR" dirty="0" err="1" smtClean="0"/>
+              <a:t>Principais Contribuições</a:t>
+            </a:r>
+            <a:endParaRPr lang="pt-BR" dirty="0"/>
+          </a:p>
+        </p:txBody>
+      </p:sp>
+      <p:sp>
+        <p:nvSpPr>
+          <p:cNvPr id="3" name="Content Placeholder 2"/>
+          <p:cNvSpPr>
+            <a:spLocks noGrp="1"/>
+          </p:cNvSpPr>
+          <p:nvPr>
+            <p:ph idx="1"/>
+          </p:nvPr>
+        </p:nvSpPr>
+        <p:spPr>
+          <a:xfrm>
+            <a:off x="628650" y="2221865"/>
+            <a:ext cx="7886700" cy="3977640"/>
+          </a:xfrm>
+        </p:spPr>
+        <p:txBody>
+          <a:bodyPr/>
+          <a:lstStyle/>
+          <a:p>
+            <a:r>
+              <a:t>Reduzir custos operacionais com transporte </a:t>
+            </a:r>
+          </a:p>
+          <a:p>
+            <a:pPr marL="0" indent="0">
+              <a:buNone/>
+            </a:pPr>
+          </a:p>
+          <a:p>
+            <a:r>
+              <a:t>Aumentar a rentabilidade da empresa</a:t>
+            </a:r>
+          </a:p>
+          <a:p/>
+          <a:p>
+            <a:r>
+              <a:rPr>
+                <a:sym typeface="+mn-ea"/>
+              </a:rPr>
+              <a:t>Reduzir tempo desperdiçado</a:t>
+            </a:r>
+            <a:r>
+              <a:rPr lang="pt-BR">
+                <a:sym typeface="+mn-ea"/>
+              </a:rPr>
+              <a:t>	</a:t>
+            </a:r>
+            <a:endParaRPr lang="pt-BR"/>
+          </a:p>
+          <a:p>
+            <a:endParaRPr lang="pt-BR"/>
+          </a:p>
+          <a:p>
+            <a:r>
+              <a:rPr lang="pt-BR">
+                <a:sym typeface="+mn-ea"/>
+              </a:rPr>
+              <a:t>Proporcionar melhoria nos serviços da empresa</a:t>
+            </a:r>
+            <a:endParaRPr lang="pt-BR">
+              <a:sym typeface="+mn-ea"/>
+            </a:endParaRPr>
+          </a:p>
+          <a:p/>
+          <a:p>
+            <a:endParaRPr lang="pt-BR"/>
+          </a:p>
+        </p:txBody>
+      </p:sp>
+      <p:sp>
+        <p:nvSpPr>
+          <p:cNvPr id="4" name="Slide Number Placeholder 3"/>
+          <p:cNvSpPr>
+            <a:spLocks noGrp="1"/>
+          </p:cNvSpPr>
+          <p:nvPr>
+            <p:ph type="sldNum" sz="quarter" idx="12"/>
+          </p:nvPr>
+        </p:nvSpPr>
+        <p:spPr/>
+        <p:txBody>
+          <a:bodyPr/>
+          <a:lstStyle/>
+          <a:p>
+            <a:fld id="{CFCDC573-C9BE-334B-B909-19E2F28512E7}" type="slidenum">
+              <a:rPr lang="pt-BR" smtClean="0"/>
+            </a:fld>
+            <a:endParaRPr lang="pt-BR"/>
+          </a:p>
+        </p:txBody>
+      </p:sp>
+    </p:spTree>
+  </p:cSld>
+  <p:clrMapOvr>
+    <a:masterClrMapping/>
+  </p:clrMapOvr>
+  <p:timing>
+    <p:tnLst>
+      <p:par>
+        <p:cTn id="1" dur="indefinite" restart="never" nodeType="tmRoot"/>
+      </p:par>
+    </p:tnLst>
+  </p:timing>
+</p:sld>
+</file>
+
 <file path=ppt/slides/slide4.xml><?xml version="1.0" encoding="utf-8"?>
 <p:sld xmlns:a="http://schemas.openxmlformats.org/drawingml/2006/main" xmlns:r="http://schemas.openxmlformats.org/officeDocument/2006/relationships" xmlns:p="http://schemas.openxmlformats.org/presentationml/2006/main">
   <p:cSld>
@@ -10076,17 +10087,10 @@
         <p:cNvGrpSpPr/>
         <p:nvPr/>
       </p:nvGrpSpPr>
-      <p:grpSpPr>
-        <a:xfrm>
-          <a:off x="0" y="0"/>
-          <a:ext cx="0" cy="0"/>
-          <a:chOff x="0" y="0"/>
-          <a:chExt cx="0" cy="0"/>
-        </a:xfrm>
-      </p:grpSpPr>
-      <p:sp>
-        <p:nvSpPr>
-          <p:cNvPr id="2" name="Title 1"/>
+      <p:grpSpPr/>
+      <p:sp>
+        <p:nvSpPr>
+          <p:cNvPr id="2" name="Título 1"/>
           <p:cNvSpPr>
             <a:spLocks noGrp="1"/>
           </p:cNvSpPr>
@@ -10094,92 +10098,28 @@
             <p:ph type="title"/>
           </p:nvPr>
         </p:nvSpPr>
-        <p:spPr/>
-        <p:txBody>
-          <a:bodyPr/>
-          <a:lstStyle/>
-          <a:p>
-            <a:r>
-              <a:rPr lang="pt-BR" dirty="0" err="1" smtClean="0"/>
-              <a:t>Principais Contribuições</a:t>
-            </a:r>
-            <a:endParaRPr lang="pt-BR" dirty="0"/>
-          </a:p>
-        </p:txBody>
-      </p:sp>
-      <p:sp>
-        <p:nvSpPr>
-          <p:cNvPr id="3" name="Content Placeholder 2"/>
-          <p:cNvSpPr>
-            <a:spLocks noGrp="1"/>
-          </p:cNvSpPr>
-          <p:nvPr>
-            <p:ph idx="1"/>
-          </p:nvPr>
-        </p:nvSpPr>
-        <p:spPr>
-          <a:xfrm>
-            <a:off x="628650" y="2221865"/>
-            <a:ext cx="7886700" cy="3977640"/>
-          </a:xfrm>
-        </p:spPr>
-        <p:txBody>
-          <a:bodyPr/>
-          <a:lstStyle/>
-          <a:p>
-            <a:r>
-              <a:t>Reduzir custos operacionais com transporte </a:t>
-            </a:r>
-          </a:p>
-          <a:p>
-            <a:pPr marL="0" indent="0">
-              <a:buNone/>
-            </a:pPr>
-          </a:p>
-          <a:p>
-            <a:r>
-              <a:t>Aumentar a rentabilidade da empresa</a:t>
-            </a:r>
-          </a:p>
-          <a:p/>
-          <a:p>
-            <a:r>
-              <a:rPr>
-                <a:sym typeface="+mn-ea"/>
-              </a:rPr>
-              <a:t>Reduzir tempo desperdiçado</a:t>
-            </a:r>
-            <a:r>
-              <a:rPr lang="pt-BR">
-                <a:sym typeface="+mn-ea"/>
-              </a:rPr>
-              <a:t>	</a:t>
-            </a:r>
-            <a:endParaRPr lang="pt-BR"/>
-          </a:p>
-          <a:p>
-            <a:endParaRPr lang="pt-BR"/>
-          </a:p>
-          <a:p>
-            <a:r>
-              <a:rPr lang="pt-BR">
-                <a:sym typeface="+mn-ea"/>
-              </a:rPr>
-              <a:t>Proporcionar melhoria nos serviços da empresa</a:t>
-            </a:r>
-            <a:endParaRPr lang="pt-BR">
-              <a:sym typeface="+mn-ea"/>
-            </a:endParaRPr>
-          </a:p>
-          <a:p/>
-          <a:p>
-            <a:endParaRPr lang="pt-BR"/>
-          </a:p>
-        </p:txBody>
-      </p:sp>
-      <p:sp>
-        <p:nvSpPr>
-          <p:cNvPr id="4" name="Slide Number Placeholder 3"/>
+        <p:spPr>
+          <a:xfrm>
+            <a:off x="628650" y="2958466"/>
+            <a:ext cx="7886700" cy="1325563"/>
+          </a:xfrm>
+        </p:spPr>
+        <p:txBody>
+          <a:bodyPr>
+            <a:normAutofit fontScale="90000"/>
+          </a:bodyPr>
+          <a:p>
+            <a:r>
+              <a:rPr lang="en-US"/>
+              <a:t>Considerações Gerais, Limitações e Dificuldades</a:t>
+            </a:r>
+            <a:endParaRPr lang="en-US"/>
+          </a:p>
+        </p:txBody>
+      </p:sp>
+      <p:sp>
+        <p:nvSpPr>
+          <p:cNvPr id="4" name="Espaço Reservado para Número de Slide 3"/>
           <p:cNvSpPr>
             <a:spLocks noGrp="1"/>
           </p:cNvSpPr>
@@ -10190,7 +10130,6 @@
         <p:spPr/>
         <p:txBody>
           <a:bodyPr/>
-          <a:lstStyle/>
           <a:p>
             <a:fld id="{CFCDC573-C9BE-334B-B909-19E2F28512E7}" type="slidenum">
               <a:rPr lang="pt-BR" smtClean="0"/>
@@ -10204,13 +10143,6 @@
   <p:clrMapOvr>
     <a:masterClrMapping/>
   </p:clrMapOvr>
-  <p:timing>
-    <p:tnLst>
-      <p:par>
-        <p:cTn id="1" dur="indefinite" restart="never" nodeType="tmRoot"/>
-      </p:par>
-    </p:tnLst>
-  </p:timing>
 </p:sld>
 </file>
 
@@ -10234,20 +10166,50 @@
             <p:ph type="title"/>
           </p:nvPr>
         </p:nvSpPr>
-        <p:spPr>
-          <a:xfrm>
-            <a:off x="628650" y="2958466"/>
-            <a:ext cx="7886700" cy="1325563"/>
-          </a:xfrm>
-        </p:spPr>
-        <p:txBody>
-          <a:bodyPr>
-            <a:normAutofit fontScale="90000"/>
-          </a:bodyPr>
+        <p:spPr/>
+        <p:txBody>
+          <a:bodyPr/>
           <a:p>
             <a:r>
               <a:rPr lang="en-US"/>
-              <a:t>Considerações Gerais, Limitações e Dificuldades</a:t>
+              <a:t>Sugestão de trabalho futuro</a:t>
+            </a:r>
+            <a:endParaRPr lang="en-US"/>
+          </a:p>
+        </p:txBody>
+      </p:sp>
+      <p:sp>
+        <p:nvSpPr>
+          <p:cNvPr id="3" name="Espaço Reservado para Conteúdo 2"/>
+          <p:cNvSpPr>
+            <a:spLocks noGrp="1"/>
+          </p:cNvSpPr>
+          <p:nvPr>
+            <p:ph idx="1"/>
+          </p:nvPr>
+        </p:nvSpPr>
+        <p:spPr>
+          <a:xfrm>
+            <a:off x="628650" y="2404745"/>
+            <a:ext cx="7886700" cy="3772535"/>
+          </a:xfrm>
+        </p:spPr>
+        <p:txBody>
+          <a:bodyPr/>
+          <a:p>
+            <a:r>
+              <a:rPr lang="en-US"/>
+              <a:t>Transferir a utilização do mapa do Google Maps para o Bing Maps</a:t>
+            </a:r>
+            <a:endParaRPr lang="en-US"/>
+          </a:p>
+          <a:p>
+            <a:endParaRPr lang="en-US"/>
+          </a:p>
+          <a:p>
+            <a:r>
+              <a:rPr lang="en-US"/>
+              <a:t>Desenvolver exclusão lógica dos objetos</a:t>
             </a:r>
             <a:endParaRPr lang="en-US"/>
           </a:p>
@@ -10283,104 +10245,6 @@
 </file>
 
 <file path=ppt/slides/slide42.xml><?xml version="1.0" encoding="utf-8"?>
-<p:sld xmlns:a="http://schemas.openxmlformats.org/drawingml/2006/main" xmlns:r="http://schemas.openxmlformats.org/officeDocument/2006/relationships" xmlns:p="http://schemas.openxmlformats.org/presentationml/2006/main">
-  <p:cSld>
-    <p:spTree>
-      <p:nvGrpSpPr>
-        <p:cNvPr id="1" name=""/>
-        <p:cNvGrpSpPr/>
-        <p:nvPr/>
-      </p:nvGrpSpPr>
-      <p:grpSpPr/>
-      <p:sp>
-        <p:nvSpPr>
-          <p:cNvPr id="2" name="Título 1"/>
-          <p:cNvSpPr>
-            <a:spLocks noGrp="1"/>
-          </p:cNvSpPr>
-          <p:nvPr>
-            <p:ph type="title"/>
-          </p:nvPr>
-        </p:nvSpPr>
-        <p:spPr/>
-        <p:txBody>
-          <a:bodyPr/>
-          <a:p>
-            <a:r>
-              <a:rPr lang="en-US"/>
-              <a:t>Sugestão de trabalho futuro</a:t>
-            </a:r>
-            <a:endParaRPr lang="en-US"/>
-          </a:p>
-        </p:txBody>
-      </p:sp>
-      <p:sp>
-        <p:nvSpPr>
-          <p:cNvPr id="3" name="Espaço Reservado para Conteúdo 2"/>
-          <p:cNvSpPr>
-            <a:spLocks noGrp="1"/>
-          </p:cNvSpPr>
-          <p:nvPr>
-            <p:ph idx="1"/>
-          </p:nvPr>
-        </p:nvSpPr>
-        <p:spPr>
-          <a:xfrm>
-            <a:off x="628650" y="2404745"/>
-            <a:ext cx="7886700" cy="3772535"/>
-          </a:xfrm>
-        </p:spPr>
-        <p:txBody>
-          <a:bodyPr/>
-          <a:p>
-            <a:r>
-              <a:rPr lang="en-US"/>
-              <a:t>Transferir a utilização do mapa do Google Maps para o Bing Maps</a:t>
-            </a:r>
-            <a:endParaRPr lang="en-US"/>
-          </a:p>
-          <a:p>
-            <a:endParaRPr lang="en-US"/>
-          </a:p>
-          <a:p>
-            <a:r>
-              <a:rPr lang="en-US"/>
-              <a:t>Desenvolver exclusão lógica dos objetos</a:t>
-            </a:r>
-            <a:endParaRPr lang="en-US"/>
-          </a:p>
-        </p:txBody>
-      </p:sp>
-      <p:sp>
-        <p:nvSpPr>
-          <p:cNvPr id="4" name="Espaço Reservado para Número de Slide 3"/>
-          <p:cNvSpPr>
-            <a:spLocks noGrp="1"/>
-          </p:cNvSpPr>
-          <p:nvPr>
-            <p:ph type="sldNum" sz="quarter" idx="12"/>
-          </p:nvPr>
-        </p:nvSpPr>
-        <p:spPr/>
-        <p:txBody>
-          <a:bodyPr/>
-          <a:p>
-            <a:fld id="{CFCDC573-C9BE-334B-B909-19E2F28512E7}" type="slidenum">
-              <a:rPr lang="pt-BR" smtClean="0"/>
-            </a:fld>
-            <a:endParaRPr lang="pt-BR"/>
-          </a:p>
-        </p:txBody>
-      </p:sp>
-    </p:spTree>
-  </p:cSld>
-  <p:clrMapOvr>
-    <a:masterClrMapping/>
-  </p:clrMapOvr>
-</p:sld>
-</file>
-
-<file path=ppt/slides/slide43.xml><?xml version="1.0" encoding="utf-8"?>
 <p:sld xmlns:a="http://schemas.openxmlformats.org/drawingml/2006/main" xmlns:r="http://schemas.openxmlformats.org/officeDocument/2006/relationships" xmlns:p="http://schemas.openxmlformats.org/presentationml/2006/main">
   <p:cSld>
     <p:spTree>
@@ -10745,7 +10609,7 @@
 </p:sld>
 </file>
 
-<file path=ppt/slides/slide44.xml><?xml version="1.0" encoding="utf-8"?>
+<file path=ppt/slides/slide43.xml><?xml version="1.0" encoding="utf-8"?>
 <p:sld xmlns:a="http://schemas.openxmlformats.org/drawingml/2006/main" xmlns:r="http://schemas.openxmlformats.org/officeDocument/2006/relationships" xmlns:p="http://schemas.openxmlformats.org/presentationml/2006/main">
   <p:cSld>
     <p:spTree>
@@ -10876,7 +10740,7 @@
 </p:sld>
 </file>
 
-<file path=ppt/slides/slide45.xml><?xml version="1.0" encoding="utf-8"?>
+<file path=ppt/slides/slide44.xml><?xml version="1.0" encoding="utf-8"?>
 <p:sld xmlns:a="http://schemas.openxmlformats.org/drawingml/2006/main" xmlns:r="http://schemas.openxmlformats.org/officeDocument/2006/relationships" xmlns:p="http://schemas.openxmlformats.org/presentationml/2006/main">
   <p:cSld>
     <p:spTree>
@@ -10982,7 +10846,7 @@
 </p:sld>
 </file>
 
-<file path=ppt/slides/slide46.xml><?xml version="1.0" encoding="utf-8"?>
+<file path=ppt/slides/slide45.xml><?xml version="1.0" encoding="utf-8"?>
 <p:sld xmlns:a="http://schemas.openxmlformats.org/drawingml/2006/main" xmlns:r="http://schemas.openxmlformats.org/officeDocument/2006/relationships" xmlns:p="http://schemas.openxmlformats.org/presentationml/2006/main">
   <p:cSld>
     <p:spTree>

</xml_diff>

<commit_message>
Correcoes na apresentacao e documento final
</commit_message>
<xml_diff>
--- a/APRESENTAÇÃO JOAO VITOR.pptx
+++ b/APRESENTAÇÃO JOAO VITOR.pptx
@@ -4063,15 +4063,17 @@
           <a:lstStyle/>
           <a:p>
             <a:r>
-              <a:rPr lang="pt-BR"/>
-              <a:t>Sistema de Logístico de Roteirização</a:t>
+              <a:rPr lang="pt-BR">
+                <a:sym typeface="+mn-ea"/>
+              </a:rPr>
+              <a:t>SysRLog</a:t>
             </a:r>
             <a:br>
               <a:rPr lang="pt-BR"/>
             </a:br>
             <a:r>
               <a:rPr lang="pt-BR"/>
-              <a:t>SysRLog</a:t>
+              <a:t>Sistema Logístico de Roteirização</a:t>
             </a:r>
             <a:endParaRPr lang="pt-BR"/>
           </a:p>
@@ -5148,7 +5150,7 @@
                           <a:cs typeface="Times New Roman" panose="02020603050405020304" charset="0"/>
                           <a:sym typeface="+mn-ea"/>
                         </a:rPr>
-                        <a:t>Operador Logístico( Engloba Analistas, técnicos e auxiliares)</a:t>
+                        <a:t>Operador Logístico (Engloba Analistas, técnicos e auxiliares)</a:t>
                       </a:r>
                       <a:endParaRPr lang="en-US" altLang="en-US" sz="1600" b="0">
                         <a:latin typeface="Times New Roman" panose="02020603050405020304" charset="0"/>
@@ -8838,7 +8840,7 @@
               <a:rPr lang="pt-BR" altLang="en-US">
                 <a:sym typeface="+mn-ea"/>
               </a:rPr>
-              <a:t>Inserir a Lista de Endereços no google</a:t>
+              <a:t>Inserir a Lista de Endereços no Google Maps</a:t>
             </a:r>
             <a:endParaRPr lang="pt-BR" altLang="en-US"/>
           </a:p>
@@ -9223,9 +9225,39 @@
           </a:p>
         </p:txBody>
       </p:sp>
+      <p:sp>
+        <p:nvSpPr>
+          <p:cNvPr id="13" name="Caixa de Texto 12"/>
+          <p:cNvSpPr txBox="1"/>
+          <p:nvPr/>
+        </p:nvSpPr>
+        <p:spPr>
+          <a:xfrm>
+            <a:off x="658495" y="4952365"/>
+            <a:ext cx="1599565" cy="306705"/>
+          </a:xfrm>
+          <a:prstGeom prst="rect">
+            <a:avLst/>
+          </a:prstGeom>
+          <a:noFill/>
+        </p:spPr>
+        <p:txBody>
+          <a:bodyPr wrap="none" rtlCol="0">
+            <a:spAutoFit/>
+          </a:bodyPr>
+          <a:p>
+            <a:pPr algn="l"/>
+            <a:r>
+              <a:rPr lang="pt-BR" altLang="en-US" sz="1400"/>
+              <a:t>Fonte: Autor (2018)</a:t>
+            </a:r>
+            <a:endParaRPr lang="pt-BR" altLang="en-US" sz="1400"/>
+          </a:p>
+        </p:txBody>
+      </p:sp>
       <p:pic>
         <p:nvPicPr>
-          <p:cNvPr id="5" name="Espaço Reservado para Conteúdo 4"/>
+          <p:cNvPr id="6" name="Espaço Reservado para Conteúdo 5"/>
           <p:cNvPicPr>
             <a:picLocks noChangeAspect="1"/>
           </p:cNvPicPr>
@@ -9235,56 +9267,21 @@
         </p:nvPicPr>
         <p:blipFill>
           <a:blip r:embed="rId1"/>
-          <a:srcRect l="1601" t="8730" r="21029"/>
+          <a:srcRect l="1498" t="9808" r="20346"/>
           <a:stretch>
             <a:fillRect/>
           </a:stretch>
         </p:blipFill>
         <p:spPr>
           <a:xfrm>
-            <a:off x="736600" y="2070735"/>
-            <a:ext cx="7670800" cy="2715895"/>
+            <a:off x="658495" y="2337435"/>
+            <a:ext cx="7827645" cy="2498725"/>
           </a:xfrm>
           <a:prstGeom prst="rect">
             <a:avLst/>
           </a:prstGeom>
-          <a:ln>
-            <a:solidFill>
-              <a:schemeClr val="accent1"/>
-            </a:solidFill>
-          </a:ln>
         </p:spPr>
       </p:pic>
-      <p:sp>
-        <p:nvSpPr>
-          <p:cNvPr id="13" name="Caixa de Texto 12"/>
-          <p:cNvSpPr txBox="1"/>
-          <p:nvPr/>
-        </p:nvSpPr>
-        <p:spPr>
-          <a:xfrm>
-            <a:off x="736600" y="4786630"/>
-            <a:ext cx="1599565" cy="306705"/>
-          </a:xfrm>
-          <a:prstGeom prst="rect">
-            <a:avLst/>
-          </a:prstGeom>
-          <a:noFill/>
-        </p:spPr>
-        <p:txBody>
-          <a:bodyPr wrap="none" rtlCol="0">
-            <a:spAutoFit/>
-          </a:bodyPr>
-          <a:p>
-            <a:pPr algn="l"/>
-            <a:r>
-              <a:rPr lang="pt-BR" altLang="en-US" sz="1400"/>
-              <a:t>Fonte: Autor (2018)</a:t>
-            </a:r>
-            <a:endParaRPr lang="pt-BR" altLang="en-US" sz="1400"/>
-          </a:p>
-        </p:txBody>
-      </p:sp>
     </p:spTree>
   </p:cSld>
   <p:clrMapOvr>
@@ -9352,9 +9349,39 @@
           </a:p>
         </p:txBody>
       </p:sp>
+      <p:sp>
+        <p:nvSpPr>
+          <p:cNvPr id="13" name="Caixa de Texto 12"/>
+          <p:cNvSpPr txBox="1"/>
+          <p:nvPr/>
+        </p:nvSpPr>
+        <p:spPr>
+          <a:xfrm>
+            <a:off x="824865" y="5142230"/>
+            <a:ext cx="1599565" cy="306705"/>
+          </a:xfrm>
+          <a:prstGeom prst="rect">
+            <a:avLst/>
+          </a:prstGeom>
+          <a:noFill/>
+        </p:spPr>
+        <p:txBody>
+          <a:bodyPr wrap="none" rtlCol="0">
+            <a:spAutoFit/>
+          </a:bodyPr>
+          <a:p>
+            <a:pPr algn="l"/>
+            <a:r>
+              <a:rPr lang="pt-BR" altLang="en-US" sz="1400"/>
+              <a:t>Fonte: Autor (2018)</a:t>
+            </a:r>
+            <a:endParaRPr lang="pt-BR" altLang="en-US" sz="1400"/>
+          </a:p>
+        </p:txBody>
+      </p:sp>
       <p:pic>
         <p:nvPicPr>
-          <p:cNvPr id="5" name="Espaço Reservado para Conteúdo 4"/>
+          <p:cNvPr id="8" name="Espaço Reservado para Conteúdo 7"/>
           <p:cNvPicPr>
             <a:picLocks noChangeAspect="1"/>
           </p:cNvPicPr>
@@ -9364,51 +9391,21 @@
         </p:nvPicPr>
         <p:blipFill>
           <a:blip r:embed="rId1"/>
-          <a:srcRect l="926" t="5698" r="20205"/>
+          <a:srcRect l="1159" t="6884" r="20116"/>
           <a:stretch>
             <a:fillRect/>
           </a:stretch>
         </p:blipFill>
         <p:spPr>
           <a:xfrm>
-            <a:off x="824865" y="2342515"/>
-            <a:ext cx="7494270" cy="2799715"/>
+            <a:off x="805180" y="2289810"/>
+            <a:ext cx="7533640" cy="2561590"/>
           </a:xfrm>
           <a:prstGeom prst="rect">
             <a:avLst/>
           </a:prstGeom>
         </p:spPr>
       </p:pic>
-      <p:sp>
-        <p:nvSpPr>
-          <p:cNvPr id="13" name="Caixa de Texto 12"/>
-          <p:cNvSpPr txBox="1"/>
-          <p:nvPr/>
-        </p:nvSpPr>
-        <p:spPr>
-          <a:xfrm>
-            <a:off x="824865" y="5142230"/>
-            <a:ext cx="1599565" cy="306705"/>
-          </a:xfrm>
-          <a:prstGeom prst="rect">
-            <a:avLst/>
-          </a:prstGeom>
-          <a:noFill/>
-        </p:spPr>
-        <p:txBody>
-          <a:bodyPr wrap="none" rtlCol="0">
-            <a:spAutoFit/>
-          </a:bodyPr>
-          <a:p>
-            <a:pPr algn="l"/>
-            <a:r>
-              <a:rPr lang="pt-BR" altLang="en-US" sz="1400"/>
-              <a:t>Fonte: Autor (2018)</a:t>
-            </a:r>
-            <a:endParaRPr lang="pt-BR" altLang="en-US" sz="1400"/>
-          </a:p>
-        </p:txBody>
-      </p:sp>
     </p:spTree>
   </p:cSld>
   <p:clrMapOvr>
@@ -10098,12 +10095,7 @@
             <p:ph type="title"/>
           </p:nvPr>
         </p:nvSpPr>
-        <p:spPr>
-          <a:xfrm>
-            <a:off x="628650" y="2958466"/>
-            <a:ext cx="7886700" cy="1325563"/>
-          </a:xfrm>
-        </p:spPr>
+        <p:spPr/>
         <p:txBody>
           <a:bodyPr>
             <a:normAutofit fontScale="90000"/>
@@ -10114,6 +10106,58 @@
               <a:t>Considerações Gerais, Limitações e Dificuldades</a:t>
             </a:r>
             <a:endParaRPr lang="en-US"/>
+          </a:p>
+        </p:txBody>
+      </p:sp>
+      <p:sp>
+        <p:nvSpPr>
+          <p:cNvPr id="3" name="Espaço Reservado para Conteúdo 2"/>
+          <p:cNvSpPr>
+            <a:spLocks noGrp="1"/>
+          </p:cNvSpPr>
+          <p:nvPr>
+            <p:ph idx="1"/>
+          </p:nvPr>
+        </p:nvSpPr>
+        <p:spPr/>
+        <p:txBody>
+          <a:bodyPr/>
+          <a:p>
+            <a:r>
+              <a:rPr lang="pt-BR" altLang="en-US"/>
+              <a:t>Desenvolvimento de todas as etapas do Projeto</a:t>
+            </a:r>
+            <a:endParaRPr lang="pt-BR" altLang="en-US"/>
+          </a:p>
+          <a:p>
+            <a:endParaRPr lang="pt-BR" altLang="en-US"/>
+          </a:p>
+          <a:p>
+            <a:r>
+              <a:rPr lang="pt-BR" altLang="en-US"/>
+              <a:t>Importância do Planejamento</a:t>
+            </a:r>
+            <a:endParaRPr lang="pt-BR" altLang="en-US"/>
+          </a:p>
+          <a:p>
+            <a:endParaRPr lang="pt-BR" altLang="en-US"/>
+          </a:p>
+          <a:p>
+            <a:r>
+              <a:rPr lang="pt-BR" altLang="en-US"/>
+              <a:t>Dificuldade com Front-End</a:t>
+            </a:r>
+            <a:endParaRPr lang="pt-BR" altLang="en-US"/>
+          </a:p>
+          <a:p>
+            <a:endParaRPr lang="pt-BR" altLang="en-US"/>
+          </a:p>
+          <a:p>
+            <a:r>
+              <a:rPr lang="pt-BR" altLang="en-US"/>
+              <a:t>Pesquisa de Soluções</a:t>
+            </a:r>
+            <a:endParaRPr lang="pt-BR" altLang="en-US"/>
           </a:p>
         </p:txBody>
       </p:sp>
@@ -11029,7 +11073,7 @@
           <a:p>
             <a:r>
               <a:rPr lang="pt-BR" altLang="en-US"/>
-              <a:t>Com softwares para gestão adequados os processos de planejamento logístico é facilitado (CHOPRA; MEINDL, 2003).</a:t>
+              <a:t>Com softwares para gestão adequados os processos de planejamento logístico são facilitados (CHOPRA; MEINDL, 2003).</a:t>
             </a:r>
             <a:endParaRPr lang="pt-BR" altLang="en-US"/>
           </a:p>

</xml_diff>

<commit_message>
Efetuada as correcoes basicas pontuadas pelo Mineda|Efetuada alteracoes documentos da apresentacao
</commit_message>
<xml_diff>
--- a/APRESENTAÇÃO JOAO VITOR.pptx
+++ b/APRESENTAÇÃO JOAO VITOR.pptx
@@ -10119,7 +10119,12 @@
             <p:ph idx="1"/>
           </p:nvPr>
         </p:nvSpPr>
-        <p:spPr/>
+        <p:spPr>
+          <a:xfrm>
+            <a:off x="678180" y="2369820"/>
+            <a:ext cx="7886700" cy="4351338"/>
+          </a:xfrm>
+        </p:spPr>
         <p:txBody>
           <a:bodyPr/>
           <a:p>

</xml_diff>